<commit_message>
oops session 7 revised
</commit_message>
<xml_diff>
--- a/Objected Oriented Programming Concepts Using C++ & Data Structures/Session-7.pptx
+++ b/Objected Oriented Programming Concepts Using C++ & Data Structures/Session-7.pptx
@@ -13,25 +13,28 @@
     <p:sldId id="263" r:id="rId8"/>
     <p:sldId id="279" r:id="rId9"/>
     <p:sldId id="281" r:id="rId10"/>
-    <p:sldId id="280" r:id="rId11"/>
-    <p:sldId id="264" r:id="rId12"/>
-    <p:sldId id="282" r:id="rId13"/>
-    <p:sldId id="265" r:id="rId14"/>
-    <p:sldId id="278" r:id="rId15"/>
-    <p:sldId id="283" r:id="rId16"/>
-    <p:sldId id="284" r:id="rId17"/>
-    <p:sldId id="266" r:id="rId18"/>
-    <p:sldId id="267" r:id="rId19"/>
-    <p:sldId id="268" r:id="rId20"/>
-    <p:sldId id="269" r:id="rId21"/>
-    <p:sldId id="270" r:id="rId22"/>
-    <p:sldId id="271" r:id="rId23"/>
-    <p:sldId id="272" r:id="rId24"/>
-    <p:sldId id="273" r:id="rId25"/>
-    <p:sldId id="274" r:id="rId26"/>
-    <p:sldId id="275" r:id="rId27"/>
-    <p:sldId id="276" r:id="rId28"/>
-    <p:sldId id="277" r:id="rId29"/>
+    <p:sldId id="285" r:id="rId11"/>
+    <p:sldId id="280" r:id="rId12"/>
+    <p:sldId id="286" r:id="rId13"/>
+    <p:sldId id="264" r:id="rId14"/>
+    <p:sldId id="287" r:id="rId15"/>
+    <p:sldId id="282" r:id="rId16"/>
+    <p:sldId id="265" r:id="rId17"/>
+    <p:sldId id="278" r:id="rId18"/>
+    <p:sldId id="283" r:id="rId19"/>
+    <p:sldId id="284" r:id="rId20"/>
+    <p:sldId id="266" r:id="rId21"/>
+    <p:sldId id="267" r:id="rId22"/>
+    <p:sldId id="268" r:id="rId23"/>
+    <p:sldId id="269" r:id="rId24"/>
+    <p:sldId id="270" r:id="rId25"/>
+    <p:sldId id="271" r:id="rId26"/>
+    <p:sldId id="272" r:id="rId27"/>
+    <p:sldId id="273" r:id="rId28"/>
+    <p:sldId id="274" r:id="rId29"/>
+    <p:sldId id="275" r:id="rId30"/>
+    <p:sldId id="276" r:id="rId31"/>
+    <p:sldId id="277" r:id="rId32"/>
   </p:sldIdLst>
   <p:sldSz cx="9144000" cy="6858000" type="screen4x3"/>
   <p:notesSz cx="6858000" cy="9144000"/>
@@ -4575,6 +4578,453 @@
                 <a:latin typeface="Noto Serif CJK JP" panose="02020400000000000000" charset="-122"/>
                 <a:ea typeface="Noto Serif CJK JP" panose="02020400000000000000" charset="-122"/>
               </a:rPr>
+              <a:t>Omega Notation, Ω</a:t>
+            </a:r>
+            <a:endParaRPr lang="en-US" altLang="en-IN" sz="2800" dirty="0">
+              <a:latin typeface="Noto Serif CJK JP" panose="02020400000000000000" charset="-122"/>
+              <a:ea typeface="Noto Serif CJK JP" panose="02020400000000000000" charset="-122"/>
+            </a:endParaRPr>
+          </a:p>
+        </p:txBody>
+      </p:sp>
+      <p:sp>
+        <p:nvSpPr>
+          <p:cNvPr id="3" name="Content Placeholder 2"/>
+          <p:cNvSpPr>
+            <a:spLocks noGrp="1"/>
+          </p:cNvSpPr>
+          <p:nvPr>
+            <p:ph idx="1"/>
+          </p:nvPr>
+        </p:nvSpPr>
+        <p:spPr>
+          <a:xfrm>
+            <a:off x="554355" y="1226185"/>
+            <a:ext cx="7772400" cy="5364480"/>
+          </a:xfrm>
+        </p:spPr>
+        <p:txBody>
+          <a:bodyPr/>
+          <a:lstStyle/>
+          <a:p>
+            <a:pPr>
+              <a:lnSpc>
+                <a:spcPct val="150000"/>
+              </a:lnSpc>
+            </a:pPr>
+            <a:r>
+              <a:rPr lang="en-IN" sz="1800" dirty="0" smtClean="0">
+                <a:latin typeface="Noto Serif CJK JP" panose="02020400000000000000" charset="-122"/>
+                <a:ea typeface="Noto Serif CJK JP" panose="02020400000000000000" charset="-122"/>
+              </a:rPr>
+              <a:t>The notation Ω(n) is the formal way to express the lower bound of an algorithm's running time. It measures the best case time complexity or the best amount of time an algorithm can possibly take to complete.</a:t>
+            </a:r>
+            <a:endParaRPr lang="en-IN" sz="1800" dirty="0" smtClean="0">
+              <a:latin typeface="Noto Serif CJK JP" panose="02020400000000000000" charset="-122"/>
+              <a:ea typeface="Noto Serif CJK JP" panose="02020400000000000000" charset="-122"/>
+            </a:endParaRPr>
+          </a:p>
+          <a:p>
+            <a:pPr>
+              <a:lnSpc>
+                <a:spcPct val="150000"/>
+              </a:lnSpc>
+            </a:pPr>
+            <a:endParaRPr lang="en-IN" sz="1800" dirty="0" smtClean="0">
+              <a:latin typeface="Noto Serif CJK JP" panose="02020400000000000000" charset="-122"/>
+              <a:ea typeface="Noto Serif CJK JP" panose="02020400000000000000" charset="-122"/>
+            </a:endParaRPr>
+          </a:p>
+          <a:p>
+            <a:pPr>
+              <a:lnSpc>
+                <a:spcPct val="150000"/>
+              </a:lnSpc>
+            </a:pPr>
+            <a:endParaRPr lang="en-IN" sz="1800" dirty="0" smtClean="0">
+              <a:latin typeface="Noto Serif CJK JP" panose="02020400000000000000" charset="-122"/>
+              <a:ea typeface="Noto Serif CJK JP" panose="02020400000000000000" charset="-122"/>
+            </a:endParaRPr>
+          </a:p>
+          <a:p>
+            <a:pPr>
+              <a:lnSpc>
+                <a:spcPct val="150000"/>
+              </a:lnSpc>
+            </a:pPr>
+            <a:endParaRPr lang="en-IN" sz="1800" dirty="0" smtClean="0">
+              <a:latin typeface="Noto Serif CJK JP" panose="02020400000000000000" charset="-122"/>
+              <a:ea typeface="Noto Serif CJK JP" panose="02020400000000000000" charset="-122"/>
+            </a:endParaRPr>
+          </a:p>
+          <a:p>
+            <a:pPr>
+              <a:lnSpc>
+                <a:spcPct val="150000"/>
+              </a:lnSpc>
+            </a:pPr>
+            <a:endParaRPr lang="en-IN" sz="1800" dirty="0" smtClean="0">
+              <a:latin typeface="Noto Serif CJK JP" panose="02020400000000000000" charset="-122"/>
+              <a:ea typeface="Noto Serif CJK JP" panose="02020400000000000000" charset="-122"/>
+            </a:endParaRPr>
+          </a:p>
+          <a:p>
+            <a:pPr>
+              <a:lnSpc>
+                <a:spcPct val="150000"/>
+              </a:lnSpc>
+            </a:pPr>
+            <a:endParaRPr lang="en-IN" sz="1800" dirty="0" smtClean="0">
+              <a:latin typeface="Noto Serif CJK JP" panose="02020400000000000000" charset="-122"/>
+              <a:ea typeface="Noto Serif CJK JP" panose="02020400000000000000" charset="-122"/>
+            </a:endParaRPr>
+          </a:p>
+          <a:p>
+            <a:pPr>
+              <a:lnSpc>
+                <a:spcPct val="150000"/>
+              </a:lnSpc>
+            </a:pPr>
+            <a:r>
+              <a:rPr lang="en-IN" sz="1800" dirty="0" smtClean="0">
+                <a:latin typeface="FreeMono" panose="020F0409020205020404" charset="0"/>
+                <a:ea typeface="FreeMono" panose="020F0409020205020404" charset="0"/>
+              </a:rPr>
+              <a:t>Ω(f(n)) ≥ { g(n) : there exists c &gt; 0 and n0 such that g(n) ≤ c.f(n) for all n &gt; n0. }</a:t>
+            </a:r>
+            <a:endParaRPr lang="en-IN" sz="1800" dirty="0" smtClean="0">
+              <a:latin typeface="FreeMono" panose="020F0409020205020404" charset="0"/>
+              <a:ea typeface="FreeMono" panose="020F0409020205020404" charset="0"/>
+            </a:endParaRPr>
+          </a:p>
+        </p:txBody>
+      </p:sp>
+      <p:pic>
+        <p:nvPicPr>
+          <p:cNvPr id="4" name="Picture 3" descr="omega_notation"/>
+          <p:cNvPicPr>
+            <a:picLocks noChangeAspect="1"/>
+          </p:cNvPicPr>
+          <p:nvPr/>
+        </p:nvPicPr>
+        <p:blipFill>
+          <a:blip r:embed="rId1"/>
+          <a:stretch>
+            <a:fillRect/>
+          </a:stretch>
+        </p:blipFill>
+        <p:spPr>
+          <a:xfrm>
+            <a:off x="4195445" y="2582545"/>
+            <a:ext cx="3799205" cy="2760980"/>
+          </a:xfrm>
+          <a:prstGeom prst="rect">
+            <a:avLst/>
+          </a:prstGeom>
+        </p:spPr>
+      </p:pic>
+    </p:spTree>
+  </p:cSld>
+  <p:clrMapOvr>
+    <a:masterClrMapping/>
+  </p:clrMapOvr>
+  <p:timing>
+    <p:tnLst>
+      <p:par>
+        <p:cTn id="1" dur="indefinite" restart="never" nodeType="tmRoot"/>
+      </p:par>
+    </p:tnLst>
+  </p:timing>
+</p:sld>
+</file>
+
+<file path=ppt/slides/slide11.xml><?xml version="1.0" encoding="utf-8"?>
+<p:sld xmlns:a="http://schemas.openxmlformats.org/drawingml/2006/main" xmlns:r="http://schemas.openxmlformats.org/officeDocument/2006/relationships" xmlns:p="http://schemas.openxmlformats.org/presentationml/2006/main">
+  <p:cSld>
+    <p:spTree>
+      <p:nvGrpSpPr>
+        <p:cNvPr id="1" name=""/>
+        <p:cNvGrpSpPr/>
+        <p:nvPr/>
+      </p:nvGrpSpPr>
+      <p:grpSpPr>
+        <a:xfrm>
+          <a:off x="0" y="0"/>
+          <a:ext cx="0" cy="0"/>
+          <a:chOff x="0" y="0"/>
+          <a:chExt cx="0" cy="0"/>
+        </a:xfrm>
+      </p:grpSpPr>
+      <p:sp>
+        <p:nvSpPr>
+          <p:cNvPr id="2" name="Title 1"/>
+          <p:cNvSpPr>
+            <a:spLocks noGrp="1"/>
+          </p:cNvSpPr>
+          <p:nvPr>
+            <p:ph type="title"/>
+          </p:nvPr>
+        </p:nvSpPr>
+        <p:spPr>
+          <a:xfrm>
+            <a:off x="554355" y="287020"/>
+            <a:ext cx="7772400" cy="1143000"/>
+          </a:xfrm>
+        </p:spPr>
+        <p:txBody>
+          <a:bodyPr/>
+          <a:lstStyle/>
+          <a:p>
+            <a:r>
+              <a:rPr lang="en-US" altLang="en-US" sz="2800" dirty="0">
+                <a:latin typeface="Noto Serif CJK JP" panose="02020400000000000000" charset="-122"/>
+                <a:ea typeface="Noto Serif CJK JP" panose="02020400000000000000" charset="-122"/>
+                <a:sym typeface="+mn-ea"/>
+              </a:rPr>
+              <a:t>Example : </a:t>
+            </a:r>
+            <a:r>
+              <a:rPr lang="en-US" altLang="en-IN" sz="2800" dirty="0">
+                <a:latin typeface="Noto Serif CJK JP" panose="02020400000000000000" charset="-122"/>
+                <a:ea typeface="Noto Serif CJK JP" panose="02020400000000000000" charset="-122"/>
+                <a:sym typeface="+mn-ea"/>
+              </a:rPr>
+              <a:t>Omega Notation, Ω</a:t>
+            </a:r>
+            <a:endParaRPr lang="en-US" altLang="en-IN" sz="2800" dirty="0">
+              <a:latin typeface="Noto Serif CJK JP" panose="02020400000000000000" charset="-122"/>
+              <a:ea typeface="Noto Serif CJK JP" panose="02020400000000000000" charset="-122"/>
+            </a:endParaRPr>
+          </a:p>
+        </p:txBody>
+      </p:sp>
+      <p:sp>
+        <p:nvSpPr>
+          <p:cNvPr id="3" name="Content Placeholder 2"/>
+          <p:cNvSpPr>
+            <a:spLocks noGrp="1"/>
+          </p:cNvSpPr>
+          <p:nvPr>
+            <p:ph idx="1"/>
+          </p:nvPr>
+        </p:nvSpPr>
+        <p:spPr>
+          <a:xfrm>
+            <a:off x="685800" y="1240155"/>
+            <a:ext cx="7772400" cy="3862705"/>
+          </a:xfrm>
+        </p:spPr>
+        <p:txBody>
+          <a:bodyPr/>
+          <a:lstStyle/>
+          <a:p>
+            <a:pPr>
+              <a:lnSpc>
+                <a:spcPct val="150000"/>
+              </a:lnSpc>
+              <a:buFont typeface="Wingdings" panose="05000000000000000000" charset="0"/>
+              <a:buChar char=""/>
+            </a:pPr>
+            <a:r>
+              <a:rPr lang="" altLang="en-IN" sz="1800" dirty="0" smtClean="0">
+                <a:latin typeface="FreeMono" panose="020F0409020205020404" charset="0"/>
+                <a:ea typeface="FreeMono" panose="020F0409020205020404" charset="0"/>
+              </a:rPr>
+              <a:t>L</a:t>
+            </a:r>
+            <a:r>
+              <a:rPr lang="en-IN" sz="1800" dirty="0" smtClean="0">
+                <a:latin typeface="FreeMono" panose="020F0409020205020404" charset="0"/>
+                <a:ea typeface="FreeMono" panose="020F0409020205020404" charset="0"/>
+              </a:rPr>
+              <a:t>et us consider a given function, f(n)=4.n</a:t>
+            </a:r>
+            <a:r>
+              <a:rPr lang="en-IN" sz="1800" baseline="30000" dirty="0" smtClean="0">
+                <a:latin typeface="FreeMono" panose="020F0409020205020404" charset="0"/>
+                <a:ea typeface="FreeMono" panose="020F0409020205020404" charset="0"/>
+              </a:rPr>
+              <a:t>3</a:t>
+            </a:r>
+            <a:r>
+              <a:rPr lang="en-IN" sz="1800" dirty="0" smtClean="0">
+                <a:latin typeface="FreeMono" panose="020F0409020205020404" charset="0"/>
+                <a:ea typeface="FreeMono" panose="020F0409020205020404" charset="0"/>
+              </a:rPr>
+              <a:t>+10.n</a:t>
+            </a:r>
+            <a:r>
+              <a:rPr lang="en-IN" sz="1800" baseline="30000" dirty="0" smtClean="0">
+                <a:latin typeface="FreeMono" panose="020F0409020205020404" charset="0"/>
+                <a:ea typeface="FreeMono" panose="020F0409020205020404" charset="0"/>
+              </a:rPr>
+              <a:t>2</a:t>
+            </a:r>
+            <a:r>
+              <a:rPr lang="en-IN" sz="1800" dirty="0" smtClean="0">
+                <a:latin typeface="FreeMono" panose="020F0409020205020404" charset="0"/>
+                <a:ea typeface="FreeMono" panose="020F0409020205020404" charset="0"/>
+              </a:rPr>
+              <a:t>+5.n+1.</a:t>
+            </a:r>
+            <a:endParaRPr lang="en-IN" sz="1800" dirty="0" smtClean="0">
+              <a:latin typeface="FreeMono" panose="020F0409020205020404" charset="0"/>
+              <a:ea typeface="FreeMono" panose="020F0409020205020404" charset="0"/>
+            </a:endParaRPr>
+          </a:p>
+          <a:p>
+            <a:pPr>
+              <a:lnSpc>
+                <a:spcPct val="150000"/>
+              </a:lnSpc>
+              <a:buFont typeface="Wingdings" panose="05000000000000000000" charset="0"/>
+              <a:buChar char=""/>
+            </a:pPr>
+            <a:endParaRPr lang="en-IN" sz="1800" dirty="0" smtClean="0">
+              <a:latin typeface="FreeMono" panose="020F0409020205020404" charset="0"/>
+              <a:ea typeface="FreeMono" panose="020F0409020205020404" charset="0"/>
+            </a:endParaRPr>
+          </a:p>
+          <a:p>
+            <a:pPr>
+              <a:lnSpc>
+                <a:spcPct val="150000"/>
+              </a:lnSpc>
+              <a:buFont typeface="Wingdings" panose="05000000000000000000" charset="0"/>
+              <a:buChar char=""/>
+            </a:pPr>
+            <a:r>
+              <a:rPr lang="en-IN" sz="1800" dirty="0" smtClean="0">
+                <a:latin typeface="FreeMono" panose="020F0409020205020404" charset="0"/>
+                <a:ea typeface="FreeMono" panose="020F0409020205020404" charset="0"/>
+              </a:rPr>
+              <a:t>Considering g(n)=n</a:t>
+            </a:r>
+            <a:r>
+              <a:rPr lang="en-IN" sz="1800" baseline="30000" dirty="0" smtClean="0">
+                <a:latin typeface="FreeMono" panose="020F0409020205020404" charset="0"/>
+                <a:ea typeface="FreeMono" panose="020F0409020205020404" charset="0"/>
+              </a:rPr>
+              <a:t>3</a:t>
+            </a:r>
+            <a:r>
+              <a:rPr lang="en-IN" sz="1800" dirty="0" smtClean="0">
+                <a:latin typeface="FreeMono" panose="020F0409020205020404" charset="0"/>
+                <a:ea typeface="FreeMono" panose="020F0409020205020404" charset="0"/>
+              </a:rPr>
+              <a:t>, f(n)⩾4.g(n) for all the values of n&gt;0.</a:t>
+            </a:r>
+            <a:endParaRPr lang="en-IN" sz="1800" dirty="0" smtClean="0">
+              <a:latin typeface="FreeMono" panose="020F0409020205020404" charset="0"/>
+              <a:ea typeface="FreeMono" panose="020F0409020205020404" charset="0"/>
+            </a:endParaRPr>
+          </a:p>
+          <a:p>
+            <a:pPr>
+              <a:lnSpc>
+                <a:spcPct val="150000"/>
+              </a:lnSpc>
+              <a:buFont typeface="Wingdings" panose="05000000000000000000" charset="0"/>
+              <a:buChar char=""/>
+            </a:pPr>
+            <a:endParaRPr lang="en-IN" sz="1800" dirty="0" smtClean="0">
+              <a:latin typeface="FreeMono" panose="020F0409020205020404" charset="0"/>
+              <a:ea typeface="FreeMono" panose="020F0409020205020404" charset="0"/>
+            </a:endParaRPr>
+          </a:p>
+          <a:p>
+            <a:pPr>
+              <a:lnSpc>
+                <a:spcPct val="150000"/>
+              </a:lnSpc>
+              <a:buFont typeface="Wingdings" panose="05000000000000000000" charset="0"/>
+              <a:buChar char=""/>
+            </a:pPr>
+            <a:r>
+              <a:rPr lang="en-IN" sz="1800" dirty="0" smtClean="0">
+                <a:latin typeface="FreeMono" panose="020F0409020205020404" charset="0"/>
+                <a:ea typeface="FreeMono" panose="020F0409020205020404" charset="0"/>
+              </a:rPr>
+              <a:t>Hence, the complexity of f(n) can be represented as Ω(g(n)), i.e. Ω(n</a:t>
+            </a:r>
+            <a:r>
+              <a:rPr lang="en-IN" sz="1800" baseline="30000" dirty="0" smtClean="0">
+                <a:latin typeface="FreeMono" panose="020F0409020205020404" charset="0"/>
+                <a:ea typeface="FreeMono" panose="020F0409020205020404" charset="0"/>
+              </a:rPr>
+              <a:t>3</a:t>
+            </a:r>
+            <a:r>
+              <a:rPr lang="en-IN" sz="1800" dirty="0" smtClean="0">
+                <a:latin typeface="FreeMono" panose="020F0409020205020404" charset="0"/>
+                <a:ea typeface="FreeMono" panose="020F0409020205020404" charset="0"/>
+              </a:rPr>
+              <a:t>)</a:t>
+            </a:r>
+            <a:endParaRPr lang="en-IN" sz="1800" dirty="0" smtClean="0">
+              <a:latin typeface="FreeMono" panose="020F0409020205020404" charset="0"/>
+              <a:ea typeface="FreeMono" panose="020F0409020205020404" charset="0"/>
+            </a:endParaRPr>
+          </a:p>
+        </p:txBody>
+      </p:sp>
+    </p:spTree>
+  </p:cSld>
+  <p:clrMapOvr>
+    <a:masterClrMapping/>
+  </p:clrMapOvr>
+  <p:timing>
+    <p:tnLst>
+      <p:par>
+        <p:cTn id="1" dur="indefinite" restart="never" nodeType="tmRoot"/>
+      </p:par>
+    </p:tnLst>
+  </p:timing>
+</p:sld>
+</file>
+
+<file path=ppt/slides/slide12.xml><?xml version="1.0" encoding="utf-8"?>
+<p:sld xmlns:a="http://schemas.openxmlformats.org/drawingml/2006/main" xmlns:r="http://schemas.openxmlformats.org/officeDocument/2006/relationships" xmlns:p="http://schemas.openxmlformats.org/presentationml/2006/main">
+  <p:cSld>
+    <p:spTree>
+      <p:nvGrpSpPr>
+        <p:cNvPr id="1" name=""/>
+        <p:cNvGrpSpPr/>
+        <p:nvPr/>
+      </p:nvGrpSpPr>
+      <p:grpSpPr>
+        <a:xfrm>
+          <a:off x="0" y="0"/>
+          <a:ext cx="0" cy="0"/>
+          <a:chOff x="0" y="0"/>
+          <a:chExt cx="0" cy="0"/>
+        </a:xfrm>
+      </p:grpSpPr>
+      <p:sp>
+        <p:nvSpPr>
+          <p:cNvPr id="2" name="Title 1"/>
+          <p:cNvSpPr>
+            <a:spLocks noGrp="1"/>
+          </p:cNvSpPr>
+          <p:nvPr>
+            <p:ph type="title"/>
+          </p:nvPr>
+        </p:nvSpPr>
+        <p:spPr>
+          <a:xfrm>
+            <a:off x="554355" y="287020"/>
+            <a:ext cx="7772400" cy="1143000"/>
+          </a:xfrm>
+        </p:spPr>
+        <p:txBody>
+          <a:bodyPr/>
+          <a:lstStyle/>
+          <a:p>
+            <a:r>
+              <a:rPr lang="en-US" altLang="en-IN" sz="2800" dirty="0">
+                <a:latin typeface="Noto Serif CJK JP" panose="02020400000000000000" charset="-122"/>
+                <a:ea typeface="Noto Serif CJK JP" panose="02020400000000000000" charset="-122"/>
+              </a:rPr>
               <a:t>Theta Notation, θ</a:t>
             </a:r>
             <a:endParaRPr lang="en-US" altLang="en-IN" sz="2800" dirty="0">
@@ -4724,282 +5174,6 @@
 </p:sld>
 </file>
 
-<file path=ppt/slides/slide11.xml><?xml version="1.0" encoding="utf-8"?>
-<p:sld xmlns:a="http://schemas.openxmlformats.org/drawingml/2006/main" xmlns:r="http://schemas.openxmlformats.org/officeDocument/2006/relationships" xmlns:p="http://schemas.openxmlformats.org/presentationml/2006/main">
-  <p:cSld>
-    <p:spTree>
-      <p:nvGrpSpPr>
-        <p:cNvPr id="1" name=""/>
-        <p:cNvGrpSpPr/>
-        <p:nvPr/>
-      </p:nvGrpSpPr>
-      <p:grpSpPr>
-        <a:xfrm>
-          <a:off x="0" y="0"/>
-          <a:ext cx="0" cy="0"/>
-          <a:chOff x="0" y="0"/>
-          <a:chExt cx="0" cy="0"/>
-        </a:xfrm>
-      </p:grpSpPr>
-      <p:sp>
-        <p:nvSpPr>
-          <p:cNvPr id="2" name="Title 1"/>
-          <p:cNvSpPr>
-            <a:spLocks noGrp="1"/>
-          </p:cNvSpPr>
-          <p:nvPr>
-            <p:ph type="title"/>
-          </p:nvPr>
-        </p:nvSpPr>
-        <p:spPr>
-          <a:xfrm>
-            <a:off x="554355" y="287020"/>
-            <a:ext cx="7772400" cy="1143000"/>
-          </a:xfrm>
-        </p:spPr>
-        <p:txBody>
-          <a:bodyPr/>
-          <a:lstStyle/>
-          <a:p>
-            <a:r>
-              <a:rPr lang="en-US" altLang="en-IN" sz="2800" dirty="0">
-                <a:latin typeface="Noto Serif CJK JP" panose="02020400000000000000" charset="-122"/>
-                <a:ea typeface="Noto Serif CJK JP" panose="02020400000000000000" charset="-122"/>
-              </a:rPr>
-              <a:t>Space Complexity</a:t>
-            </a:r>
-            <a:endParaRPr lang="en-US" altLang="en-IN" sz="2800" dirty="0">
-              <a:latin typeface="Noto Serif CJK JP" panose="02020400000000000000" charset="-122"/>
-              <a:ea typeface="Noto Serif CJK JP" panose="02020400000000000000" charset="-122"/>
-            </a:endParaRPr>
-          </a:p>
-        </p:txBody>
-      </p:sp>
-      <p:sp>
-        <p:nvSpPr>
-          <p:cNvPr id="3" name="Content Placeholder 2"/>
-          <p:cNvSpPr>
-            <a:spLocks noGrp="1"/>
-          </p:cNvSpPr>
-          <p:nvPr>
-            <p:ph idx="1"/>
-          </p:nvPr>
-        </p:nvSpPr>
-        <p:spPr>
-          <a:xfrm>
-            <a:off x="685726" y="1429916"/>
-            <a:ext cx="7772400" cy="4832176"/>
-          </a:xfrm>
-        </p:spPr>
-        <p:txBody>
-          <a:bodyPr/>
-          <a:lstStyle/>
-          <a:p>
-            <a:pPr>
-              <a:lnSpc>
-                <a:spcPct val="200000"/>
-              </a:lnSpc>
-            </a:pPr>
-            <a:endParaRPr lang="en-IN" sz="1800" dirty="0" smtClean="0">
-              <a:latin typeface="Noto Serif CJK JP" panose="02020400000000000000" charset="-122"/>
-              <a:ea typeface="Noto Serif CJK JP" panose="02020400000000000000" charset="-122"/>
-            </a:endParaRPr>
-          </a:p>
-          <a:p>
-            <a:pPr>
-              <a:lnSpc>
-                <a:spcPct val="200000"/>
-              </a:lnSpc>
-            </a:pPr>
-            <a:r>
-              <a:rPr lang="en-IN" sz="1800" dirty="0">
-                <a:latin typeface="Noto Serif CJK JP" panose="02020400000000000000" charset="-122"/>
-                <a:ea typeface="Noto Serif CJK JP" panose="02020400000000000000" charset="-122"/>
-              </a:rPr>
-              <a:t>Space complexity is a function describing the amount of memory (space) an algorithm takes in terms of the amount of input to the algorithm</a:t>
-            </a:r>
-            <a:endParaRPr lang="en-IN" sz="1800" dirty="0">
-              <a:latin typeface="Noto Serif CJK JP" panose="02020400000000000000" charset="-122"/>
-              <a:ea typeface="Noto Serif CJK JP" panose="02020400000000000000" charset="-122"/>
-            </a:endParaRPr>
-          </a:p>
-          <a:p>
-            <a:pPr>
-              <a:lnSpc>
-                <a:spcPct val="200000"/>
-              </a:lnSpc>
-            </a:pPr>
-            <a:r>
-              <a:rPr lang="en-IN" sz="1800" dirty="0">
-                <a:latin typeface="Noto Serif CJK JP" panose="02020400000000000000" charset="-122"/>
-                <a:ea typeface="Noto Serif CJK JP" panose="02020400000000000000" charset="-122"/>
-              </a:rPr>
-              <a:t>Space complexity is sometimes ignored because the space used is minimal and/or obvious, however sometimes it becomes as important issue as time complexity</a:t>
-            </a:r>
-            <a:endParaRPr lang="en-IN" sz="1800" dirty="0">
-              <a:latin typeface="Noto Serif CJK JP" panose="02020400000000000000" charset="-122"/>
-              <a:ea typeface="Noto Serif CJK JP" panose="02020400000000000000" charset="-122"/>
-            </a:endParaRPr>
-          </a:p>
-        </p:txBody>
-      </p:sp>
-    </p:spTree>
-  </p:cSld>
-  <p:clrMapOvr>
-    <a:masterClrMapping/>
-  </p:clrMapOvr>
-  <p:timing>
-    <p:tnLst>
-      <p:par>
-        <p:cTn id="1" dur="indefinite" restart="never" nodeType="tmRoot"/>
-      </p:par>
-    </p:tnLst>
-  </p:timing>
-</p:sld>
-</file>
-
-<file path=ppt/slides/slide12.xml><?xml version="1.0" encoding="utf-8"?>
-<p:sld xmlns:a="http://schemas.openxmlformats.org/drawingml/2006/main" xmlns:r="http://schemas.openxmlformats.org/officeDocument/2006/relationships" xmlns:p="http://schemas.openxmlformats.org/presentationml/2006/main">
-  <p:cSld>
-    <p:spTree>
-      <p:nvGrpSpPr>
-        <p:cNvPr id="1" name=""/>
-        <p:cNvGrpSpPr/>
-        <p:nvPr/>
-      </p:nvGrpSpPr>
-      <p:grpSpPr>
-        <a:xfrm>
-          <a:off x="0" y="0"/>
-          <a:ext cx="0" cy="0"/>
-          <a:chOff x="0" y="0"/>
-          <a:chExt cx="0" cy="0"/>
-        </a:xfrm>
-      </p:grpSpPr>
-      <p:sp>
-        <p:nvSpPr>
-          <p:cNvPr id="2" name="Title 1"/>
-          <p:cNvSpPr>
-            <a:spLocks noGrp="1"/>
-          </p:cNvSpPr>
-          <p:nvPr>
-            <p:ph type="title"/>
-          </p:nvPr>
-        </p:nvSpPr>
-        <p:spPr>
-          <a:xfrm>
-            <a:off x="554355" y="287020"/>
-            <a:ext cx="7772400" cy="1143000"/>
-          </a:xfrm>
-        </p:spPr>
-        <p:txBody>
-          <a:bodyPr/>
-          <a:lstStyle/>
-          <a:p>
-            <a:r>
-              <a:rPr lang="en-US" altLang="en-US" sz="2800" dirty="0">
-                <a:latin typeface="Noto Serif CJK JP" panose="02020400000000000000" charset="-122"/>
-                <a:ea typeface="Noto Serif CJK JP" panose="02020400000000000000" charset="-122"/>
-              </a:rPr>
-              <a:t>Time </a:t>
-            </a:r>
-            <a:r>
-              <a:rPr lang="en-US" altLang="en-IN" sz="2800" dirty="0">
-                <a:latin typeface="Noto Serif CJK JP" panose="02020400000000000000" charset="-122"/>
-                <a:ea typeface="Noto Serif CJK JP" panose="02020400000000000000" charset="-122"/>
-              </a:rPr>
-              <a:t>Complexity</a:t>
-            </a:r>
-            <a:endParaRPr lang="en-US" altLang="en-IN" sz="2800" dirty="0">
-              <a:latin typeface="Noto Serif CJK JP" panose="02020400000000000000" charset="-122"/>
-              <a:ea typeface="Noto Serif CJK JP" panose="02020400000000000000" charset="-122"/>
-            </a:endParaRPr>
-          </a:p>
-        </p:txBody>
-      </p:sp>
-      <p:sp>
-        <p:nvSpPr>
-          <p:cNvPr id="3" name="Content Placeholder 2"/>
-          <p:cNvSpPr>
-            <a:spLocks noGrp="1"/>
-          </p:cNvSpPr>
-          <p:nvPr>
-            <p:ph idx="1"/>
-          </p:nvPr>
-        </p:nvSpPr>
-        <p:spPr>
-          <a:xfrm>
-            <a:off x="685726" y="1429916"/>
-            <a:ext cx="7772400" cy="4832176"/>
-          </a:xfrm>
-        </p:spPr>
-        <p:txBody>
-          <a:bodyPr/>
-          <a:lstStyle/>
-          <a:p>
-            <a:endParaRPr lang="en-IN" sz="1800" dirty="0" smtClean="0">
-              <a:latin typeface="Noto Serif CJK JP" panose="02020400000000000000" charset="-122"/>
-              <a:ea typeface="Noto Serif CJK JP" panose="02020400000000000000" charset="-122"/>
-            </a:endParaRPr>
-          </a:p>
-          <a:p>
-            <a:pPr>
-              <a:lnSpc>
-                <a:spcPct val="200000"/>
-              </a:lnSpc>
-            </a:pPr>
-            <a:r>
-              <a:rPr lang="en-IN" sz="1800" dirty="0">
-                <a:latin typeface="Noto Serif CJK JP" panose="02020400000000000000" charset="-122"/>
-                <a:ea typeface="Noto Serif CJK JP" panose="02020400000000000000" charset="-122"/>
-              </a:rPr>
-              <a:t>It’s a function describing the amount of time required to run an algorithm in terms of the size of the input. "</a:t>
-            </a:r>
-            <a:endParaRPr lang="en-IN" sz="1800" dirty="0">
-              <a:latin typeface="Noto Serif CJK JP" panose="02020400000000000000" charset="-122"/>
-              <a:ea typeface="Noto Serif CJK JP" panose="02020400000000000000" charset="-122"/>
-            </a:endParaRPr>
-          </a:p>
-          <a:p>
-            <a:pPr>
-              <a:lnSpc>
-                <a:spcPct val="200000"/>
-              </a:lnSpc>
-            </a:pPr>
-            <a:r>
-              <a:rPr lang="en-IN" sz="1800" dirty="0">
-                <a:latin typeface="Noto Serif CJK JP" panose="02020400000000000000" charset="-122"/>
-                <a:ea typeface="Noto Serif CJK JP" panose="02020400000000000000" charset="-122"/>
-              </a:rPr>
-              <a:t>Time" can mean the number of memory accesses performed, the number of comparisons between integers, the number of times some inner loop is executed, or some other natural unit related to the amount of real time the algorithm will take.</a:t>
-            </a:r>
-            <a:endParaRPr lang="en-IN" sz="1800" dirty="0">
-              <a:latin typeface="Noto Serif CJK JP" panose="02020400000000000000" charset="-122"/>
-              <a:ea typeface="Noto Serif CJK JP" panose="02020400000000000000" charset="-122"/>
-            </a:endParaRPr>
-          </a:p>
-          <a:p>
-            <a:endParaRPr lang="en-IN" sz="1800" dirty="0">
-              <a:latin typeface="Noto Serif CJK JP" panose="02020400000000000000" charset="-122"/>
-              <a:ea typeface="Noto Serif CJK JP" panose="02020400000000000000" charset="-122"/>
-            </a:endParaRPr>
-          </a:p>
-        </p:txBody>
-      </p:sp>
-    </p:spTree>
-  </p:cSld>
-  <p:clrMapOvr>
-    <a:masterClrMapping/>
-  </p:clrMapOvr>
-  <p:timing>
-    <p:tnLst>
-      <p:par>
-        <p:cTn id="1" dur="indefinite" restart="never" nodeType="tmRoot"/>
-      </p:par>
-    </p:tnLst>
-  </p:timing>
-</p:sld>
-</file>
-
 <file path=ppt/slides/slide13.xml><?xml version="1.0" encoding="utf-8"?>
 <p:sld xmlns:a="http://schemas.openxmlformats.org/drawingml/2006/main" xmlns:r="http://schemas.openxmlformats.org/officeDocument/2006/relationships" xmlns:p="http://schemas.openxmlformats.org/presentationml/2006/main">
   <p:cSld>
@@ -5038,11 +5212,20 @@
           <a:lstStyle/>
           <a:p>
             <a:r>
+              <a:rPr lang="" altLang="en-US" sz="2800" dirty="0">
+                <a:latin typeface="Noto Serif CJK JP" panose="02020400000000000000" charset="-122"/>
+                <a:ea typeface="Noto Serif CJK JP" panose="02020400000000000000" charset="-122"/>
+                <a:sym typeface="+mn-ea"/>
+              </a:rPr>
+              <a:t>Example : </a:t>
+            </a:r>
+            <a:r>
               <a:rPr lang="en-US" altLang="en-IN" sz="2800" dirty="0">
                 <a:latin typeface="Noto Serif CJK JP" panose="02020400000000000000" charset="-122"/>
                 <a:ea typeface="Noto Serif CJK JP" panose="02020400000000000000" charset="-122"/>
-              </a:rPr>
-              <a:t>Apriori and Apostiari Analysis</a:t>
+                <a:sym typeface="+mn-ea"/>
+              </a:rPr>
+              <a:t>Theta Notation, θ</a:t>
             </a:r>
             <a:endParaRPr lang="en-US" altLang="en-IN" sz="2800" dirty="0">
               <a:latin typeface="Noto Serif CJK JP" panose="02020400000000000000" charset="-122"/>
@@ -5063,8 +5246,8 @@
         </p:nvSpPr>
         <p:spPr>
           <a:xfrm>
-            <a:off x="685726" y="1527071"/>
-            <a:ext cx="7772400" cy="4832176"/>
+            <a:off x="685800" y="1240155"/>
+            <a:ext cx="7772400" cy="3862705"/>
           </a:xfrm>
         </p:spPr>
         <p:txBody>
@@ -5075,53 +5258,94 @@
               <a:lnSpc>
                 <a:spcPct val="150000"/>
               </a:lnSpc>
+              <a:buFont typeface="Wingdings" panose="05000000000000000000" charset="0"/>
+              <a:buChar char=""/>
             </a:pPr>
             <a:r>
               <a:rPr lang="en-IN" sz="1800" dirty="0" smtClean="0">
-                <a:latin typeface="Noto Serif CJK JP" panose="02020400000000000000" charset="-122"/>
-                <a:ea typeface="Noto Serif CJK JP" panose="02020400000000000000" charset="-122"/>
-              </a:rPr>
-              <a:t>Apriori analysis means, analysis is performed prior to running it on a specific system. </a:t>
+                <a:latin typeface="FreeMono" panose="020F0409020205020404" charset="0"/>
+                <a:ea typeface="FreeMono" panose="020F0409020205020404" charset="0"/>
+              </a:rPr>
+              <a:t>Let us consider a given function, f(n)=4.n</a:t>
+            </a:r>
+            <a:r>
+              <a:rPr lang="en-IN" sz="1800" baseline="30000" dirty="0" smtClean="0">
+                <a:latin typeface="FreeMono" panose="020F0409020205020404" charset="0"/>
+                <a:ea typeface="FreeMono" panose="020F0409020205020404" charset="0"/>
+              </a:rPr>
+              <a:t>3</a:t>
+            </a:r>
+            <a:r>
+              <a:rPr lang="en-IN" sz="1800" dirty="0" smtClean="0">
+                <a:latin typeface="FreeMono" panose="020F0409020205020404" charset="0"/>
+                <a:ea typeface="FreeMono" panose="020F0409020205020404" charset="0"/>
+              </a:rPr>
+              <a:t>+10.n</a:t>
+            </a:r>
+            <a:r>
+              <a:rPr lang="en-IN" sz="1800" baseline="30000" dirty="0" smtClean="0">
+                <a:latin typeface="FreeMono" panose="020F0409020205020404" charset="0"/>
+                <a:ea typeface="FreeMono" panose="020F0409020205020404" charset="0"/>
+              </a:rPr>
+              <a:t>2</a:t>
+            </a:r>
+            <a:r>
+              <a:rPr lang="en-IN" sz="1800" dirty="0" smtClean="0">
+                <a:latin typeface="FreeMono" panose="020F0409020205020404" charset="0"/>
+                <a:ea typeface="FreeMono" panose="020F0409020205020404" charset="0"/>
+              </a:rPr>
+              <a:t>+5.n+1</a:t>
             </a:r>
             <a:endParaRPr lang="en-IN" sz="1800" dirty="0" smtClean="0">
-              <a:latin typeface="Noto Serif CJK JP" panose="02020400000000000000" charset="-122"/>
-              <a:ea typeface="Noto Serif CJK JP" panose="02020400000000000000" charset="-122"/>
-            </a:endParaRPr>
-          </a:p>
-          <a:p>
-            <a:pPr lvl="1">
+              <a:latin typeface="FreeMono" panose="020F0409020205020404" charset="0"/>
+              <a:ea typeface="FreeMono" panose="020F0409020205020404" charset="0"/>
+            </a:endParaRPr>
+          </a:p>
+          <a:p>
+            <a:pPr>
               <a:lnSpc>
                 <a:spcPct val="150000"/>
               </a:lnSpc>
-            </a:pPr>
-            <a:r>
-              <a:rPr lang="en-IN" sz="1575" dirty="0" smtClean="0">
-                <a:latin typeface="Noto Serif CJK JP" panose="02020400000000000000" charset="-122"/>
-                <a:ea typeface="Noto Serif CJK JP" panose="02020400000000000000" charset="-122"/>
-              </a:rPr>
-              <a:t>This analysis is a stage where a function is defined using some theoretical model.</a:t>
-            </a:r>
-            <a:endParaRPr lang="en-IN" sz="1575" dirty="0" smtClean="0">
-              <a:latin typeface="Noto Serif CJK JP" panose="02020400000000000000" charset="-122"/>
-              <a:ea typeface="Noto Serif CJK JP" panose="02020400000000000000" charset="-122"/>
-            </a:endParaRPr>
-          </a:p>
-          <a:p>
-            <a:pPr lvl="1">
+              <a:buFont typeface="Wingdings" panose="05000000000000000000" charset="0"/>
+              <a:buChar char=""/>
+            </a:pPr>
+            <a:r>
+              <a:rPr lang="en-IN" sz="1800" dirty="0" smtClean="0">
+                <a:latin typeface="FreeMono" panose="020F0409020205020404" charset="0"/>
+                <a:ea typeface="FreeMono" panose="020F0409020205020404" charset="0"/>
+              </a:rPr>
+              <a:t>Considering g(n)=n</a:t>
+            </a:r>
+            <a:r>
+              <a:rPr lang="en-IN" sz="1800" baseline="30000" dirty="0" smtClean="0">
+                <a:latin typeface="FreeMono" panose="020F0409020205020404" charset="0"/>
+                <a:ea typeface="FreeMono" panose="020F0409020205020404" charset="0"/>
+              </a:rPr>
+              <a:t>3</a:t>
+            </a:r>
+            <a:r>
+              <a:rPr lang="en-IN" sz="1800" dirty="0" smtClean="0">
+                <a:latin typeface="FreeMono" panose="020F0409020205020404" charset="0"/>
+                <a:ea typeface="FreeMono" panose="020F0409020205020404" charset="0"/>
+              </a:rPr>
+              <a:t>, 4.g(n)⩽f(n)⩽5.g(n) for all the large values of n.</a:t>
+            </a:r>
+            <a:endParaRPr lang="en-IN" sz="1800" dirty="0" smtClean="0">
+              <a:latin typeface="FreeMono" panose="020F0409020205020404" charset="0"/>
+              <a:ea typeface="FreeMono" panose="020F0409020205020404" charset="0"/>
+            </a:endParaRPr>
+          </a:p>
+          <a:p>
+            <a:pPr>
               <a:lnSpc>
                 <a:spcPct val="150000"/>
               </a:lnSpc>
-            </a:pPr>
-            <a:r>
-              <a:rPr lang="en-IN" sz="1575" dirty="0" smtClean="0">
-                <a:latin typeface="Noto Serif CJK JP" panose="02020400000000000000" charset="-122"/>
-                <a:ea typeface="Noto Serif CJK JP" panose="02020400000000000000" charset="-122"/>
-              </a:rPr>
-              <a:t> Hence, we determine the time and space complexity of an algorithm by just looking at the algorithm rather than running it on a particular system with a different memory, processor, and compiler.</a:t>
-            </a:r>
-            <a:endParaRPr lang="en-IN" sz="1575" dirty="0" smtClean="0">
-              <a:latin typeface="Noto Serif CJK JP" panose="02020400000000000000" charset="-122"/>
-              <a:ea typeface="Noto Serif CJK JP" panose="02020400000000000000" charset="-122"/>
+              <a:buFont typeface="Wingdings" panose="05000000000000000000" charset="0"/>
+              <a:buChar char=""/>
+            </a:pPr>
+            <a:endParaRPr lang="en-IN" sz="1800" dirty="0" smtClean="0">
+              <a:latin typeface="FreeMono" panose="020F0409020205020404" charset="0"/>
+              <a:ea typeface="FreeMono" panose="020F0409020205020404" charset="0"/>
             </a:endParaRPr>
           </a:p>
           <a:p>
@@ -5129,46 +5353,33 @@
               <a:lnSpc>
                 <a:spcPct val="150000"/>
               </a:lnSpc>
-            </a:pPr>
+              <a:buFont typeface="Wingdings" panose="05000000000000000000" charset="0"/>
+              <a:buChar char=""/>
+            </a:pPr>
+            <a:r>
+              <a:rPr lang="en-IN" sz="1800" dirty="0" smtClean="0">
+                <a:latin typeface="FreeMono" panose="020F0409020205020404" charset="0"/>
+                <a:ea typeface="FreeMono" panose="020F0409020205020404" charset="0"/>
+              </a:rPr>
+              <a:t>Hence, the complexity of f(n) can be represented as θ(g(n)), i.e. θ(n</a:t>
+            </a:r>
+            <a:r>
+              <a:rPr lang="en-IN" sz="1800" baseline="30000" dirty="0" smtClean="0">
+                <a:latin typeface="FreeMono" panose="020F0409020205020404" charset="0"/>
+                <a:ea typeface="FreeMono" panose="020F0409020205020404" charset="0"/>
+              </a:rPr>
+              <a:t>3</a:t>
+            </a:r>
+            <a:r>
+              <a:rPr lang="en-IN" sz="1800" dirty="0" smtClean="0">
+                <a:latin typeface="FreeMono" panose="020F0409020205020404" charset="0"/>
+                <a:ea typeface="FreeMono" panose="020F0409020205020404" charset="0"/>
+              </a:rPr>
+              <a:t>).</a:t>
+            </a:r>
             <a:endParaRPr lang="en-IN" sz="1800" dirty="0" smtClean="0">
-              <a:latin typeface="Noto Serif CJK JP" panose="02020400000000000000" charset="-122"/>
-              <a:ea typeface="Noto Serif CJK JP" panose="02020400000000000000" charset="-122"/>
-            </a:endParaRPr>
-          </a:p>
-          <a:p>
-            <a:pPr>
-              <a:lnSpc>
-                <a:spcPct val="150000"/>
-              </a:lnSpc>
-            </a:pPr>
-            <a:r>
-              <a:rPr lang="en-IN" sz="1800" dirty="0" smtClean="0">
-                <a:latin typeface="Noto Serif CJK JP" panose="02020400000000000000" charset="-122"/>
-                <a:ea typeface="Noto Serif CJK JP" panose="02020400000000000000" charset="-122"/>
-              </a:rPr>
-              <a:t>Apostiari analysis of an algorithm means we perform analysis of an algorithm only after running it on a system. </a:t>
-            </a:r>
-            <a:endParaRPr lang="en-IN" sz="1800" dirty="0" smtClean="0">
-              <a:latin typeface="Noto Serif CJK JP" panose="02020400000000000000" charset="-122"/>
-              <a:ea typeface="Noto Serif CJK JP" panose="02020400000000000000" charset="-122"/>
-            </a:endParaRPr>
-          </a:p>
-          <a:p>
-            <a:pPr lvl="1">
-              <a:lnSpc>
-                <a:spcPct val="150000"/>
-              </a:lnSpc>
-            </a:pPr>
-            <a:r>
-              <a:rPr lang="en-IN" sz="1575" dirty="0" smtClean="0">
-                <a:latin typeface="Noto Serif CJK JP" panose="02020400000000000000" charset="-122"/>
-                <a:ea typeface="Noto Serif CJK JP" panose="02020400000000000000" charset="-122"/>
-              </a:rPr>
-              <a:t>It directly depends on the system and changes from system to system.</a:t>
-            </a:r>
-            <a:endParaRPr lang="en-IN" sz="1575" dirty="0" smtClean="0">
-              <a:latin typeface="Noto Serif CJK JP" panose="02020400000000000000" charset="-122"/>
-              <a:ea typeface="Noto Serif CJK JP" panose="02020400000000000000" charset="-122"/>
+              <a:latin typeface="FreeMono" panose="020F0409020205020404" charset="0"/>
+              <a:ea typeface="FreeMono" panose="020F0409020205020404" charset="0"/>
             </a:endParaRPr>
           </a:p>
         </p:txBody>
@@ -5197,6 +5408,470 @@
         <p:cNvGrpSpPr/>
         <p:nvPr/>
       </p:nvGrpSpPr>
+      <p:grpSpPr>
+        <a:xfrm>
+          <a:off x="0" y="0"/>
+          <a:ext cx="0" cy="0"/>
+          <a:chOff x="0" y="0"/>
+          <a:chExt cx="0" cy="0"/>
+        </a:xfrm>
+      </p:grpSpPr>
+      <p:sp>
+        <p:nvSpPr>
+          <p:cNvPr id="2" name="Title 1"/>
+          <p:cNvSpPr>
+            <a:spLocks noGrp="1"/>
+          </p:cNvSpPr>
+          <p:nvPr>
+            <p:ph type="title"/>
+          </p:nvPr>
+        </p:nvSpPr>
+        <p:spPr>
+          <a:xfrm>
+            <a:off x="554355" y="287020"/>
+            <a:ext cx="7772400" cy="1143000"/>
+          </a:xfrm>
+        </p:spPr>
+        <p:txBody>
+          <a:bodyPr/>
+          <a:lstStyle/>
+          <a:p>
+            <a:r>
+              <a:rPr lang="en-US" altLang="en-IN" sz="2800" dirty="0">
+                <a:latin typeface="Noto Serif CJK JP" panose="02020400000000000000" charset="-122"/>
+                <a:ea typeface="Noto Serif CJK JP" panose="02020400000000000000" charset="-122"/>
+              </a:rPr>
+              <a:t>Space Complexity</a:t>
+            </a:r>
+            <a:endParaRPr lang="en-US" altLang="en-IN" sz="2800" dirty="0">
+              <a:latin typeface="Noto Serif CJK JP" panose="02020400000000000000" charset="-122"/>
+              <a:ea typeface="Noto Serif CJK JP" panose="02020400000000000000" charset="-122"/>
+            </a:endParaRPr>
+          </a:p>
+        </p:txBody>
+      </p:sp>
+      <p:sp>
+        <p:nvSpPr>
+          <p:cNvPr id="3" name="Content Placeholder 2"/>
+          <p:cNvSpPr>
+            <a:spLocks noGrp="1"/>
+          </p:cNvSpPr>
+          <p:nvPr>
+            <p:ph idx="1"/>
+          </p:nvPr>
+        </p:nvSpPr>
+        <p:spPr>
+          <a:xfrm>
+            <a:off x="685726" y="1429916"/>
+            <a:ext cx="7772400" cy="4832176"/>
+          </a:xfrm>
+        </p:spPr>
+        <p:txBody>
+          <a:bodyPr/>
+          <a:lstStyle/>
+          <a:p>
+            <a:pPr>
+              <a:lnSpc>
+                <a:spcPct val="200000"/>
+              </a:lnSpc>
+            </a:pPr>
+            <a:endParaRPr lang="en-IN" sz="1800" dirty="0" smtClean="0">
+              <a:latin typeface="Noto Serif CJK JP" panose="02020400000000000000" charset="-122"/>
+              <a:ea typeface="Noto Serif CJK JP" panose="02020400000000000000" charset="-122"/>
+            </a:endParaRPr>
+          </a:p>
+          <a:p>
+            <a:pPr>
+              <a:lnSpc>
+                <a:spcPct val="200000"/>
+              </a:lnSpc>
+            </a:pPr>
+            <a:r>
+              <a:rPr lang="en-IN" sz="1800" dirty="0">
+                <a:latin typeface="Noto Serif CJK JP" panose="02020400000000000000" charset="-122"/>
+                <a:ea typeface="Noto Serif CJK JP" panose="02020400000000000000" charset="-122"/>
+              </a:rPr>
+              <a:t>Space complexity is a function describing the amount of memory (space) an algorithm takes in terms of the amount of input to the algorithm</a:t>
+            </a:r>
+            <a:endParaRPr lang="en-IN" sz="1800" dirty="0">
+              <a:latin typeface="Noto Serif CJK JP" panose="02020400000000000000" charset="-122"/>
+              <a:ea typeface="Noto Serif CJK JP" panose="02020400000000000000" charset="-122"/>
+            </a:endParaRPr>
+          </a:p>
+          <a:p>
+            <a:pPr>
+              <a:lnSpc>
+                <a:spcPct val="200000"/>
+              </a:lnSpc>
+            </a:pPr>
+            <a:r>
+              <a:rPr lang="en-IN" sz="1800" dirty="0">
+                <a:latin typeface="Noto Serif CJK JP" panose="02020400000000000000" charset="-122"/>
+                <a:ea typeface="Noto Serif CJK JP" panose="02020400000000000000" charset="-122"/>
+              </a:rPr>
+              <a:t>Space complexity is sometimes ignored because the space used is minimal and/or obvious, however sometimes it becomes as important issue as time complexity</a:t>
+            </a:r>
+            <a:endParaRPr lang="en-IN" sz="1800" dirty="0">
+              <a:latin typeface="Noto Serif CJK JP" panose="02020400000000000000" charset="-122"/>
+              <a:ea typeface="Noto Serif CJK JP" panose="02020400000000000000" charset="-122"/>
+            </a:endParaRPr>
+          </a:p>
+        </p:txBody>
+      </p:sp>
+    </p:spTree>
+  </p:cSld>
+  <p:clrMapOvr>
+    <a:masterClrMapping/>
+  </p:clrMapOvr>
+  <p:timing>
+    <p:tnLst>
+      <p:par>
+        <p:cTn id="1" dur="indefinite" restart="never" nodeType="tmRoot"/>
+      </p:par>
+    </p:tnLst>
+  </p:timing>
+</p:sld>
+</file>
+
+<file path=ppt/slides/slide15.xml><?xml version="1.0" encoding="utf-8"?>
+<p:sld xmlns:a="http://schemas.openxmlformats.org/drawingml/2006/main" xmlns:r="http://schemas.openxmlformats.org/officeDocument/2006/relationships" xmlns:p="http://schemas.openxmlformats.org/presentationml/2006/main">
+  <p:cSld>
+    <p:spTree>
+      <p:nvGrpSpPr>
+        <p:cNvPr id="1" name=""/>
+        <p:cNvGrpSpPr/>
+        <p:nvPr/>
+      </p:nvGrpSpPr>
+      <p:grpSpPr>
+        <a:xfrm>
+          <a:off x="0" y="0"/>
+          <a:ext cx="0" cy="0"/>
+          <a:chOff x="0" y="0"/>
+          <a:chExt cx="0" cy="0"/>
+        </a:xfrm>
+      </p:grpSpPr>
+      <p:sp>
+        <p:nvSpPr>
+          <p:cNvPr id="2" name="Title 1"/>
+          <p:cNvSpPr>
+            <a:spLocks noGrp="1"/>
+          </p:cNvSpPr>
+          <p:nvPr>
+            <p:ph type="title"/>
+          </p:nvPr>
+        </p:nvSpPr>
+        <p:spPr>
+          <a:xfrm>
+            <a:off x="554355" y="287020"/>
+            <a:ext cx="7772400" cy="1143000"/>
+          </a:xfrm>
+        </p:spPr>
+        <p:txBody>
+          <a:bodyPr/>
+          <a:lstStyle/>
+          <a:p>
+            <a:r>
+              <a:rPr lang="en-US" altLang="en-US" sz="2800" dirty="0">
+                <a:latin typeface="Noto Serif CJK JP" panose="02020400000000000000" charset="-122"/>
+                <a:ea typeface="Noto Serif CJK JP" panose="02020400000000000000" charset="-122"/>
+              </a:rPr>
+              <a:t>Time </a:t>
+            </a:r>
+            <a:r>
+              <a:rPr lang="en-US" altLang="en-IN" sz="2800" dirty="0">
+                <a:latin typeface="Noto Serif CJK JP" panose="02020400000000000000" charset="-122"/>
+                <a:ea typeface="Noto Serif CJK JP" panose="02020400000000000000" charset="-122"/>
+              </a:rPr>
+              <a:t>Complexity</a:t>
+            </a:r>
+            <a:endParaRPr lang="en-US" altLang="en-IN" sz="2800" dirty="0">
+              <a:latin typeface="Noto Serif CJK JP" panose="02020400000000000000" charset="-122"/>
+              <a:ea typeface="Noto Serif CJK JP" panose="02020400000000000000" charset="-122"/>
+            </a:endParaRPr>
+          </a:p>
+        </p:txBody>
+      </p:sp>
+      <p:sp>
+        <p:nvSpPr>
+          <p:cNvPr id="3" name="Content Placeholder 2"/>
+          <p:cNvSpPr>
+            <a:spLocks noGrp="1"/>
+          </p:cNvSpPr>
+          <p:nvPr>
+            <p:ph idx="1"/>
+          </p:nvPr>
+        </p:nvSpPr>
+        <p:spPr>
+          <a:xfrm>
+            <a:off x="685726" y="1429916"/>
+            <a:ext cx="7772400" cy="4832176"/>
+          </a:xfrm>
+        </p:spPr>
+        <p:txBody>
+          <a:bodyPr/>
+          <a:lstStyle/>
+          <a:p>
+            <a:endParaRPr lang="en-IN" sz="1800" dirty="0" smtClean="0">
+              <a:latin typeface="Noto Serif CJK JP" panose="02020400000000000000" charset="-122"/>
+              <a:ea typeface="Noto Serif CJK JP" panose="02020400000000000000" charset="-122"/>
+            </a:endParaRPr>
+          </a:p>
+          <a:p>
+            <a:pPr>
+              <a:lnSpc>
+                <a:spcPct val="200000"/>
+              </a:lnSpc>
+            </a:pPr>
+            <a:r>
+              <a:rPr lang="en-IN" sz="1800" dirty="0">
+                <a:latin typeface="Noto Serif CJK JP" panose="02020400000000000000" charset="-122"/>
+                <a:ea typeface="Noto Serif CJK JP" panose="02020400000000000000" charset="-122"/>
+              </a:rPr>
+              <a:t>It’s a function describing the amount of time required to run an algorithm in terms of the size of the input. "</a:t>
+            </a:r>
+            <a:endParaRPr lang="en-IN" sz="1800" dirty="0">
+              <a:latin typeface="Noto Serif CJK JP" panose="02020400000000000000" charset="-122"/>
+              <a:ea typeface="Noto Serif CJK JP" panose="02020400000000000000" charset="-122"/>
+            </a:endParaRPr>
+          </a:p>
+          <a:p>
+            <a:pPr>
+              <a:lnSpc>
+                <a:spcPct val="200000"/>
+              </a:lnSpc>
+            </a:pPr>
+            <a:r>
+              <a:rPr lang="en-IN" sz="1800" dirty="0">
+                <a:latin typeface="Noto Serif CJK JP" panose="02020400000000000000" charset="-122"/>
+                <a:ea typeface="Noto Serif CJK JP" panose="02020400000000000000" charset="-122"/>
+              </a:rPr>
+              <a:t>Time" can mean the number of memory accesses performed, the number of comparisons between integers, the number of times some inner loop is executed, or some other natural unit related to the amount of real time the algorithm will take.</a:t>
+            </a:r>
+            <a:endParaRPr lang="en-IN" sz="1800" dirty="0">
+              <a:latin typeface="Noto Serif CJK JP" panose="02020400000000000000" charset="-122"/>
+              <a:ea typeface="Noto Serif CJK JP" panose="02020400000000000000" charset="-122"/>
+            </a:endParaRPr>
+          </a:p>
+          <a:p>
+            <a:endParaRPr lang="en-IN" sz="1800" dirty="0">
+              <a:latin typeface="Noto Serif CJK JP" panose="02020400000000000000" charset="-122"/>
+              <a:ea typeface="Noto Serif CJK JP" panose="02020400000000000000" charset="-122"/>
+            </a:endParaRPr>
+          </a:p>
+        </p:txBody>
+      </p:sp>
+    </p:spTree>
+  </p:cSld>
+  <p:clrMapOvr>
+    <a:masterClrMapping/>
+  </p:clrMapOvr>
+  <p:timing>
+    <p:tnLst>
+      <p:par>
+        <p:cTn id="1" dur="indefinite" restart="never" nodeType="tmRoot"/>
+      </p:par>
+    </p:tnLst>
+  </p:timing>
+</p:sld>
+</file>
+
+<file path=ppt/slides/slide16.xml><?xml version="1.0" encoding="utf-8"?>
+<p:sld xmlns:a="http://schemas.openxmlformats.org/drawingml/2006/main" xmlns:r="http://schemas.openxmlformats.org/officeDocument/2006/relationships" xmlns:p="http://schemas.openxmlformats.org/presentationml/2006/main">
+  <p:cSld>
+    <p:spTree>
+      <p:nvGrpSpPr>
+        <p:cNvPr id="1" name=""/>
+        <p:cNvGrpSpPr/>
+        <p:nvPr/>
+      </p:nvGrpSpPr>
+      <p:grpSpPr>
+        <a:xfrm>
+          <a:off x="0" y="0"/>
+          <a:ext cx="0" cy="0"/>
+          <a:chOff x="0" y="0"/>
+          <a:chExt cx="0" cy="0"/>
+        </a:xfrm>
+      </p:grpSpPr>
+      <p:sp>
+        <p:nvSpPr>
+          <p:cNvPr id="2" name="Title 1"/>
+          <p:cNvSpPr>
+            <a:spLocks noGrp="1"/>
+          </p:cNvSpPr>
+          <p:nvPr>
+            <p:ph type="title"/>
+          </p:nvPr>
+        </p:nvSpPr>
+        <p:spPr>
+          <a:xfrm>
+            <a:off x="554355" y="287020"/>
+            <a:ext cx="7772400" cy="1143000"/>
+          </a:xfrm>
+        </p:spPr>
+        <p:txBody>
+          <a:bodyPr/>
+          <a:lstStyle/>
+          <a:p>
+            <a:r>
+              <a:rPr lang="en-US" altLang="en-IN" sz="2800" dirty="0">
+                <a:latin typeface="Noto Serif CJK JP" panose="02020400000000000000" charset="-122"/>
+                <a:ea typeface="Noto Serif CJK JP" panose="02020400000000000000" charset="-122"/>
+              </a:rPr>
+              <a:t>Apriori and Apostiari Analysis</a:t>
+            </a:r>
+            <a:endParaRPr lang="en-US" altLang="en-IN" sz="2800" dirty="0">
+              <a:latin typeface="Noto Serif CJK JP" panose="02020400000000000000" charset="-122"/>
+              <a:ea typeface="Noto Serif CJK JP" panose="02020400000000000000" charset="-122"/>
+            </a:endParaRPr>
+          </a:p>
+        </p:txBody>
+      </p:sp>
+      <p:sp>
+        <p:nvSpPr>
+          <p:cNvPr id="3" name="Content Placeholder 2"/>
+          <p:cNvSpPr>
+            <a:spLocks noGrp="1"/>
+          </p:cNvSpPr>
+          <p:nvPr>
+            <p:ph idx="1"/>
+          </p:nvPr>
+        </p:nvSpPr>
+        <p:spPr>
+          <a:xfrm>
+            <a:off x="685726" y="1527071"/>
+            <a:ext cx="7772400" cy="4832176"/>
+          </a:xfrm>
+        </p:spPr>
+        <p:txBody>
+          <a:bodyPr/>
+          <a:lstStyle/>
+          <a:p>
+            <a:pPr>
+              <a:lnSpc>
+                <a:spcPct val="150000"/>
+              </a:lnSpc>
+            </a:pPr>
+            <a:r>
+              <a:rPr lang="en-IN" sz="1800" dirty="0" smtClean="0">
+                <a:latin typeface="Noto Serif CJK JP" panose="02020400000000000000" charset="-122"/>
+                <a:ea typeface="Noto Serif CJK JP" panose="02020400000000000000" charset="-122"/>
+              </a:rPr>
+              <a:t>Apriori analysis means, analysis is performed prior to running it on a specific system. </a:t>
+            </a:r>
+            <a:endParaRPr lang="en-IN" sz="1800" dirty="0" smtClean="0">
+              <a:latin typeface="Noto Serif CJK JP" panose="02020400000000000000" charset="-122"/>
+              <a:ea typeface="Noto Serif CJK JP" panose="02020400000000000000" charset="-122"/>
+            </a:endParaRPr>
+          </a:p>
+          <a:p>
+            <a:pPr lvl="1">
+              <a:lnSpc>
+                <a:spcPct val="150000"/>
+              </a:lnSpc>
+            </a:pPr>
+            <a:r>
+              <a:rPr lang="en-IN" sz="1575" dirty="0" smtClean="0">
+                <a:latin typeface="Noto Serif CJK JP" panose="02020400000000000000" charset="-122"/>
+                <a:ea typeface="Noto Serif CJK JP" panose="02020400000000000000" charset="-122"/>
+              </a:rPr>
+              <a:t>This analysis is a stage where a function is defined using some theoretical model.</a:t>
+            </a:r>
+            <a:endParaRPr lang="en-IN" sz="1575" dirty="0" smtClean="0">
+              <a:latin typeface="Noto Serif CJK JP" panose="02020400000000000000" charset="-122"/>
+              <a:ea typeface="Noto Serif CJK JP" panose="02020400000000000000" charset="-122"/>
+            </a:endParaRPr>
+          </a:p>
+          <a:p>
+            <a:pPr lvl="1">
+              <a:lnSpc>
+                <a:spcPct val="150000"/>
+              </a:lnSpc>
+            </a:pPr>
+            <a:r>
+              <a:rPr lang="en-IN" sz="1575" dirty="0" smtClean="0">
+                <a:latin typeface="Noto Serif CJK JP" panose="02020400000000000000" charset="-122"/>
+                <a:ea typeface="Noto Serif CJK JP" panose="02020400000000000000" charset="-122"/>
+              </a:rPr>
+              <a:t> Hence, we determine the time and space complexity of an algorithm by just looking at the algorithm rather than running it on a particular system with a different memory, processor, and compiler.</a:t>
+            </a:r>
+            <a:endParaRPr lang="en-IN" sz="1575" dirty="0" smtClean="0">
+              <a:latin typeface="Noto Serif CJK JP" panose="02020400000000000000" charset="-122"/>
+              <a:ea typeface="Noto Serif CJK JP" panose="02020400000000000000" charset="-122"/>
+            </a:endParaRPr>
+          </a:p>
+          <a:p>
+            <a:pPr>
+              <a:lnSpc>
+                <a:spcPct val="150000"/>
+              </a:lnSpc>
+            </a:pPr>
+            <a:endParaRPr lang="en-IN" sz="1800" dirty="0" smtClean="0">
+              <a:latin typeface="Noto Serif CJK JP" panose="02020400000000000000" charset="-122"/>
+              <a:ea typeface="Noto Serif CJK JP" panose="02020400000000000000" charset="-122"/>
+            </a:endParaRPr>
+          </a:p>
+          <a:p>
+            <a:pPr>
+              <a:lnSpc>
+                <a:spcPct val="150000"/>
+              </a:lnSpc>
+            </a:pPr>
+            <a:r>
+              <a:rPr lang="en-IN" sz="1800" dirty="0" smtClean="0">
+                <a:latin typeface="Noto Serif CJK JP" panose="02020400000000000000" charset="-122"/>
+                <a:ea typeface="Noto Serif CJK JP" panose="02020400000000000000" charset="-122"/>
+              </a:rPr>
+              <a:t>Apostiari analysis of an algorithm means we perform analysis of an algorithm only after running it on a system. </a:t>
+            </a:r>
+            <a:endParaRPr lang="en-IN" sz="1800" dirty="0" smtClean="0">
+              <a:latin typeface="Noto Serif CJK JP" panose="02020400000000000000" charset="-122"/>
+              <a:ea typeface="Noto Serif CJK JP" panose="02020400000000000000" charset="-122"/>
+            </a:endParaRPr>
+          </a:p>
+          <a:p>
+            <a:pPr lvl="1">
+              <a:lnSpc>
+                <a:spcPct val="150000"/>
+              </a:lnSpc>
+            </a:pPr>
+            <a:r>
+              <a:rPr lang="en-IN" sz="1575" dirty="0" smtClean="0">
+                <a:latin typeface="Noto Serif CJK JP" panose="02020400000000000000" charset="-122"/>
+                <a:ea typeface="Noto Serif CJK JP" panose="02020400000000000000" charset="-122"/>
+              </a:rPr>
+              <a:t>It directly depends on the system and changes from system to system.</a:t>
+            </a:r>
+            <a:endParaRPr lang="en-IN" sz="1575" dirty="0" smtClean="0">
+              <a:latin typeface="Noto Serif CJK JP" panose="02020400000000000000" charset="-122"/>
+              <a:ea typeface="Noto Serif CJK JP" panose="02020400000000000000" charset="-122"/>
+            </a:endParaRPr>
+          </a:p>
+        </p:txBody>
+      </p:sp>
+    </p:spTree>
+  </p:cSld>
+  <p:clrMapOvr>
+    <a:masterClrMapping/>
+  </p:clrMapOvr>
+  <p:timing>
+    <p:tnLst>
+      <p:par>
+        <p:cTn id="1" dur="indefinite" restart="never" nodeType="tmRoot"/>
+      </p:par>
+    </p:tnLst>
+  </p:timing>
+</p:sld>
+</file>
+
+<file path=ppt/slides/slide17.xml><?xml version="1.0" encoding="utf-8"?>
+<p:sld xmlns:a="http://schemas.openxmlformats.org/drawingml/2006/main" xmlns:r="http://schemas.openxmlformats.org/officeDocument/2006/relationships" xmlns:p="http://schemas.openxmlformats.org/presentationml/2006/main">
+  <p:cSld>
+    <p:spTree>
+      <p:nvGrpSpPr>
+        <p:cNvPr id="1" name=""/>
+        <p:cNvGrpSpPr/>
+        <p:nvPr/>
+      </p:nvGrpSpPr>
       <p:grpSpPr/>
       <p:sp>
         <p:nvSpPr>
@@ -5398,7 +6073,7 @@
 </p:sld>
 </file>
 
-<file path=ppt/slides/slide15.xml><?xml version="1.0" encoding="utf-8"?>
+<file path=ppt/slides/slide18.xml><?xml version="1.0" encoding="utf-8"?>
 <p:sld xmlns:a="http://schemas.openxmlformats.org/drawingml/2006/main" xmlns:r="http://schemas.openxmlformats.org/officeDocument/2006/relationships" xmlns:p="http://schemas.openxmlformats.org/presentationml/2006/main">
   <p:cSld>
     <p:spTree>
@@ -5475,7 +6150,7 @@
 </p:sld>
 </file>
 
-<file path=ppt/slides/slide16.xml><?xml version="1.0" encoding="utf-8"?>
+<file path=ppt/slides/slide19.xml><?xml version="1.0" encoding="utf-8"?>
 <p:sld xmlns:a="http://schemas.openxmlformats.org/drawingml/2006/main" xmlns:r="http://schemas.openxmlformats.org/officeDocument/2006/relationships" xmlns:p="http://schemas.openxmlformats.org/presentationml/2006/main">
   <p:cSld>
     <p:spTree>
@@ -5726,809 +6401,6 @@
 </p:sld>
 </file>
 
-<file path=ppt/slides/slide17.xml><?xml version="1.0" encoding="utf-8"?>
-<p:sld xmlns:a="http://schemas.openxmlformats.org/drawingml/2006/main" xmlns:r="http://schemas.openxmlformats.org/officeDocument/2006/relationships" xmlns:p="http://schemas.openxmlformats.org/presentationml/2006/main">
-  <p:cSld>
-    <p:spTree>
-      <p:nvGrpSpPr>
-        <p:cNvPr id="1" name=""/>
-        <p:cNvGrpSpPr/>
-        <p:nvPr/>
-      </p:nvGrpSpPr>
-      <p:grpSpPr/>
-      <p:sp>
-        <p:nvSpPr>
-          <p:cNvPr id="2" name="Title 1"/>
-          <p:cNvSpPr>
-            <a:spLocks noGrp="1"/>
-          </p:cNvSpPr>
-          <p:nvPr>
-            <p:ph type="title"/>
-          </p:nvPr>
-        </p:nvSpPr>
-        <p:spPr>
-          <a:xfrm>
-            <a:off x="685800" y="306705"/>
-            <a:ext cx="7772400" cy="688975"/>
-          </a:xfrm>
-        </p:spPr>
-        <p:txBody>
-          <a:bodyPr/>
-          <a:p>
-            <a:r>
-              <a:rPr lang="en-US" altLang="en-US" sz="2800">
-                <a:latin typeface="Noto Serif CJK JP" panose="02020400000000000000" charset="-122"/>
-                <a:ea typeface="Noto Serif CJK JP" panose="02020400000000000000" charset="-122"/>
-              </a:rPr>
-              <a:t>Array - Accessing Element</a:t>
-            </a:r>
-            <a:endParaRPr lang="en-US" altLang="en-US" sz="2800">
-              <a:latin typeface="Noto Serif CJK JP" panose="02020400000000000000" charset="-122"/>
-              <a:ea typeface="Noto Serif CJK JP" panose="02020400000000000000" charset="-122"/>
-            </a:endParaRPr>
-          </a:p>
-        </p:txBody>
-      </p:sp>
-      <p:sp>
-        <p:nvSpPr>
-          <p:cNvPr id="3" name="Content Placeholder 2"/>
-          <p:cNvSpPr>
-            <a:spLocks noGrp="1"/>
-          </p:cNvSpPr>
-          <p:nvPr>
-            <p:ph idx="1"/>
-          </p:nvPr>
-        </p:nvSpPr>
-        <p:spPr>
-          <a:xfrm>
-            <a:off x="685800" y="1449705"/>
-            <a:ext cx="7772400" cy="4969510"/>
-          </a:xfrm>
-        </p:spPr>
-        <p:txBody>
-          <a:bodyPr/>
-          <a:p>
-            <a:pPr>
-              <a:lnSpc>
-                <a:spcPct val="130000"/>
-              </a:lnSpc>
-            </a:pPr>
-            <a:r>
-              <a:rPr lang="en-US" altLang="en-US" sz="1800">
-                <a:latin typeface="Noto Serif CJK JP" panose="02020400000000000000" charset="-122"/>
-                <a:ea typeface="Noto Serif CJK JP" panose="02020400000000000000" charset="-122"/>
-              </a:rPr>
-              <a:t>accessed using an index number</a:t>
-            </a:r>
-            <a:endParaRPr lang="en-US" altLang="en-US" sz="1800">
-              <a:latin typeface="Noto Serif CJK JP" panose="02020400000000000000" charset="-122"/>
-              <a:ea typeface="Noto Serif CJK JP" panose="02020400000000000000" charset="-122"/>
-            </a:endParaRPr>
-          </a:p>
-          <a:p>
-            <a:pPr>
-              <a:lnSpc>
-                <a:spcPct val="130000"/>
-              </a:lnSpc>
-            </a:pPr>
-            <a:r>
-              <a:rPr lang="en-US" altLang="en-US" sz="1800">
-                <a:latin typeface="Noto Serif CJK JP" panose="02020400000000000000" charset="-122"/>
-                <a:ea typeface="Noto Serif CJK JP" panose="02020400000000000000" charset="-122"/>
-              </a:rPr>
-              <a:t>first element is numbered 0, so that the indices in an array of 10 elements run from 0 to 9.</a:t>
-            </a:r>
-            <a:endParaRPr lang="en-US" altLang="en-US" sz="1800">
-              <a:latin typeface="Noto Serif CJK JP" panose="02020400000000000000" charset="-122"/>
-              <a:ea typeface="Noto Serif CJK JP" panose="02020400000000000000" charset="-122"/>
-            </a:endParaRPr>
-          </a:p>
-          <a:p>
-            <a:pPr>
-              <a:lnSpc>
-                <a:spcPct val="130000"/>
-              </a:lnSpc>
-            </a:pPr>
-            <a:r>
-              <a:rPr lang="en-US" altLang="en-US" sz="1800">
-                <a:latin typeface="Noto Serif CJK JP" panose="02020400000000000000" charset="-122"/>
-                <a:ea typeface="Noto Serif CJK JP" panose="02020400000000000000" charset="-122"/>
-              </a:rPr>
-              <a:t>Complexity : O(1)</a:t>
-            </a:r>
-            <a:endParaRPr lang="en-US" altLang="en-US" sz="1800">
-              <a:latin typeface="Noto Serif CJK JP" panose="02020400000000000000" charset="-122"/>
-              <a:ea typeface="Noto Serif CJK JP" panose="02020400000000000000" charset="-122"/>
-            </a:endParaRPr>
-          </a:p>
-          <a:p>
-            <a:endParaRPr lang="en-US" altLang="en-US" sz="1800">
-              <a:latin typeface="Noto Serif CJK JP" panose="02020400000000000000" charset="-122"/>
-              <a:ea typeface="Noto Serif CJK JP" panose="02020400000000000000" charset="-122"/>
-            </a:endParaRPr>
-          </a:p>
-          <a:p>
-            <a:endParaRPr lang="en-US" altLang="en-US" sz="1800">
-              <a:latin typeface="Noto Serif CJK JP" panose="02020400000000000000" charset="-122"/>
-              <a:ea typeface="Noto Serif CJK JP" panose="02020400000000000000" charset="-122"/>
-            </a:endParaRPr>
-          </a:p>
-          <a:p>
-            <a:endParaRPr lang="en-US" altLang="en-US" sz="1800">
-              <a:latin typeface="Noto Serif CJK JP" panose="02020400000000000000" charset="-122"/>
-              <a:ea typeface="Noto Serif CJK JP" panose="02020400000000000000" charset="-122"/>
-            </a:endParaRPr>
-          </a:p>
-        </p:txBody>
-      </p:sp>
-      <p:sp>
-        <p:nvSpPr>
-          <p:cNvPr id="4" name="Text Box 3"/>
-          <p:cNvSpPr txBox="1"/>
-          <p:nvPr/>
-        </p:nvSpPr>
-        <p:spPr>
-          <a:xfrm>
-            <a:off x="2526665" y="4083685"/>
-            <a:ext cx="3211195" cy="368300"/>
-          </a:xfrm>
-          <a:prstGeom prst="rect">
-            <a:avLst/>
-          </a:prstGeom>
-          <a:noFill/>
-          <a:ln w="12700" cmpd="sng">
-            <a:solidFill>
-              <a:schemeClr val="accent1">
-                <a:shade val="50000"/>
-              </a:schemeClr>
-            </a:solidFill>
-            <a:prstDash val="solid"/>
-          </a:ln>
-        </p:spPr>
-        <p:txBody>
-          <a:bodyPr wrap="square" rtlCol="0">
-            <a:spAutoFit/>
-          </a:bodyPr>
-          <a:p>
-            <a:r>
-              <a:rPr lang="en-US">
-                <a:latin typeface="FreeMono" panose="020F0409020205020404" charset="0"/>
-                <a:ea typeface="FreeMono" panose="020F0409020205020404" charset="0"/>
-                <a:cs typeface="Noto Sans Mono CJK JP" panose="020B0500000000000000" charset="-122"/>
-              </a:rPr>
-              <a:t>temp = </a:t>
-            </a:r>
-            <a:r>
-              <a:rPr lang="en-US" altLang="en-US">
-                <a:latin typeface="FreeMono" panose="020F0409020205020404" charset="0"/>
-                <a:ea typeface="FreeMono" panose="020F0409020205020404" charset="0"/>
-                <a:cs typeface="Noto Sans Mono CJK JP" panose="020B0500000000000000" charset="-122"/>
-                <a:sym typeface="+mn-ea"/>
-              </a:rPr>
-              <a:t>myArray</a:t>
-            </a:r>
-            <a:r>
-              <a:rPr lang="en-US">
-                <a:latin typeface="FreeMono" panose="020F0409020205020404" charset="0"/>
-                <a:ea typeface="FreeMono" panose="020F0409020205020404" charset="0"/>
-                <a:cs typeface="Noto Sans Mono CJK JP" panose="020B0500000000000000" charset="-122"/>
-              </a:rPr>
-              <a:t>[3];   </a:t>
-            </a:r>
-            <a:endParaRPr lang="en-US">
-              <a:latin typeface="FreeMono" panose="020F0409020205020404" charset="0"/>
-              <a:ea typeface="FreeMono" panose="020F0409020205020404" charset="0"/>
-              <a:cs typeface="Noto Sans Mono CJK JP" panose="020B0500000000000000" charset="-122"/>
-            </a:endParaRPr>
-          </a:p>
-        </p:txBody>
-      </p:sp>
-    </p:spTree>
-  </p:cSld>
-  <p:clrMapOvr>
-    <a:masterClrMapping/>
-  </p:clrMapOvr>
-</p:sld>
-</file>
-
-<file path=ppt/slides/slide18.xml><?xml version="1.0" encoding="utf-8"?>
-<p:sld xmlns:a="http://schemas.openxmlformats.org/drawingml/2006/main" xmlns:r="http://schemas.openxmlformats.org/officeDocument/2006/relationships" xmlns:p="http://schemas.openxmlformats.org/presentationml/2006/main">
-  <p:cSld>
-    <p:spTree>
-      <p:nvGrpSpPr>
-        <p:cNvPr id="1" name=""/>
-        <p:cNvGrpSpPr/>
-        <p:nvPr/>
-      </p:nvGrpSpPr>
-      <p:grpSpPr/>
-      <p:sp>
-        <p:nvSpPr>
-          <p:cNvPr id="2" name="Title 1"/>
-          <p:cNvSpPr>
-            <a:spLocks noGrp="1"/>
-          </p:cNvSpPr>
-          <p:nvPr>
-            <p:ph type="title"/>
-          </p:nvPr>
-        </p:nvSpPr>
-        <p:spPr>
-          <a:xfrm>
-            <a:off x="685800" y="306705"/>
-            <a:ext cx="7772400" cy="688975"/>
-          </a:xfrm>
-        </p:spPr>
-        <p:txBody>
-          <a:bodyPr/>
-          <a:p>
-            <a:r>
-              <a:rPr lang="en-US" altLang="en-US" sz="2800">
-                <a:latin typeface="Noto Serif CJK JP" panose="02020400000000000000" charset="-122"/>
-                <a:ea typeface="Noto Serif CJK JP" panose="02020400000000000000" charset="-122"/>
-              </a:rPr>
-              <a:t>Array - Insertion of Element</a:t>
-            </a:r>
-            <a:endParaRPr lang="en-US" altLang="en-US" sz="2800">
-              <a:latin typeface="Noto Serif CJK JP" panose="02020400000000000000" charset="-122"/>
-              <a:ea typeface="Noto Serif CJK JP" panose="02020400000000000000" charset="-122"/>
-            </a:endParaRPr>
-          </a:p>
-        </p:txBody>
-      </p:sp>
-      <p:sp>
-        <p:nvSpPr>
-          <p:cNvPr id="3" name="Content Placeholder 2"/>
-          <p:cNvSpPr>
-            <a:spLocks noGrp="1"/>
-          </p:cNvSpPr>
-          <p:nvPr>
-            <p:ph idx="1"/>
-          </p:nvPr>
-        </p:nvSpPr>
-        <p:spPr>
-          <a:xfrm>
-            <a:off x="685800" y="1449705"/>
-            <a:ext cx="7772400" cy="4969510"/>
-          </a:xfrm>
-        </p:spPr>
-        <p:txBody>
-          <a:bodyPr/>
-          <a:p>
-            <a:pPr marL="0" indent="0">
-              <a:buNone/>
-            </a:pPr>
-            <a:endParaRPr lang="en-US" altLang="en-US" sz="1800">
-              <a:latin typeface="Noto Serif CJK JP" panose="02020400000000000000" charset="-122"/>
-              <a:ea typeface="Noto Serif CJK JP" panose="02020400000000000000" charset="-122"/>
-            </a:endParaRPr>
-          </a:p>
-          <a:p>
-            <a:r>
-              <a:rPr lang="en-US" altLang="en-US" sz="1800">
-                <a:latin typeface="Noto Serif CJK JP" panose="02020400000000000000" charset="-122"/>
-                <a:ea typeface="Noto Serif CJK JP" panose="02020400000000000000" charset="-122"/>
-              </a:rPr>
-              <a:t>Unsorted </a:t>
-            </a:r>
-            <a:endParaRPr lang="en-US" altLang="en-US" sz="1800">
-              <a:latin typeface="Noto Serif CJK JP" panose="02020400000000000000" charset="-122"/>
-              <a:ea typeface="Noto Serif CJK JP" panose="02020400000000000000" charset="-122"/>
-            </a:endParaRPr>
-          </a:p>
-          <a:p>
-            <a:pPr lvl="1"/>
-            <a:r>
-              <a:rPr lang="en-US" altLang="en-US" sz="1800">
-                <a:latin typeface="Noto Serif CJK JP" panose="02020400000000000000" charset="-122"/>
-                <a:ea typeface="Noto Serif CJK JP" panose="02020400000000000000" charset="-122"/>
-              </a:rPr>
-              <a:t>Keep track of number of elements in array - nElts</a:t>
-            </a:r>
-            <a:endParaRPr lang="en-US" altLang="en-US" sz="1800">
-              <a:latin typeface="Noto Serif CJK JP" panose="02020400000000000000" charset="-122"/>
-              <a:ea typeface="Noto Serif CJK JP" panose="02020400000000000000" charset="-122"/>
-            </a:endParaRPr>
-          </a:p>
-          <a:p>
-            <a:pPr lvl="1"/>
-            <a:r>
-              <a:rPr lang="en-US" altLang="en-US" sz="1800">
-                <a:latin typeface="Noto Serif CJK JP" panose="02020400000000000000" charset="-122"/>
-                <a:ea typeface="Noto Serif CJK JP" panose="02020400000000000000" charset="-122"/>
-              </a:rPr>
-              <a:t>Insert using index and Increment the tracking object</a:t>
-            </a:r>
-            <a:endParaRPr lang="en-US" altLang="en-US" sz="1800">
-              <a:latin typeface="Noto Serif CJK JP" panose="02020400000000000000" charset="-122"/>
-              <a:ea typeface="Noto Serif CJK JP" panose="02020400000000000000" charset="-122"/>
-            </a:endParaRPr>
-          </a:p>
-          <a:p>
-            <a:pPr lvl="1"/>
-            <a:r>
-              <a:rPr lang="en-US" altLang="en-US" sz="1800">
-                <a:latin typeface="Noto Serif CJK JP" panose="02020400000000000000" charset="-122"/>
-                <a:ea typeface="Noto Serif CJK JP" panose="02020400000000000000" charset="-122"/>
-              </a:rPr>
-              <a:t>Complexity : O(1)</a:t>
-            </a:r>
-            <a:endParaRPr lang="en-US" altLang="en-US" sz="1800">
-              <a:latin typeface="Noto Serif CJK JP" panose="02020400000000000000" charset="-122"/>
-              <a:ea typeface="Noto Serif CJK JP" panose="02020400000000000000" charset="-122"/>
-            </a:endParaRPr>
-          </a:p>
-          <a:p>
-            <a:r>
-              <a:rPr lang="en-US" altLang="en-US" sz="1800">
-                <a:latin typeface="Noto Serif CJK JP" panose="02020400000000000000" charset="-122"/>
-                <a:ea typeface="Noto Serif CJK JP" panose="02020400000000000000" charset="-122"/>
-              </a:rPr>
-              <a:t>Sorted</a:t>
-            </a:r>
-            <a:endParaRPr lang="en-US" altLang="en-US" sz="1800">
-              <a:latin typeface="Noto Serif CJK JP" panose="02020400000000000000" charset="-122"/>
-              <a:ea typeface="Noto Serif CJK JP" panose="02020400000000000000" charset="-122"/>
-            </a:endParaRPr>
-          </a:p>
-          <a:p>
-            <a:pPr lvl="1"/>
-            <a:r>
-              <a:rPr lang="en-US" altLang="en-US" sz="1800">
-                <a:latin typeface="Noto Serif CJK JP" panose="02020400000000000000" charset="-122"/>
-                <a:ea typeface="Noto Serif CJK JP" panose="02020400000000000000" charset="-122"/>
-              </a:rPr>
-              <a:t>Requires Searching for the postion</a:t>
-            </a:r>
-            <a:endParaRPr lang="en-US" altLang="en-US" sz="1800">
-              <a:latin typeface="Noto Serif CJK JP" panose="02020400000000000000" charset="-122"/>
-              <a:ea typeface="Noto Serif CJK JP" panose="02020400000000000000" charset="-122"/>
-            </a:endParaRPr>
-          </a:p>
-          <a:p>
-            <a:pPr lvl="1"/>
-            <a:r>
-              <a:rPr lang="en-US" altLang="en-US" sz="1800">
-                <a:latin typeface="Noto Serif CJK JP" panose="02020400000000000000" charset="-122"/>
-                <a:ea typeface="Noto Serif CJK JP" panose="02020400000000000000" charset="-122"/>
-              </a:rPr>
-              <a:t>Shifting the elements to make the specfied postion to be vacant.</a:t>
-            </a:r>
-            <a:endParaRPr lang="en-US" altLang="en-US" sz="1800">
-              <a:latin typeface="Noto Serif CJK JP" panose="02020400000000000000" charset="-122"/>
-              <a:ea typeface="Noto Serif CJK JP" panose="02020400000000000000" charset="-122"/>
-            </a:endParaRPr>
-          </a:p>
-          <a:p>
-            <a:pPr lvl="1"/>
-            <a:r>
-              <a:rPr lang="en-US" altLang="en-US" sz="1800">
-                <a:latin typeface="Noto Serif CJK JP" panose="02020400000000000000" charset="-122"/>
-                <a:ea typeface="Noto Serif CJK JP" panose="02020400000000000000" charset="-122"/>
-                <a:sym typeface="+mn-ea"/>
-              </a:rPr>
-              <a:t>Complexity : O(N</a:t>
-            </a:r>
-            <a:r>
-              <a:rPr lang="en-US" altLang="en-US" sz="1800" baseline="30000">
-                <a:latin typeface="Noto Serif CJK JP" panose="02020400000000000000" charset="-122"/>
-                <a:ea typeface="Noto Serif CJK JP" panose="02020400000000000000" charset="-122"/>
-                <a:sym typeface="+mn-ea"/>
-              </a:rPr>
-              <a:t>2</a:t>
-            </a:r>
-            <a:r>
-              <a:rPr lang="en-US" altLang="en-US" sz="1800">
-                <a:latin typeface="Noto Serif CJK JP" panose="02020400000000000000" charset="-122"/>
-                <a:ea typeface="Noto Serif CJK JP" panose="02020400000000000000" charset="-122"/>
-                <a:sym typeface="+mn-ea"/>
-              </a:rPr>
-              <a:t>)</a:t>
-            </a:r>
-            <a:endParaRPr lang="en-US" altLang="en-US" sz="1800">
-              <a:latin typeface="Noto Serif CJK JP" panose="02020400000000000000" charset="-122"/>
-              <a:ea typeface="Noto Serif CJK JP" panose="02020400000000000000" charset="-122"/>
-            </a:endParaRPr>
-          </a:p>
-          <a:p>
-            <a:pPr marL="457200" lvl="1" indent="0">
-              <a:buNone/>
-            </a:pPr>
-            <a:endParaRPr lang="en-US" altLang="en-US" sz="1800">
-              <a:latin typeface="Noto Serif CJK JP" panose="02020400000000000000" charset="-122"/>
-              <a:ea typeface="Noto Serif CJK JP" panose="02020400000000000000" charset="-122"/>
-            </a:endParaRPr>
-          </a:p>
-        </p:txBody>
-      </p:sp>
-      <p:sp>
-        <p:nvSpPr>
-          <p:cNvPr id="4" name="Text Box 3"/>
-          <p:cNvSpPr txBox="1"/>
-          <p:nvPr/>
-        </p:nvSpPr>
-        <p:spPr>
-          <a:xfrm>
-            <a:off x="4707890" y="4962525"/>
-            <a:ext cx="3211195" cy="1198880"/>
-          </a:xfrm>
-          <a:prstGeom prst="rect">
-            <a:avLst/>
-          </a:prstGeom>
-          <a:noFill/>
-          <a:ln w="12700" cmpd="sng">
-            <a:solidFill>
-              <a:schemeClr val="accent1">
-                <a:shade val="50000"/>
-              </a:schemeClr>
-            </a:solidFill>
-            <a:prstDash val="solid"/>
-          </a:ln>
-        </p:spPr>
-        <p:txBody>
-          <a:bodyPr wrap="square" rtlCol="0">
-            <a:spAutoFit/>
-          </a:bodyPr>
-          <a:p>
-            <a:r>
-              <a:rPr lang="en-US">
-                <a:latin typeface="FreeMono" panose="020F0409020205020404" charset="0"/>
-                <a:ea typeface="FreeMono" panose="020F0409020205020404" charset="0"/>
-                <a:cs typeface="Noto Sans Mono CJK JP" panose="020B0500000000000000" charset="-122"/>
-              </a:rPr>
-              <a:t>arr[0] = 77</a:t>
-            </a:r>
-            <a:endParaRPr lang="en-US">
-              <a:latin typeface="FreeMono" panose="020F0409020205020404" charset="0"/>
-              <a:ea typeface="FreeMono" panose="020F0409020205020404" charset="0"/>
-              <a:cs typeface="Noto Sans Mono CJK JP" panose="020B0500000000000000" charset="-122"/>
-            </a:endParaRPr>
-          </a:p>
-          <a:p>
-            <a:endParaRPr lang="en-US">
-              <a:latin typeface="FreeMono" panose="020F0409020205020404" charset="0"/>
-              <a:ea typeface="FreeMono" panose="020F0409020205020404" charset="0"/>
-              <a:cs typeface="Noto Sans Mono CJK JP" panose="020B0500000000000000" charset="-122"/>
-            </a:endParaRPr>
-          </a:p>
-          <a:p>
-            <a:r>
-              <a:rPr lang="en-US" altLang="en-US">
-                <a:latin typeface="FreeMono" panose="020F0409020205020404" charset="0"/>
-                <a:ea typeface="FreeMono" panose="020F0409020205020404" charset="0"/>
-                <a:cs typeface="Noto Sans Mono CJK JP" panose="020B0500000000000000" charset="-122"/>
-              </a:rPr>
-              <a:t>arr[</a:t>
-            </a:r>
-            <a:r>
-              <a:rPr lang="en-US" altLang="en-US">
-                <a:latin typeface="Noto Serif CJK JP" panose="02020400000000000000" charset="-122"/>
-                <a:ea typeface="Noto Serif CJK JP" panose="02020400000000000000" charset="-122"/>
-                <a:sym typeface="+mn-ea"/>
-              </a:rPr>
-              <a:t>nElts] = 12</a:t>
-            </a:r>
-            <a:endParaRPr lang="en-US" altLang="en-US">
-              <a:latin typeface="Noto Serif CJK JP" panose="02020400000000000000" charset="-122"/>
-              <a:ea typeface="Noto Serif CJK JP" panose="02020400000000000000" charset="-122"/>
-              <a:sym typeface="+mn-ea"/>
-            </a:endParaRPr>
-          </a:p>
-          <a:p>
-            <a:r>
-              <a:rPr lang="en-US" altLang="en-US">
-                <a:latin typeface="Noto Serif CJK JP" panose="02020400000000000000" charset="-122"/>
-                <a:ea typeface="Noto Serif CJK JP" panose="02020400000000000000" charset="-122"/>
-                <a:sym typeface="+mn-ea"/>
-              </a:rPr>
-              <a:t>nElts = nElts +1</a:t>
-            </a:r>
-            <a:endParaRPr lang="en-US" altLang="en-US">
-              <a:latin typeface="Noto Serif CJK JP" panose="02020400000000000000" charset="-122"/>
-              <a:ea typeface="Noto Serif CJK JP" panose="02020400000000000000" charset="-122"/>
-              <a:cs typeface="Noto Sans Mono CJK JP" panose="020B0500000000000000" charset="-122"/>
-              <a:sym typeface="+mn-ea"/>
-            </a:endParaRPr>
-          </a:p>
-        </p:txBody>
-      </p:sp>
-    </p:spTree>
-  </p:cSld>
-  <p:clrMapOvr>
-    <a:masterClrMapping/>
-  </p:clrMapOvr>
-</p:sld>
-</file>
-
-<file path=ppt/slides/slide19.xml><?xml version="1.0" encoding="utf-8"?>
-<p:sld xmlns:a="http://schemas.openxmlformats.org/drawingml/2006/main" xmlns:r="http://schemas.openxmlformats.org/officeDocument/2006/relationships" xmlns:p="http://schemas.openxmlformats.org/presentationml/2006/main">
-  <p:cSld>
-    <p:spTree>
-      <p:nvGrpSpPr>
-        <p:cNvPr id="1" name=""/>
-        <p:cNvGrpSpPr/>
-        <p:nvPr/>
-      </p:nvGrpSpPr>
-      <p:grpSpPr/>
-      <p:sp>
-        <p:nvSpPr>
-          <p:cNvPr id="2" name="Title 1"/>
-          <p:cNvSpPr>
-            <a:spLocks noGrp="1"/>
-          </p:cNvSpPr>
-          <p:nvPr>
-            <p:ph type="title"/>
-          </p:nvPr>
-        </p:nvSpPr>
-        <p:spPr>
-          <a:xfrm>
-            <a:off x="685800" y="306705"/>
-            <a:ext cx="7772400" cy="688975"/>
-          </a:xfrm>
-        </p:spPr>
-        <p:txBody>
-          <a:bodyPr/>
-          <a:p>
-            <a:r>
-              <a:rPr lang="en-US" altLang="en-US" sz="2800">
-                <a:latin typeface="Noto Serif CJK JP" panose="02020400000000000000" charset="-122"/>
-                <a:ea typeface="Noto Serif CJK JP" panose="02020400000000000000" charset="-122"/>
-              </a:rPr>
-              <a:t>Deletion of Element</a:t>
-            </a:r>
-            <a:endParaRPr lang="en-US" altLang="en-US" sz="2800">
-              <a:latin typeface="Noto Serif CJK JP" panose="02020400000000000000" charset="-122"/>
-              <a:ea typeface="Noto Serif CJK JP" panose="02020400000000000000" charset="-122"/>
-            </a:endParaRPr>
-          </a:p>
-        </p:txBody>
-      </p:sp>
-      <p:sp>
-        <p:nvSpPr>
-          <p:cNvPr id="3" name="Content Placeholder 2"/>
-          <p:cNvSpPr>
-            <a:spLocks noGrp="1"/>
-          </p:cNvSpPr>
-          <p:nvPr>
-            <p:ph idx="1"/>
-          </p:nvPr>
-        </p:nvSpPr>
-        <p:spPr>
-          <a:xfrm>
-            <a:off x="685800" y="1449705"/>
-            <a:ext cx="7772400" cy="4969510"/>
-          </a:xfrm>
-        </p:spPr>
-        <p:txBody>
-          <a:bodyPr/>
-          <a:p>
-            <a:r>
-              <a:rPr lang="en-US" altLang="en-US" sz="1800">
-                <a:latin typeface="Noto Serif CJK JP" panose="02020400000000000000" charset="-122"/>
-                <a:ea typeface="Noto Serif CJK JP" panose="02020400000000000000" charset="-122"/>
-              </a:rPr>
-              <a:t>Begins with a search for the specified item</a:t>
-            </a:r>
-            <a:endParaRPr lang="en-US" altLang="en-US" sz="1800">
-              <a:latin typeface="Noto Serif CJK JP" panose="02020400000000000000" charset="-122"/>
-              <a:ea typeface="Noto Serif CJK JP" panose="02020400000000000000" charset="-122"/>
-            </a:endParaRPr>
-          </a:p>
-          <a:p>
-            <a:r>
-              <a:rPr lang="en-US" altLang="en-US" sz="1800">
-                <a:latin typeface="Noto Serif CJK JP" panose="02020400000000000000" charset="-122"/>
-                <a:ea typeface="Noto Serif CJK JP" panose="02020400000000000000" charset="-122"/>
-              </a:rPr>
-              <a:t>When we find it, we move all the items with higher index values down one element to fill in the “hole” left by the deleted element</a:t>
-            </a:r>
-            <a:endParaRPr lang="en-US" altLang="en-US" sz="1800">
-              <a:latin typeface="Noto Serif CJK JP" panose="02020400000000000000" charset="-122"/>
-              <a:ea typeface="Noto Serif CJK JP" panose="02020400000000000000" charset="-122"/>
-            </a:endParaRPr>
-          </a:p>
-          <a:p>
-            <a:r>
-              <a:rPr lang="en-US" altLang="en-US" sz="1800">
-                <a:latin typeface="Noto Serif CJK JP" panose="02020400000000000000" charset="-122"/>
-                <a:ea typeface="Noto Serif CJK JP" panose="02020400000000000000" charset="-122"/>
-              </a:rPr>
-              <a:t>decrement nElems</a:t>
-            </a:r>
-            <a:endParaRPr lang="en-US" altLang="en-US" sz="1800">
-              <a:latin typeface="Noto Serif CJK JP" panose="02020400000000000000" charset="-122"/>
-              <a:ea typeface="Noto Serif CJK JP" panose="02020400000000000000" charset="-122"/>
-            </a:endParaRPr>
-          </a:p>
-        </p:txBody>
-      </p:sp>
-      <p:sp>
-        <p:nvSpPr>
-          <p:cNvPr id="4" name="Text Box 3"/>
-          <p:cNvSpPr txBox="1"/>
-          <p:nvPr/>
-        </p:nvSpPr>
-        <p:spPr>
-          <a:xfrm>
-            <a:off x="950595" y="3834765"/>
-            <a:ext cx="7781925" cy="2584450"/>
-          </a:xfrm>
-          <a:prstGeom prst="rect">
-            <a:avLst/>
-          </a:prstGeom>
-          <a:noFill/>
-          <a:ln w="12700" cmpd="sng">
-            <a:solidFill>
-              <a:schemeClr val="accent1">
-                <a:shade val="50000"/>
-              </a:schemeClr>
-            </a:solidFill>
-            <a:prstDash val="solid"/>
-          </a:ln>
-        </p:spPr>
-        <p:txBody>
-          <a:bodyPr wrap="square" rtlCol="0">
-            <a:spAutoFit/>
-          </a:bodyPr>
-          <a:p>
-            <a:r>
-              <a:rPr lang="en-US" altLang="en-US">
-                <a:latin typeface="FreeMono" panose="020F0409020205020404" charset="0"/>
-                <a:ea typeface="FreeMono" panose="020F0409020205020404" charset="0"/>
-                <a:cs typeface="Noto Sans Mono CJK JP" panose="020B0500000000000000" charset="-122"/>
-              </a:rPr>
-              <a:t>for(j=0; j&lt;nElems; j++) // look for it</a:t>
-            </a:r>
-            <a:endParaRPr lang="en-US" altLang="en-US">
-              <a:latin typeface="FreeMono" panose="020F0409020205020404" charset="0"/>
-              <a:ea typeface="FreeMono" panose="020F0409020205020404" charset="0"/>
-              <a:cs typeface="Noto Sans Mono CJK JP" panose="020B0500000000000000" charset="-122"/>
-            </a:endParaRPr>
-          </a:p>
-          <a:p>
-            <a:r>
-              <a:rPr lang="en-US" altLang="en-US">
-                <a:latin typeface="FreeMono" panose="020F0409020205020404" charset="0"/>
-                <a:ea typeface="FreeMono" panose="020F0409020205020404" charset="0"/>
-                <a:cs typeface="Noto Sans Mono CJK JP" panose="020B0500000000000000" charset="-122"/>
-              </a:rPr>
-              <a:t>	if(arr[j]== eltToBeDeleted){</a:t>
-            </a:r>
-            <a:endParaRPr lang="en-US" altLang="en-US">
-              <a:latin typeface="FreeMono" panose="020F0409020205020404" charset="0"/>
-              <a:ea typeface="FreeMono" panose="020F0409020205020404" charset="0"/>
-              <a:cs typeface="Noto Sans Mono CJK JP" panose="020B0500000000000000" charset="-122"/>
-            </a:endParaRPr>
-          </a:p>
-          <a:p>
-            <a:r>
-              <a:rPr lang="en-US" altLang="en-US">
-                <a:latin typeface="FreeMono" panose="020F0409020205020404" charset="0"/>
-                <a:ea typeface="FreeMono" panose="020F0409020205020404" charset="0"/>
-                <a:cs typeface="Noto Sans Mono CJK JP" panose="020B0500000000000000" charset="-122"/>
-                <a:sym typeface="+mn-ea"/>
-              </a:rPr>
-              <a:t>	for(int k=j; k&lt;nElems; k++) // higher ones down</a:t>
-            </a:r>
-            <a:endParaRPr lang="en-US" altLang="en-US">
-              <a:latin typeface="FreeMono" panose="020F0409020205020404" charset="0"/>
-              <a:ea typeface="FreeMono" panose="020F0409020205020404" charset="0"/>
-              <a:cs typeface="Noto Sans Mono CJK JP" panose="020B0500000000000000" charset="-122"/>
-            </a:endParaRPr>
-          </a:p>
-          <a:p>
-            <a:r>
-              <a:rPr lang="en-US" altLang="en-US">
-                <a:latin typeface="FreeMono" panose="020F0409020205020404" charset="0"/>
-                <a:ea typeface="FreeMono" panose="020F0409020205020404" charset="0"/>
-                <a:cs typeface="Noto Sans Mono CJK JP" panose="020B0500000000000000" charset="-122"/>
-                <a:sym typeface="+mn-ea"/>
-              </a:rPr>
-              <a:t>		arr[k] = arr[k+1];</a:t>
-            </a:r>
-            <a:endParaRPr lang="en-US" altLang="en-US">
-              <a:latin typeface="FreeMono" panose="020F0409020205020404" charset="0"/>
-              <a:ea typeface="FreeMono" panose="020F0409020205020404" charset="0"/>
-              <a:cs typeface="Noto Sans Mono CJK JP" panose="020B0500000000000000" charset="-122"/>
-            </a:endParaRPr>
-          </a:p>
-          <a:p>
-            <a:r>
-              <a:rPr lang="en-US" altLang="en-US">
-                <a:latin typeface="FreeMono" panose="020F0409020205020404" charset="0"/>
-                <a:ea typeface="FreeMono" panose="020F0409020205020404" charset="0"/>
-                <a:cs typeface="Noto Sans Mono CJK JP" panose="020B0500000000000000" charset="-122"/>
-                <a:sym typeface="+mn-ea"/>
-              </a:rPr>
-              <a:t>	nElems--; 	 // decrement size</a:t>
-            </a:r>
-            <a:endParaRPr lang="en-US" altLang="en-US">
-              <a:latin typeface="FreeMono" panose="020F0409020205020404" charset="0"/>
-              <a:ea typeface="FreeMono" panose="020F0409020205020404" charset="0"/>
-              <a:cs typeface="Noto Sans Mono CJK JP" panose="020B0500000000000000" charset="-122"/>
-              <a:sym typeface="+mn-ea"/>
-            </a:endParaRPr>
-          </a:p>
-          <a:p>
-            <a:r>
-              <a:rPr lang="en-US" altLang="en-US">
-                <a:latin typeface="FreeMono" panose="020F0409020205020404" charset="0"/>
-                <a:ea typeface="FreeMono" panose="020F0409020205020404" charset="0"/>
-                <a:cs typeface="Noto Sans Mono CJK JP" panose="020B0500000000000000" charset="-122"/>
-                <a:sym typeface="+mn-ea"/>
-              </a:rPr>
-              <a:t>	break;</a:t>
-            </a:r>
-            <a:endParaRPr lang="en-US" altLang="en-US">
-              <a:latin typeface="FreeMono" panose="020F0409020205020404" charset="0"/>
-              <a:ea typeface="FreeMono" panose="020F0409020205020404" charset="0"/>
-              <a:cs typeface="Noto Sans Mono CJK JP" panose="020B0500000000000000" charset="-122"/>
-              <a:sym typeface="+mn-ea"/>
-            </a:endParaRPr>
-          </a:p>
-          <a:p>
-            <a:r>
-              <a:rPr lang="en-US" altLang="en-US">
-                <a:latin typeface="FreeMono" panose="020F0409020205020404" charset="0"/>
-                <a:ea typeface="FreeMono" panose="020F0409020205020404" charset="0"/>
-                <a:cs typeface="Noto Sans Mono CJK JP" panose="020B0500000000000000" charset="-122"/>
-                <a:sym typeface="+mn-ea"/>
-              </a:rPr>
-              <a:t>	}</a:t>
-            </a:r>
-            <a:endParaRPr lang="en-US" altLang="en-US">
-              <a:latin typeface="FreeMono" panose="020F0409020205020404" charset="0"/>
-              <a:ea typeface="FreeMono" panose="020F0409020205020404" charset="0"/>
-              <a:cs typeface="Noto Sans Mono CJK JP" panose="020B0500000000000000" charset="-122"/>
-            </a:endParaRPr>
-          </a:p>
-          <a:p>
-            <a:r>
-              <a:rPr lang="en-US" altLang="en-US">
-                <a:latin typeface="FreeMono" panose="020F0409020205020404" charset="0"/>
-                <a:ea typeface="FreeMono" panose="020F0409020205020404" charset="0"/>
-                <a:cs typeface="Noto Sans Mono CJK JP" panose="020B0500000000000000" charset="-122"/>
-                <a:sym typeface="+mn-ea"/>
-              </a:rPr>
-              <a:t> </a:t>
-            </a:r>
-            <a:r>
-              <a:rPr lang="en-US" altLang="en-US">
-                <a:latin typeface="FreeMono" panose="020F0409020205020404" charset="0"/>
-                <a:ea typeface="FreeMono" panose="020F0409020205020404" charset="0"/>
-                <a:cs typeface="Noto Sans Mono CJK JP" panose="020B0500000000000000" charset="-122"/>
-              </a:rPr>
-              <a:t>} </a:t>
-            </a:r>
-            <a:endParaRPr lang="en-US">
-              <a:latin typeface="FreeMono" panose="020F0409020205020404" charset="0"/>
-              <a:ea typeface="FreeMono" panose="020F0409020205020404" charset="0"/>
-              <a:cs typeface="Noto Sans Mono CJK JP" panose="020B0500000000000000" charset="-122"/>
-            </a:endParaRPr>
-          </a:p>
-          <a:p>
-            <a:r>
-              <a:rPr lang="en-US">
-                <a:latin typeface="FreeMono" panose="020F0409020205020404" charset="0"/>
-                <a:ea typeface="FreeMono" panose="020F0409020205020404" charset="0"/>
-                <a:cs typeface="Noto Sans Mono CJK JP" panose="020B0500000000000000" charset="-122"/>
-              </a:rPr>
-              <a:t>   </a:t>
-            </a:r>
-            <a:endParaRPr lang="en-US">
-              <a:latin typeface="FreeMono" panose="020F0409020205020404" charset="0"/>
-              <a:ea typeface="FreeMono" panose="020F0409020205020404" charset="0"/>
-              <a:cs typeface="Noto Sans Mono CJK JP" panose="020B0500000000000000" charset="-122"/>
-            </a:endParaRPr>
-          </a:p>
-        </p:txBody>
-      </p:sp>
-    </p:spTree>
-  </p:cSld>
-  <p:clrMapOvr>
-    <a:masterClrMapping/>
-  </p:clrMapOvr>
-</p:sld>
-</file>
-
 <file path=ppt/slides/slide2.xml><?xml version="1.0" encoding="utf-8"?>
 <p:sld xmlns:a="http://schemas.openxmlformats.org/drawingml/2006/main" xmlns:r="http://schemas.openxmlformats.org/officeDocument/2006/relationships" xmlns:p="http://schemas.openxmlformats.org/presentationml/2006/main">
   <p:cSld>
@@ -6864,8 +6736,8 @@
         </p:nvSpPr>
         <p:spPr>
           <a:xfrm>
-            <a:off x="685800" y="203835"/>
-            <a:ext cx="7772400" cy="652145"/>
+            <a:off x="685800" y="306705"/>
+            <a:ext cx="7772400" cy="688975"/>
           </a:xfrm>
         </p:spPr>
         <p:txBody>
@@ -6876,7 +6748,7 @@
                 <a:latin typeface="Noto Serif CJK JP" panose="02020400000000000000" charset="-122"/>
                 <a:ea typeface="Noto Serif CJK JP" panose="02020400000000000000" charset="-122"/>
               </a:rPr>
-              <a:t>Stack </a:t>
+              <a:t>Array - Accessing Element</a:t>
             </a:r>
             <a:endParaRPr lang="en-US" altLang="en-US" sz="2800">
               <a:latin typeface="Noto Serif CJK JP" panose="02020400000000000000" charset="-122"/>
@@ -6897,8 +6769,8 @@
         </p:nvSpPr>
         <p:spPr>
           <a:xfrm>
-            <a:off x="685800" y="1036955"/>
-            <a:ext cx="7772400" cy="5382260"/>
+            <a:off x="685800" y="1449705"/>
+            <a:ext cx="7772400" cy="4969510"/>
           </a:xfrm>
         </p:spPr>
         <p:txBody>
@@ -6906,7 +6778,7 @@
           <a:p>
             <a:pPr>
               <a:lnSpc>
-                <a:spcPct val="120000"/>
+                <a:spcPct val="130000"/>
               </a:lnSpc>
             </a:pPr>
             <a:r>
@@ -6914,16 +6786,9 @@
                 <a:latin typeface="Noto Serif CJK JP" panose="02020400000000000000" charset="-122"/>
                 <a:ea typeface="Noto Serif CJK JP" panose="02020400000000000000" charset="-122"/>
               </a:rPr>
-              <a:t>L</a:t>
-            </a:r>
-            <a:r>
-              <a:rPr lang="en-US" sz="1800">
-                <a:latin typeface="Noto Serif CJK JP" panose="02020400000000000000" charset="-122"/>
-                <a:ea typeface="Noto Serif CJK JP" panose="02020400000000000000" charset="-122"/>
-              </a:rPr>
-              <a:t>inear data structure</a:t>
-            </a:r>
-            <a:endParaRPr lang="en-US" sz="1800">
+              <a:t>accessed using an index number</a:t>
+            </a:r>
+            <a:endParaRPr lang="en-US" altLang="en-US" sz="1800">
               <a:latin typeface="Noto Serif CJK JP" panose="02020400000000000000" charset="-122"/>
               <a:ea typeface="Noto Serif CJK JP" panose="02020400000000000000" charset="-122"/>
             </a:endParaRPr>
@@ -6931,7 +6796,7 @@
           <a:p>
             <a:pPr>
               <a:lnSpc>
-                <a:spcPct val="120000"/>
+                <a:spcPct val="130000"/>
               </a:lnSpc>
             </a:pPr>
             <a:r>
@@ -6939,16 +6804,9 @@
                 <a:latin typeface="Noto Serif CJK JP" panose="02020400000000000000" charset="-122"/>
                 <a:ea typeface="Noto Serif CJK JP" panose="02020400000000000000" charset="-122"/>
               </a:rPr>
-              <a:t>N</a:t>
-            </a:r>
-            <a:r>
-              <a:rPr lang="en-US" sz="1800">
-                <a:latin typeface="Noto Serif CJK JP" panose="02020400000000000000" charset="-122"/>
-                <a:ea typeface="Noto Serif CJK JP" panose="02020400000000000000" charset="-122"/>
-              </a:rPr>
-              <a:t>ew element is added at one end and (top) an element is removed from that end only.</a:t>
-            </a:r>
-            <a:endParaRPr lang="en-US" sz="1800">
+              <a:t>first element is numbered 0, so that the indices in an array of 10 elements run from 0 to 9.</a:t>
+            </a:r>
+            <a:endParaRPr lang="en-US" altLang="en-US" sz="1800">
               <a:latin typeface="Noto Serif CJK JP" panose="02020400000000000000" charset="-122"/>
               <a:ea typeface="Noto Serif CJK JP" panose="02020400000000000000" charset="-122"/>
             </a:endParaRPr>
@@ -6956,25 +6814,7 @@
           <a:p>
             <a:pPr>
               <a:lnSpc>
-                <a:spcPct val="120000"/>
-              </a:lnSpc>
-            </a:pPr>
-            <a:r>
-              <a:rPr lang="en-US" sz="1800">
-                <a:latin typeface="Noto Serif CJK JP" panose="02020400000000000000" charset="-122"/>
-                <a:ea typeface="Noto Serif CJK JP" panose="02020400000000000000" charset="-122"/>
-              </a:rPr>
-              <a:t>LIFO(Last In First Out) or FILO(First In Last Out).</a:t>
-            </a:r>
-            <a:endParaRPr lang="en-US" sz="1800">
-              <a:latin typeface="Noto Serif CJK JP" panose="02020400000000000000" charset="-122"/>
-              <a:ea typeface="Noto Serif CJK JP" panose="02020400000000000000" charset="-122"/>
-            </a:endParaRPr>
-          </a:p>
-          <a:p>
-            <a:pPr>
-              <a:lnSpc>
-                <a:spcPct val="120000"/>
+                <a:spcPct val="130000"/>
               </a:lnSpc>
             </a:pPr>
             <a:r>
@@ -6982,7 +6822,7 @@
                 <a:latin typeface="Noto Serif CJK JP" panose="02020400000000000000" charset="-122"/>
                 <a:ea typeface="Noto Serif CJK JP" panose="02020400000000000000" charset="-122"/>
               </a:rPr>
-              <a:t>Example : plates stacked over one another </a:t>
+              <a:t>Complexity : O(1)</a:t>
             </a:r>
             <a:endParaRPr lang="en-US" altLang="en-US" sz="1800">
               <a:latin typeface="Noto Serif CJK JP" panose="02020400000000000000" charset="-122"/>
@@ -6990,124 +6830,83 @@
             </a:endParaRPr>
           </a:p>
           <a:p>
-            <a:pPr>
-              <a:lnSpc>
-                <a:spcPct val="120000"/>
-              </a:lnSpc>
-            </a:pPr>
-            <a:r>
-              <a:rPr lang="en-US" altLang="en-US" sz="1800">
-                <a:latin typeface="Noto Serif CJK JP" panose="02020400000000000000" charset="-122"/>
-                <a:ea typeface="Noto Serif CJK JP" panose="02020400000000000000" charset="-122"/>
-              </a:rPr>
-              <a:t>Can be Implemented using Array or Linked List</a:t>
-            </a:r>
             <a:endParaRPr lang="en-US" altLang="en-US" sz="1800">
               <a:latin typeface="Noto Serif CJK JP" panose="02020400000000000000" charset="-122"/>
               <a:ea typeface="Noto Serif CJK JP" panose="02020400000000000000" charset="-122"/>
             </a:endParaRPr>
           </a:p>
           <a:p>
-            <a:pPr>
-              <a:lnSpc>
-                <a:spcPct val="120000"/>
-              </a:lnSpc>
-            </a:pPr>
-            <a:r>
-              <a:rPr lang="en-US" altLang="en-US" sz="1800">
-                <a:latin typeface="Noto Serif CJK JP" panose="02020400000000000000" charset="-122"/>
-                <a:ea typeface="Noto Serif CJK JP" panose="02020400000000000000" charset="-122"/>
+            <a:endParaRPr lang="en-US" altLang="en-US" sz="1800">
+              <a:latin typeface="Noto Serif CJK JP" panose="02020400000000000000" charset="-122"/>
+              <a:ea typeface="Noto Serif CJK JP" panose="02020400000000000000" charset="-122"/>
+            </a:endParaRPr>
+          </a:p>
+          <a:p>
+            <a:endParaRPr lang="en-US" altLang="en-US" sz="1800">
+              <a:latin typeface="Noto Serif CJK JP" panose="02020400000000000000" charset="-122"/>
+              <a:ea typeface="Noto Serif CJK JP" panose="02020400000000000000" charset="-122"/>
+            </a:endParaRPr>
+          </a:p>
+        </p:txBody>
+      </p:sp>
+      <p:sp>
+        <p:nvSpPr>
+          <p:cNvPr id="4" name="Text Box 3"/>
+          <p:cNvSpPr txBox="1"/>
+          <p:nvPr/>
+        </p:nvSpPr>
+        <p:spPr>
+          <a:xfrm>
+            <a:off x="2526665" y="4083685"/>
+            <a:ext cx="3211195" cy="368300"/>
+          </a:xfrm>
+          <a:prstGeom prst="rect">
+            <a:avLst/>
+          </a:prstGeom>
+          <a:noFill/>
+          <a:ln w="12700" cmpd="sng">
+            <a:solidFill>
+              <a:schemeClr val="accent1">
+                <a:shade val="50000"/>
+              </a:schemeClr>
+            </a:solidFill>
+            <a:prstDash val="solid"/>
+          </a:ln>
+        </p:spPr>
+        <p:txBody>
+          <a:bodyPr wrap="square" rtlCol="0">
+            <a:spAutoFit/>
+          </a:bodyPr>
+          <a:p>
+            <a:r>
+              <a:rPr lang="en-US">
+                <a:latin typeface="FreeMono" panose="020F0409020205020404" charset="0"/>
+                <a:ea typeface="FreeMono" panose="020F0409020205020404" charset="0"/>
+                <a:cs typeface="Noto Sans Mono CJK JP" panose="020B0500000000000000" charset="-122"/>
+              </a:rPr>
+              <a:t>temp = </a:t>
+            </a:r>
+            <a:r>
+              <a:rPr lang="en-US" altLang="en-US">
+                <a:latin typeface="FreeMono" panose="020F0409020205020404" charset="0"/>
+                <a:ea typeface="FreeMono" panose="020F0409020205020404" charset="0"/>
+                <a:cs typeface="Noto Sans Mono CJK JP" panose="020B0500000000000000" charset="-122"/>
                 <a:sym typeface="+mn-ea"/>
               </a:rPr>
-              <a:t>Tracking Element : Top</a:t>
-            </a:r>
-            <a:endParaRPr lang="en-US" altLang="en-US" sz="1800">
-              <a:latin typeface="Noto Serif CJK JP" panose="02020400000000000000" charset="-122"/>
-              <a:ea typeface="Noto Serif CJK JP" panose="02020400000000000000" charset="-122"/>
-            </a:endParaRPr>
-          </a:p>
-          <a:p>
-            <a:pPr>
-              <a:lnSpc>
-                <a:spcPct val="120000"/>
-              </a:lnSpc>
-            </a:pPr>
-            <a:r>
-              <a:rPr lang="en-US" altLang="en-US" sz="1800">
-                <a:latin typeface="Noto Serif CJK JP" panose="02020400000000000000" charset="-122"/>
-                <a:ea typeface="Noto Serif CJK JP" panose="02020400000000000000" charset="-122"/>
-              </a:rPr>
-              <a:t>Application : </a:t>
-            </a:r>
-            <a:endParaRPr lang="en-US" altLang="en-US" sz="1800">
-              <a:latin typeface="Noto Serif CJK JP" panose="02020400000000000000" charset="-122"/>
-              <a:ea typeface="Noto Serif CJK JP" panose="02020400000000000000" charset="-122"/>
-            </a:endParaRPr>
-          </a:p>
-          <a:p>
-            <a:pPr lvl="1">
-              <a:lnSpc>
-                <a:spcPct val="120000"/>
-              </a:lnSpc>
-            </a:pPr>
-            <a:r>
-              <a:rPr lang="en-US" altLang="en-US" sz="1800">
-                <a:latin typeface="Noto Serif CJK JP" panose="02020400000000000000" charset="-122"/>
-                <a:ea typeface="Noto Serif CJK JP" panose="02020400000000000000" charset="-122"/>
-              </a:rPr>
-              <a:t>Processing of subroutine calls and returns</a:t>
-            </a:r>
-            <a:endParaRPr lang="en-US" altLang="en-US" sz="1800">
-              <a:latin typeface="Noto Serif CJK JP" panose="02020400000000000000" charset="-122"/>
-              <a:ea typeface="Noto Serif CJK JP" panose="02020400000000000000" charset="-122"/>
-            </a:endParaRPr>
-          </a:p>
-          <a:p>
-            <a:pPr lvl="1">
-              <a:lnSpc>
-                <a:spcPct val="120000"/>
-              </a:lnSpc>
-            </a:pPr>
-            <a:r>
-              <a:rPr lang="en-US" altLang="en-US" sz="1800">
-                <a:latin typeface="Noto Serif CJK JP" panose="02020400000000000000" charset="-122"/>
-                <a:ea typeface="Noto Serif CJK JP" panose="02020400000000000000" charset="-122"/>
-              </a:rPr>
-              <a:t>reversing a string</a:t>
-            </a:r>
-            <a:endParaRPr lang="en-US" altLang="en-US" sz="1800">
-              <a:latin typeface="Noto Serif CJK JP" panose="02020400000000000000" charset="-122"/>
-              <a:ea typeface="Noto Serif CJK JP" panose="02020400000000000000" charset="-122"/>
-            </a:endParaRPr>
-          </a:p>
-          <a:p>
-            <a:pPr lvl="1">
-              <a:lnSpc>
-                <a:spcPct val="120000"/>
-              </a:lnSpc>
-            </a:pPr>
-            <a:r>
-              <a:rPr lang="en-US" altLang="en-US" sz="1800">
-                <a:latin typeface="Noto Serif CJK JP" panose="02020400000000000000" charset="-122"/>
-                <a:ea typeface="Noto Serif CJK JP" panose="02020400000000000000" charset="-122"/>
-              </a:rPr>
-              <a:t>backtracking - Eg :- Maze Game</a:t>
-            </a:r>
-            <a:endParaRPr lang="en-US" altLang="en-US" sz="1800">
-              <a:latin typeface="Noto Serif CJK JP" panose="02020400000000000000" charset="-122"/>
-              <a:ea typeface="Noto Serif CJK JP" panose="02020400000000000000" charset="-122"/>
-            </a:endParaRPr>
-          </a:p>
-          <a:p>
-            <a:pPr marL="0" indent="0">
-              <a:lnSpc>
-                <a:spcPct val="120000"/>
-              </a:lnSpc>
-              <a:buNone/>
-            </a:pPr>
-            <a:endParaRPr lang="en-US" altLang="en-US" sz="1800">
-              <a:latin typeface="Noto Serif CJK JP" panose="02020400000000000000" charset="-122"/>
-              <a:ea typeface="Noto Serif CJK JP" panose="02020400000000000000" charset="-122"/>
+              <a:t>myArray</a:t>
+            </a:r>
+            <a:r>
+              <a:rPr lang="en-US">
+                <a:latin typeface="FreeMono" panose="020F0409020205020404" charset="0"/>
+                <a:ea typeface="FreeMono" panose="020F0409020205020404" charset="0"/>
+                <a:cs typeface="Noto Sans Mono CJK JP" panose="020B0500000000000000" charset="-122"/>
+              </a:rPr>
+              <a:t>[3];   </a:t>
+            </a:r>
+            <a:endParaRPr lang="en-US">
+              <a:latin typeface="FreeMono" panose="020F0409020205020404" charset="0"/>
+              <a:ea typeface="FreeMono" panose="020F0409020205020404" charset="0"/>
+              <a:cs typeface="Noto Sans Mono CJK JP" panose="020B0500000000000000" charset="-122"/>
             </a:endParaRPr>
           </a:p>
         </p:txBody>
@@ -7121,6 +6920,882 @@
 </file>
 
 <file path=ppt/slides/slide21.xml><?xml version="1.0" encoding="utf-8"?>
+<p:sld xmlns:a="http://schemas.openxmlformats.org/drawingml/2006/main" xmlns:r="http://schemas.openxmlformats.org/officeDocument/2006/relationships" xmlns:p="http://schemas.openxmlformats.org/presentationml/2006/main">
+  <p:cSld>
+    <p:spTree>
+      <p:nvGrpSpPr>
+        <p:cNvPr id="1" name=""/>
+        <p:cNvGrpSpPr/>
+        <p:nvPr/>
+      </p:nvGrpSpPr>
+      <p:grpSpPr/>
+      <p:sp>
+        <p:nvSpPr>
+          <p:cNvPr id="2" name="Title 1"/>
+          <p:cNvSpPr>
+            <a:spLocks noGrp="1"/>
+          </p:cNvSpPr>
+          <p:nvPr>
+            <p:ph type="title"/>
+          </p:nvPr>
+        </p:nvSpPr>
+        <p:spPr>
+          <a:xfrm>
+            <a:off x="685800" y="306705"/>
+            <a:ext cx="7772400" cy="688975"/>
+          </a:xfrm>
+        </p:spPr>
+        <p:txBody>
+          <a:bodyPr/>
+          <a:p>
+            <a:r>
+              <a:rPr lang="en-US" altLang="en-US" sz="2800">
+                <a:latin typeface="Noto Serif CJK JP" panose="02020400000000000000" charset="-122"/>
+                <a:ea typeface="Noto Serif CJK JP" panose="02020400000000000000" charset="-122"/>
+              </a:rPr>
+              <a:t>Array - Insertion of Element</a:t>
+            </a:r>
+            <a:endParaRPr lang="en-US" altLang="en-US" sz="2800">
+              <a:latin typeface="Noto Serif CJK JP" panose="02020400000000000000" charset="-122"/>
+              <a:ea typeface="Noto Serif CJK JP" panose="02020400000000000000" charset="-122"/>
+            </a:endParaRPr>
+          </a:p>
+        </p:txBody>
+      </p:sp>
+      <p:sp>
+        <p:nvSpPr>
+          <p:cNvPr id="3" name="Content Placeholder 2"/>
+          <p:cNvSpPr>
+            <a:spLocks noGrp="1"/>
+          </p:cNvSpPr>
+          <p:nvPr>
+            <p:ph idx="1"/>
+          </p:nvPr>
+        </p:nvSpPr>
+        <p:spPr>
+          <a:xfrm>
+            <a:off x="685800" y="1449705"/>
+            <a:ext cx="7772400" cy="4969510"/>
+          </a:xfrm>
+        </p:spPr>
+        <p:txBody>
+          <a:bodyPr/>
+          <a:p>
+            <a:pPr marL="0" indent="0">
+              <a:buNone/>
+            </a:pPr>
+            <a:endParaRPr lang="en-US" altLang="en-US" sz="1800">
+              <a:latin typeface="Noto Serif CJK JP" panose="02020400000000000000" charset="-122"/>
+              <a:ea typeface="Noto Serif CJK JP" panose="02020400000000000000" charset="-122"/>
+            </a:endParaRPr>
+          </a:p>
+          <a:p>
+            <a:r>
+              <a:rPr lang="en-US" altLang="en-US" sz="1800">
+                <a:latin typeface="Noto Serif CJK JP" panose="02020400000000000000" charset="-122"/>
+                <a:ea typeface="Noto Serif CJK JP" panose="02020400000000000000" charset="-122"/>
+              </a:rPr>
+              <a:t>Unsorted </a:t>
+            </a:r>
+            <a:endParaRPr lang="en-US" altLang="en-US" sz="1800">
+              <a:latin typeface="Noto Serif CJK JP" panose="02020400000000000000" charset="-122"/>
+              <a:ea typeface="Noto Serif CJK JP" panose="02020400000000000000" charset="-122"/>
+            </a:endParaRPr>
+          </a:p>
+          <a:p>
+            <a:pPr lvl="1"/>
+            <a:r>
+              <a:rPr lang="en-US" altLang="en-US" sz="1800">
+                <a:latin typeface="Noto Serif CJK JP" panose="02020400000000000000" charset="-122"/>
+                <a:ea typeface="Noto Serif CJK JP" panose="02020400000000000000" charset="-122"/>
+              </a:rPr>
+              <a:t>Keep track of number of elements in array - nElts</a:t>
+            </a:r>
+            <a:endParaRPr lang="en-US" altLang="en-US" sz="1800">
+              <a:latin typeface="Noto Serif CJK JP" panose="02020400000000000000" charset="-122"/>
+              <a:ea typeface="Noto Serif CJK JP" panose="02020400000000000000" charset="-122"/>
+            </a:endParaRPr>
+          </a:p>
+          <a:p>
+            <a:pPr lvl="1"/>
+            <a:r>
+              <a:rPr lang="en-US" altLang="en-US" sz="1800">
+                <a:latin typeface="Noto Serif CJK JP" panose="02020400000000000000" charset="-122"/>
+                <a:ea typeface="Noto Serif CJK JP" panose="02020400000000000000" charset="-122"/>
+              </a:rPr>
+              <a:t>Insert using index and Increment the tracking object</a:t>
+            </a:r>
+            <a:endParaRPr lang="en-US" altLang="en-US" sz="1800">
+              <a:latin typeface="Noto Serif CJK JP" panose="02020400000000000000" charset="-122"/>
+              <a:ea typeface="Noto Serif CJK JP" panose="02020400000000000000" charset="-122"/>
+            </a:endParaRPr>
+          </a:p>
+          <a:p>
+            <a:pPr lvl="1"/>
+            <a:r>
+              <a:rPr lang="en-US" altLang="en-US" sz="1800">
+                <a:latin typeface="Noto Serif CJK JP" panose="02020400000000000000" charset="-122"/>
+                <a:ea typeface="Noto Serif CJK JP" panose="02020400000000000000" charset="-122"/>
+              </a:rPr>
+              <a:t>Complexity : O(1)</a:t>
+            </a:r>
+            <a:endParaRPr lang="en-US" altLang="en-US" sz="1800">
+              <a:latin typeface="Noto Serif CJK JP" panose="02020400000000000000" charset="-122"/>
+              <a:ea typeface="Noto Serif CJK JP" panose="02020400000000000000" charset="-122"/>
+            </a:endParaRPr>
+          </a:p>
+          <a:p>
+            <a:r>
+              <a:rPr lang="en-US" altLang="en-US" sz="1800">
+                <a:latin typeface="Noto Serif CJK JP" panose="02020400000000000000" charset="-122"/>
+                <a:ea typeface="Noto Serif CJK JP" panose="02020400000000000000" charset="-122"/>
+              </a:rPr>
+              <a:t>Sorted</a:t>
+            </a:r>
+            <a:endParaRPr lang="en-US" altLang="en-US" sz="1800">
+              <a:latin typeface="Noto Serif CJK JP" panose="02020400000000000000" charset="-122"/>
+              <a:ea typeface="Noto Serif CJK JP" panose="02020400000000000000" charset="-122"/>
+            </a:endParaRPr>
+          </a:p>
+          <a:p>
+            <a:pPr lvl="1"/>
+            <a:r>
+              <a:rPr lang="en-US" altLang="en-US" sz="1800">
+                <a:latin typeface="Noto Serif CJK JP" panose="02020400000000000000" charset="-122"/>
+                <a:ea typeface="Noto Serif CJK JP" panose="02020400000000000000" charset="-122"/>
+              </a:rPr>
+              <a:t>Requires Searching for the postion</a:t>
+            </a:r>
+            <a:endParaRPr lang="en-US" altLang="en-US" sz="1800">
+              <a:latin typeface="Noto Serif CJK JP" panose="02020400000000000000" charset="-122"/>
+              <a:ea typeface="Noto Serif CJK JP" panose="02020400000000000000" charset="-122"/>
+            </a:endParaRPr>
+          </a:p>
+          <a:p>
+            <a:pPr lvl="1"/>
+            <a:r>
+              <a:rPr lang="en-US" altLang="en-US" sz="1800">
+                <a:latin typeface="Noto Serif CJK JP" panose="02020400000000000000" charset="-122"/>
+                <a:ea typeface="Noto Serif CJK JP" panose="02020400000000000000" charset="-122"/>
+              </a:rPr>
+              <a:t>Shifting the elements to make the specfied postion to be vacant.</a:t>
+            </a:r>
+            <a:endParaRPr lang="en-US" altLang="en-US" sz="1800">
+              <a:latin typeface="Noto Serif CJK JP" panose="02020400000000000000" charset="-122"/>
+              <a:ea typeface="Noto Serif CJK JP" panose="02020400000000000000" charset="-122"/>
+            </a:endParaRPr>
+          </a:p>
+          <a:p>
+            <a:pPr lvl="1"/>
+            <a:r>
+              <a:rPr lang="en-US" altLang="en-US" sz="1800">
+                <a:latin typeface="Noto Serif CJK JP" panose="02020400000000000000" charset="-122"/>
+                <a:ea typeface="Noto Serif CJK JP" panose="02020400000000000000" charset="-122"/>
+                <a:sym typeface="+mn-ea"/>
+              </a:rPr>
+              <a:t>Complexity : O(N</a:t>
+            </a:r>
+            <a:r>
+              <a:rPr lang="en-US" altLang="en-US" sz="1800" baseline="30000">
+                <a:latin typeface="Noto Serif CJK JP" panose="02020400000000000000" charset="-122"/>
+                <a:ea typeface="Noto Serif CJK JP" panose="02020400000000000000" charset="-122"/>
+                <a:sym typeface="+mn-ea"/>
+              </a:rPr>
+              <a:t>2</a:t>
+            </a:r>
+            <a:r>
+              <a:rPr lang="en-US" altLang="en-US" sz="1800">
+                <a:latin typeface="Noto Serif CJK JP" panose="02020400000000000000" charset="-122"/>
+                <a:ea typeface="Noto Serif CJK JP" panose="02020400000000000000" charset="-122"/>
+                <a:sym typeface="+mn-ea"/>
+              </a:rPr>
+              <a:t>)</a:t>
+            </a:r>
+            <a:endParaRPr lang="en-US" altLang="en-US" sz="1800">
+              <a:latin typeface="Noto Serif CJK JP" panose="02020400000000000000" charset="-122"/>
+              <a:ea typeface="Noto Serif CJK JP" panose="02020400000000000000" charset="-122"/>
+            </a:endParaRPr>
+          </a:p>
+          <a:p>
+            <a:pPr marL="457200" lvl="1" indent="0">
+              <a:buNone/>
+            </a:pPr>
+            <a:endParaRPr lang="en-US" altLang="en-US" sz="1800">
+              <a:latin typeface="Noto Serif CJK JP" panose="02020400000000000000" charset="-122"/>
+              <a:ea typeface="Noto Serif CJK JP" panose="02020400000000000000" charset="-122"/>
+            </a:endParaRPr>
+          </a:p>
+        </p:txBody>
+      </p:sp>
+      <p:sp>
+        <p:nvSpPr>
+          <p:cNvPr id="4" name="Text Box 3"/>
+          <p:cNvSpPr txBox="1"/>
+          <p:nvPr/>
+        </p:nvSpPr>
+        <p:spPr>
+          <a:xfrm>
+            <a:off x="4707890" y="4962525"/>
+            <a:ext cx="3211195" cy="1198880"/>
+          </a:xfrm>
+          <a:prstGeom prst="rect">
+            <a:avLst/>
+          </a:prstGeom>
+          <a:noFill/>
+          <a:ln w="12700" cmpd="sng">
+            <a:solidFill>
+              <a:schemeClr val="accent1">
+                <a:shade val="50000"/>
+              </a:schemeClr>
+            </a:solidFill>
+            <a:prstDash val="solid"/>
+          </a:ln>
+        </p:spPr>
+        <p:txBody>
+          <a:bodyPr wrap="square" rtlCol="0">
+            <a:spAutoFit/>
+          </a:bodyPr>
+          <a:p>
+            <a:r>
+              <a:rPr lang="en-US">
+                <a:latin typeface="FreeMono" panose="020F0409020205020404" charset="0"/>
+                <a:ea typeface="FreeMono" panose="020F0409020205020404" charset="0"/>
+                <a:cs typeface="Noto Sans Mono CJK JP" panose="020B0500000000000000" charset="-122"/>
+              </a:rPr>
+              <a:t>arr[0] = 77</a:t>
+            </a:r>
+            <a:endParaRPr lang="en-US">
+              <a:latin typeface="FreeMono" panose="020F0409020205020404" charset="0"/>
+              <a:ea typeface="FreeMono" panose="020F0409020205020404" charset="0"/>
+              <a:cs typeface="Noto Sans Mono CJK JP" panose="020B0500000000000000" charset="-122"/>
+            </a:endParaRPr>
+          </a:p>
+          <a:p>
+            <a:endParaRPr lang="en-US">
+              <a:latin typeface="FreeMono" panose="020F0409020205020404" charset="0"/>
+              <a:ea typeface="FreeMono" panose="020F0409020205020404" charset="0"/>
+              <a:cs typeface="Noto Sans Mono CJK JP" panose="020B0500000000000000" charset="-122"/>
+            </a:endParaRPr>
+          </a:p>
+          <a:p>
+            <a:r>
+              <a:rPr lang="en-US" altLang="en-US">
+                <a:latin typeface="FreeMono" panose="020F0409020205020404" charset="0"/>
+                <a:ea typeface="FreeMono" panose="020F0409020205020404" charset="0"/>
+                <a:cs typeface="Noto Sans Mono CJK JP" panose="020B0500000000000000" charset="-122"/>
+              </a:rPr>
+              <a:t>arr[</a:t>
+            </a:r>
+            <a:r>
+              <a:rPr lang="en-US" altLang="en-US">
+                <a:latin typeface="Noto Serif CJK JP" panose="02020400000000000000" charset="-122"/>
+                <a:ea typeface="Noto Serif CJK JP" panose="02020400000000000000" charset="-122"/>
+                <a:sym typeface="+mn-ea"/>
+              </a:rPr>
+              <a:t>nElts] = 12</a:t>
+            </a:r>
+            <a:endParaRPr lang="en-US" altLang="en-US">
+              <a:latin typeface="Noto Serif CJK JP" panose="02020400000000000000" charset="-122"/>
+              <a:ea typeface="Noto Serif CJK JP" panose="02020400000000000000" charset="-122"/>
+              <a:sym typeface="+mn-ea"/>
+            </a:endParaRPr>
+          </a:p>
+          <a:p>
+            <a:r>
+              <a:rPr lang="en-US" altLang="en-US">
+                <a:latin typeface="Noto Serif CJK JP" panose="02020400000000000000" charset="-122"/>
+                <a:ea typeface="Noto Serif CJK JP" panose="02020400000000000000" charset="-122"/>
+                <a:sym typeface="+mn-ea"/>
+              </a:rPr>
+              <a:t>nElts = nElts +1</a:t>
+            </a:r>
+            <a:endParaRPr lang="en-US" altLang="en-US">
+              <a:latin typeface="Noto Serif CJK JP" panose="02020400000000000000" charset="-122"/>
+              <a:ea typeface="Noto Serif CJK JP" panose="02020400000000000000" charset="-122"/>
+              <a:cs typeface="Noto Sans Mono CJK JP" panose="020B0500000000000000" charset="-122"/>
+              <a:sym typeface="+mn-ea"/>
+            </a:endParaRPr>
+          </a:p>
+        </p:txBody>
+      </p:sp>
+    </p:spTree>
+  </p:cSld>
+  <p:clrMapOvr>
+    <a:masterClrMapping/>
+  </p:clrMapOvr>
+</p:sld>
+</file>
+
+<file path=ppt/slides/slide22.xml><?xml version="1.0" encoding="utf-8"?>
+<p:sld xmlns:a="http://schemas.openxmlformats.org/drawingml/2006/main" xmlns:r="http://schemas.openxmlformats.org/officeDocument/2006/relationships" xmlns:p="http://schemas.openxmlformats.org/presentationml/2006/main">
+  <p:cSld>
+    <p:spTree>
+      <p:nvGrpSpPr>
+        <p:cNvPr id="1" name=""/>
+        <p:cNvGrpSpPr/>
+        <p:nvPr/>
+      </p:nvGrpSpPr>
+      <p:grpSpPr/>
+      <p:sp>
+        <p:nvSpPr>
+          <p:cNvPr id="2" name="Title 1"/>
+          <p:cNvSpPr>
+            <a:spLocks noGrp="1"/>
+          </p:cNvSpPr>
+          <p:nvPr>
+            <p:ph type="title"/>
+          </p:nvPr>
+        </p:nvSpPr>
+        <p:spPr>
+          <a:xfrm>
+            <a:off x="685800" y="306705"/>
+            <a:ext cx="7772400" cy="688975"/>
+          </a:xfrm>
+        </p:spPr>
+        <p:txBody>
+          <a:bodyPr/>
+          <a:p>
+            <a:r>
+              <a:rPr lang="en-US" altLang="en-US" sz="2800">
+                <a:latin typeface="Noto Serif CJK JP" panose="02020400000000000000" charset="-122"/>
+                <a:ea typeface="Noto Serif CJK JP" panose="02020400000000000000" charset="-122"/>
+              </a:rPr>
+              <a:t>Deletion of Element</a:t>
+            </a:r>
+            <a:endParaRPr lang="en-US" altLang="en-US" sz="2800">
+              <a:latin typeface="Noto Serif CJK JP" panose="02020400000000000000" charset="-122"/>
+              <a:ea typeface="Noto Serif CJK JP" panose="02020400000000000000" charset="-122"/>
+            </a:endParaRPr>
+          </a:p>
+        </p:txBody>
+      </p:sp>
+      <p:sp>
+        <p:nvSpPr>
+          <p:cNvPr id="3" name="Content Placeholder 2"/>
+          <p:cNvSpPr>
+            <a:spLocks noGrp="1"/>
+          </p:cNvSpPr>
+          <p:nvPr>
+            <p:ph idx="1"/>
+          </p:nvPr>
+        </p:nvSpPr>
+        <p:spPr>
+          <a:xfrm>
+            <a:off x="685800" y="1449705"/>
+            <a:ext cx="7772400" cy="4969510"/>
+          </a:xfrm>
+        </p:spPr>
+        <p:txBody>
+          <a:bodyPr/>
+          <a:p>
+            <a:r>
+              <a:rPr lang="en-US" altLang="en-US" sz="1800">
+                <a:latin typeface="Noto Serif CJK JP" panose="02020400000000000000" charset="-122"/>
+                <a:ea typeface="Noto Serif CJK JP" panose="02020400000000000000" charset="-122"/>
+              </a:rPr>
+              <a:t>Begins with a search for the specified item</a:t>
+            </a:r>
+            <a:endParaRPr lang="en-US" altLang="en-US" sz="1800">
+              <a:latin typeface="Noto Serif CJK JP" panose="02020400000000000000" charset="-122"/>
+              <a:ea typeface="Noto Serif CJK JP" panose="02020400000000000000" charset="-122"/>
+            </a:endParaRPr>
+          </a:p>
+          <a:p>
+            <a:r>
+              <a:rPr lang="en-US" altLang="en-US" sz="1800">
+                <a:latin typeface="Noto Serif CJK JP" panose="02020400000000000000" charset="-122"/>
+                <a:ea typeface="Noto Serif CJK JP" panose="02020400000000000000" charset="-122"/>
+              </a:rPr>
+              <a:t>When we find it, we move all the items with higher index values down one element to fill in the “hole” left by the deleted element</a:t>
+            </a:r>
+            <a:endParaRPr lang="en-US" altLang="en-US" sz="1800">
+              <a:latin typeface="Noto Serif CJK JP" panose="02020400000000000000" charset="-122"/>
+              <a:ea typeface="Noto Serif CJK JP" panose="02020400000000000000" charset="-122"/>
+            </a:endParaRPr>
+          </a:p>
+          <a:p>
+            <a:r>
+              <a:rPr lang="en-US" altLang="en-US" sz="1800">
+                <a:latin typeface="Noto Serif CJK JP" panose="02020400000000000000" charset="-122"/>
+                <a:ea typeface="Noto Serif CJK JP" panose="02020400000000000000" charset="-122"/>
+              </a:rPr>
+              <a:t>decrement nElems</a:t>
+            </a:r>
+            <a:endParaRPr lang="en-US" altLang="en-US" sz="1800">
+              <a:latin typeface="Noto Serif CJK JP" panose="02020400000000000000" charset="-122"/>
+              <a:ea typeface="Noto Serif CJK JP" panose="02020400000000000000" charset="-122"/>
+            </a:endParaRPr>
+          </a:p>
+        </p:txBody>
+      </p:sp>
+      <p:sp>
+        <p:nvSpPr>
+          <p:cNvPr id="4" name="Text Box 3"/>
+          <p:cNvSpPr txBox="1"/>
+          <p:nvPr/>
+        </p:nvSpPr>
+        <p:spPr>
+          <a:xfrm>
+            <a:off x="950595" y="3834765"/>
+            <a:ext cx="7781925" cy="2584450"/>
+          </a:xfrm>
+          <a:prstGeom prst="rect">
+            <a:avLst/>
+          </a:prstGeom>
+          <a:noFill/>
+          <a:ln w="12700" cmpd="sng">
+            <a:solidFill>
+              <a:schemeClr val="accent1">
+                <a:shade val="50000"/>
+              </a:schemeClr>
+            </a:solidFill>
+            <a:prstDash val="solid"/>
+          </a:ln>
+        </p:spPr>
+        <p:txBody>
+          <a:bodyPr wrap="square" rtlCol="0">
+            <a:spAutoFit/>
+          </a:bodyPr>
+          <a:p>
+            <a:r>
+              <a:rPr lang="en-US" altLang="en-US">
+                <a:latin typeface="FreeMono" panose="020F0409020205020404" charset="0"/>
+                <a:ea typeface="FreeMono" panose="020F0409020205020404" charset="0"/>
+                <a:cs typeface="Noto Sans Mono CJK JP" panose="020B0500000000000000" charset="-122"/>
+              </a:rPr>
+              <a:t>for(j=0; j&lt;nElems; j++) // look for it</a:t>
+            </a:r>
+            <a:endParaRPr lang="en-US" altLang="en-US">
+              <a:latin typeface="FreeMono" panose="020F0409020205020404" charset="0"/>
+              <a:ea typeface="FreeMono" panose="020F0409020205020404" charset="0"/>
+              <a:cs typeface="Noto Sans Mono CJK JP" panose="020B0500000000000000" charset="-122"/>
+            </a:endParaRPr>
+          </a:p>
+          <a:p>
+            <a:r>
+              <a:rPr lang="en-US" altLang="en-US">
+                <a:latin typeface="FreeMono" panose="020F0409020205020404" charset="0"/>
+                <a:ea typeface="FreeMono" panose="020F0409020205020404" charset="0"/>
+                <a:cs typeface="Noto Sans Mono CJK JP" panose="020B0500000000000000" charset="-122"/>
+              </a:rPr>
+              <a:t>	if(arr[j]== eltToBeDeleted){</a:t>
+            </a:r>
+            <a:endParaRPr lang="en-US" altLang="en-US">
+              <a:latin typeface="FreeMono" panose="020F0409020205020404" charset="0"/>
+              <a:ea typeface="FreeMono" panose="020F0409020205020404" charset="0"/>
+              <a:cs typeface="Noto Sans Mono CJK JP" panose="020B0500000000000000" charset="-122"/>
+            </a:endParaRPr>
+          </a:p>
+          <a:p>
+            <a:r>
+              <a:rPr lang="en-US" altLang="en-US">
+                <a:latin typeface="FreeMono" panose="020F0409020205020404" charset="0"/>
+                <a:ea typeface="FreeMono" panose="020F0409020205020404" charset="0"/>
+                <a:cs typeface="Noto Sans Mono CJK JP" panose="020B0500000000000000" charset="-122"/>
+                <a:sym typeface="+mn-ea"/>
+              </a:rPr>
+              <a:t>	for(int k=j; k&lt;nElems; k++) // higher ones down</a:t>
+            </a:r>
+            <a:endParaRPr lang="en-US" altLang="en-US">
+              <a:latin typeface="FreeMono" panose="020F0409020205020404" charset="0"/>
+              <a:ea typeface="FreeMono" panose="020F0409020205020404" charset="0"/>
+              <a:cs typeface="Noto Sans Mono CJK JP" panose="020B0500000000000000" charset="-122"/>
+            </a:endParaRPr>
+          </a:p>
+          <a:p>
+            <a:r>
+              <a:rPr lang="en-US" altLang="en-US">
+                <a:latin typeface="FreeMono" panose="020F0409020205020404" charset="0"/>
+                <a:ea typeface="FreeMono" panose="020F0409020205020404" charset="0"/>
+                <a:cs typeface="Noto Sans Mono CJK JP" panose="020B0500000000000000" charset="-122"/>
+                <a:sym typeface="+mn-ea"/>
+              </a:rPr>
+              <a:t>		arr[k] = arr[k+1];</a:t>
+            </a:r>
+            <a:endParaRPr lang="en-US" altLang="en-US">
+              <a:latin typeface="FreeMono" panose="020F0409020205020404" charset="0"/>
+              <a:ea typeface="FreeMono" panose="020F0409020205020404" charset="0"/>
+              <a:cs typeface="Noto Sans Mono CJK JP" panose="020B0500000000000000" charset="-122"/>
+            </a:endParaRPr>
+          </a:p>
+          <a:p>
+            <a:r>
+              <a:rPr lang="en-US" altLang="en-US">
+                <a:latin typeface="FreeMono" panose="020F0409020205020404" charset="0"/>
+                <a:ea typeface="FreeMono" panose="020F0409020205020404" charset="0"/>
+                <a:cs typeface="Noto Sans Mono CJK JP" panose="020B0500000000000000" charset="-122"/>
+                <a:sym typeface="+mn-ea"/>
+              </a:rPr>
+              <a:t>	nElems--; 	 // decrement size</a:t>
+            </a:r>
+            <a:endParaRPr lang="en-US" altLang="en-US">
+              <a:latin typeface="FreeMono" panose="020F0409020205020404" charset="0"/>
+              <a:ea typeface="FreeMono" panose="020F0409020205020404" charset="0"/>
+              <a:cs typeface="Noto Sans Mono CJK JP" panose="020B0500000000000000" charset="-122"/>
+              <a:sym typeface="+mn-ea"/>
+            </a:endParaRPr>
+          </a:p>
+          <a:p>
+            <a:r>
+              <a:rPr lang="en-US" altLang="en-US">
+                <a:latin typeface="FreeMono" panose="020F0409020205020404" charset="0"/>
+                <a:ea typeface="FreeMono" panose="020F0409020205020404" charset="0"/>
+                <a:cs typeface="Noto Sans Mono CJK JP" panose="020B0500000000000000" charset="-122"/>
+                <a:sym typeface="+mn-ea"/>
+              </a:rPr>
+              <a:t>	break;</a:t>
+            </a:r>
+            <a:endParaRPr lang="en-US" altLang="en-US">
+              <a:latin typeface="FreeMono" panose="020F0409020205020404" charset="0"/>
+              <a:ea typeface="FreeMono" panose="020F0409020205020404" charset="0"/>
+              <a:cs typeface="Noto Sans Mono CJK JP" panose="020B0500000000000000" charset="-122"/>
+              <a:sym typeface="+mn-ea"/>
+            </a:endParaRPr>
+          </a:p>
+          <a:p>
+            <a:r>
+              <a:rPr lang="en-US" altLang="en-US">
+                <a:latin typeface="FreeMono" panose="020F0409020205020404" charset="0"/>
+                <a:ea typeface="FreeMono" panose="020F0409020205020404" charset="0"/>
+                <a:cs typeface="Noto Sans Mono CJK JP" panose="020B0500000000000000" charset="-122"/>
+                <a:sym typeface="+mn-ea"/>
+              </a:rPr>
+              <a:t>	}</a:t>
+            </a:r>
+            <a:endParaRPr lang="en-US" altLang="en-US">
+              <a:latin typeface="FreeMono" panose="020F0409020205020404" charset="0"/>
+              <a:ea typeface="FreeMono" panose="020F0409020205020404" charset="0"/>
+              <a:cs typeface="Noto Sans Mono CJK JP" panose="020B0500000000000000" charset="-122"/>
+            </a:endParaRPr>
+          </a:p>
+          <a:p>
+            <a:r>
+              <a:rPr lang="en-US" altLang="en-US">
+                <a:latin typeface="FreeMono" panose="020F0409020205020404" charset="0"/>
+                <a:ea typeface="FreeMono" panose="020F0409020205020404" charset="0"/>
+                <a:cs typeface="Noto Sans Mono CJK JP" panose="020B0500000000000000" charset="-122"/>
+                <a:sym typeface="+mn-ea"/>
+              </a:rPr>
+              <a:t> </a:t>
+            </a:r>
+            <a:r>
+              <a:rPr lang="en-US" altLang="en-US">
+                <a:latin typeface="FreeMono" panose="020F0409020205020404" charset="0"/>
+                <a:ea typeface="FreeMono" panose="020F0409020205020404" charset="0"/>
+                <a:cs typeface="Noto Sans Mono CJK JP" panose="020B0500000000000000" charset="-122"/>
+              </a:rPr>
+              <a:t>} </a:t>
+            </a:r>
+            <a:endParaRPr lang="en-US">
+              <a:latin typeface="FreeMono" panose="020F0409020205020404" charset="0"/>
+              <a:ea typeface="FreeMono" panose="020F0409020205020404" charset="0"/>
+              <a:cs typeface="Noto Sans Mono CJK JP" panose="020B0500000000000000" charset="-122"/>
+            </a:endParaRPr>
+          </a:p>
+          <a:p>
+            <a:r>
+              <a:rPr lang="en-US">
+                <a:latin typeface="FreeMono" panose="020F0409020205020404" charset="0"/>
+                <a:ea typeface="FreeMono" panose="020F0409020205020404" charset="0"/>
+                <a:cs typeface="Noto Sans Mono CJK JP" panose="020B0500000000000000" charset="-122"/>
+              </a:rPr>
+              <a:t>   </a:t>
+            </a:r>
+            <a:endParaRPr lang="en-US">
+              <a:latin typeface="FreeMono" panose="020F0409020205020404" charset="0"/>
+              <a:ea typeface="FreeMono" panose="020F0409020205020404" charset="0"/>
+              <a:cs typeface="Noto Sans Mono CJK JP" panose="020B0500000000000000" charset="-122"/>
+            </a:endParaRPr>
+          </a:p>
+        </p:txBody>
+      </p:sp>
+    </p:spTree>
+  </p:cSld>
+  <p:clrMapOvr>
+    <a:masterClrMapping/>
+  </p:clrMapOvr>
+</p:sld>
+</file>
+
+<file path=ppt/slides/slide23.xml><?xml version="1.0" encoding="utf-8"?>
+<p:sld xmlns:a="http://schemas.openxmlformats.org/drawingml/2006/main" xmlns:r="http://schemas.openxmlformats.org/officeDocument/2006/relationships" xmlns:p="http://schemas.openxmlformats.org/presentationml/2006/main">
+  <p:cSld>
+    <p:spTree>
+      <p:nvGrpSpPr>
+        <p:cNvPr id="1" name=""/>
+        <p:cNvGrpSpPr/>
+        <p:nvPr/>
+      </p:nvGrpSpPr>
+      <p:grpSpPr/>
+      <p:sp>
+        <p:nvSpPr>
+          <p:cNvPr id="2" name="Title 1"/>
+          <p:cNvSpPr>
+            <a:spLocks noGrp="1"/>
+          </p:cNvSpPr>
+          <p:nvPr>
+            <p:ph type="title"/>
+          </p:nvPr>
+        </p:nvSpPr>
+        <p:spPr>
+          <a:xfrm>
+            <a:off x="685800" y="203835"/>
+            <a:ext cx="7772400" cy="652145"/>
+          </a:xfrm>
+        </p:spPr>
+        <p:txBody>
+          <a:bodyPr/>
+          <a:p>
+            <a:r>
+              <a:rPr lang="en-US" altLang="en-US" sz="2800">
+                <a:latin typeface="Noto Serif CJK JP" panose="02020400000000000000" charset="-122"/>
+                <a:ea typeface="Noto Serif CJK JP" panose="02020400000000000000" charset="-122"/>
+              </a:rPr>
+              <a:t>Stack </a:t>
+            </a:r>
+            <a:endParaRPr lang="en-US" altLang="en-US" sz="2800">
+              <a:latin typeface="Noto Serif CJK JP" panose="02020400000000000000" charset="-122"/>
+              <a:ea typeface="Noto Serif CJK JP" panose="02020400000000000000" charset="-122"/>
+            </a:endParaRPr>
+          </a:p>
+        </p:txBody>
+      </p:sp>
+      <p:sp>
+        <p:nvSpPr>
+          <p:cNvPr id="3" name="Content Placeholder 2"/>
+          <p:cNvSpPr>
+            <a:spLocks noGrp="1"/>
+          </p:cNvSpPr>
+          <p:nvPr>
+            <p:ph idx="1"/>
+          </p:nvPr>
+        </p:nvSpPr>
+        <p:spPr>
+          <a:xfrm>
+            <a:off x="685800" y="1036955"/>
+            <a:ext cx="7772400" cy="5382260"/>
+          </a:xfrm>
+        </p:spPr>
+        <p:txBody>
+          <a:bodyPr/>
+          <a:p>
+            <a:pPr>
+              <a:lnSpc>
+                <a:spcPct val="120000"/>
+              </a:lnSpc>
+            </a:pPr>
+            <a:r>
+              <a:rPr lang="en-US" altLang="en-US" sz="1800">
+                <a:latin typeface="Noto Serif CJK JP" panose="02020400000000000000" charset="-122"/>
+                <a:ea typeface="Noto Serif CJK JP" panose="02020400000000000000" charset="-122"/>
+              </a:rPr>
+              <a:t>L</a:t>
+            </a:r>
+            <a:r>
+              <a:rPr lang="en-US" sz="1800">
+                <a:latin typeface="Noto Serif CJK JP" panose="02020400000000000000" charset="-122"/>
+                <a:ea typeface="Noto Serif CJK JP" panose="02020400000000000000" charset="-122"/>
+              </a:rPr>
+              <a:t>inear data structure</a:t>
+            </a:r>
+            <a:endParaRPr lang="en-US" sz="1800">
+              <a:latin typeface="Noto Serif CJK JP" panose="02020400000000000000" charset="-122"/>
+              <a:ea typeface="Noto Serif CJK JP" panose="02020400000000000000" charset="-122"/>
+            </a:endParaRPr>
+          </a:p>
+          <a:p>
+            <a:pPr>
+              <a:lnSpc>
+                <a:spcPct val="120000"/>
+              </a:lnSpc>
+            </a:pPr>
+            <a:r>
+              <a:rPr lang="en-US" altLang="en-US" sz="1800">
+                <a:latin typeface="Noto Serif CJK JP" panose="02020400000000000000" charset="-122"/>
+                <a:ea typeface="Noto Serif CJK JP" panose="02020400000000000000" charset="-122"/>
+              </a:rPr>
+              <a:t>N</a:t>
+            </a:r>
+            <a:r>
+              <a:rPr lang="en-US" sz="1800">
+                <a:latin typeface="Noto Serif CJK JP" panose="02020400000000000000" charset="-122"/>
+                <a:ea typeface="Noto Serif CJK JP" panose="02020400000000000000" charset="-122"/>
+              </a:rPr>
+              <a:t>ew element is added at one end and (top) an element is removed from that end only.</a:t>
+            </a:r>
+            <a:endParaRPr lang="en-US" sz="1800">
+              <a:latin typeface="Noto Serif CJK JP" panose="02020400000000000000" charset="-122"/>
+              <a:ea typeface="Noto Serif CJK JP" panose="02020400000000000000" charset="-122"/>
+            </a:endParaRPr>
+          </a:p>
+          <a:p>
+            <a:pPr>
+              <a:lnSpc>
+                <a:spcPct val="120000"/>
+              </a:lnSpc>
+            </a:pPr>
+            <a:r>
+              <a:rPr lang="en-US" sz="1800">
+                <a:latin typeface="Noto Serif CJK JP" panose="02020400000000000000" charset="-122"/>
+                <a:ea typeface="Noto Serif CJK JP" panose="02020400000000000000" charset="-122"/>
+              </a:rPr>
+              <a:t>LIFO(Last In First Out) or FILO(First In Last Out).</a:t>
+            </a:r>
+            <a:endParaRPr lang="en-US" sz="1800">
+              <a:latin typeface="Noto Serif CJK JP" panose="02020400000000000000" charset="-122"/>
+              <a:ea typeface="Noto Serif CJK JP" panose="02020400000000000000" charset="-122"/>
+            </a:endParaRPr>
+          </a:p>
+          <a:p>
+            <a:pPr>
+              <a:lnSpc>
+                <a:spcPct val="120000"/>
+              </a:lnSpc>
+            </a:pPr>
+            <a:r>
+              <a:rPr lang="en-US" altLang="en-US" sz="1800">
+                <a:latin typeface="Noto Serif CJK JP" panose="02020400000000000000" charset="-122"/>
+                <a:ea typeface="Noto Serif CJK JP" panose="02020400000000000000" charset="-122"/>
+              </a:rPr>
+              <a:t>Example : plates stacked over one another </a:t>
+            </a:r>
+            <a:endParaRPr lang="en-US" altLang="en-US" sz="1800">
+              <a:latin typeface="Noto Serif CJK JP" panose="02020400000000000000" charset="-122"/>
+              <a:ea typeface="Noto Serif CJK JP" panose="02020400000000000000" charset="-122"/>
+            </a:endParaRPr>
+          </a:p>
+          <a:p>
+            <a:pPr>
+              <a:lnSpc>
+                <a:spcPct val="120000"/>
+              </a:lnSpc>
+            </a:pPr>
+            <a:r>
+              <a:rPr lang="en-US" altLang="en-US" sz="1800">
+                <a:latin typeface="Noto Serif CJK JP" panose="02020400000000000000" charset="-122"/>
+                <a:ea typeface="Noto Serif CJK JP" panose="02020400000000000000" charset="-122"/>
+              </a:rPr>
+              <a:t>Can be Implemented using Array or Linked List</a:t>
+            </a:r>
+            <a:endParaRPr lang="en-US" altLang="en-US" sz="1800">
+              <a:latin typeface="Noto Serif CJK JP" panose="02020400000000000000" charset="-122"/>
+              <a:ea typeface="Noto Serif CJK JP" panose="02020400000000000000" charset="-122"/>
+            </a:endParaRPr>
+          </a:p>
+          <a:p>
+            <a:pPr>
+              <a:lnSpc>
+                <a:spcPct val="120000"/>
+              </a:lnSpc>
+            </a:pPr>
+            <a:r>
+              <a:rPr lang="en-US" altLang="en-US" sz="1800">
+                <a:latin typeface="Noto Serif CJK JP" panose="02020400000000000000" charset="-122"/>
+                <a:ea typeface="Noto Serif CJK JP" panose="02020400000000000000" charset="-122"/>
+                <a:sym typeface="+mn-ea"/>
+              </a:rPr>
+              <a:t>Tracking Element : Top</a:t>
+            </a:r>
+            <a:endParaRPr lang="en-US" altLang="en-US" sz="1800">
+              <a:latin typeface="Noto Serif CJK JP" panose="02020400000000000000" charset="-122"/>
+              <a:ea typeface="Noto Serif CJK JP" panose="02020400000000000000" charset="-122"/>
+            </a:endParaRPr>
+          </a:p>
+          <a:p>
+            <a:pPr>
+              <a:lnSpc>
+                <a:spcPct val="120000"/>
+              </a:lnSpc>
+            </a:pPr>
+            <a:r>
+              <a:rPr lang="en-US" altLang="en-US" sz="1800">
+                <a:latin typeface="Noto Serif CJK JP" panose="02020400000000000000" charset="-122"/>
+                <a:ea typeface="Noto Serif CJK JP" panose="02020400000000000000" charset="-122"/>
+              </a:rPr>
+              <a:t>Application : </a:t>
+            </a:r>
+            <a:endParaRPr lang="en-US" altLang="en-US" sz="1800">
+              <a:latin typeface="Noto Serif CJK JP" panose="02020400000000000000" charset="-122"/>
+              <a:ea typeface="Noto Serif CJK JP" panose="02020400000000000000" charset="-122"/>
+            </a:endParaRPr>
+          </a:p>
+          <a:p>
+            <a:pPr lvl="1">
+              <a:lnSpc>
+                <a:spcPct val="120000"/>
+              </a:lnSpc>
+            </a:pPr>
+            <a:r>
+              <a:rPr lang="en-US" altLang="en-US" sz="1800">
+                <a:latin typeface="Noto Serif CJK JP" panose="02020400000000000000" charset="-122"/>
+                <a:ea typeface="Noto Serif CJK JP" panose="02020400000000000000" charset="-122"/>
+              </a:rPr>
+              <a:t>Processing of subroutine calls and returns</a:t>
+            </a:r>
+            <a:endParaRPr lang="en-US" altLang="en-US" sz="1800">
+              <a:latin typeface="Noto Serif CJK JP" panose="02020400000000000000" charset="-122"/>
+              <a:ea typeface="Noto Serif CJK JP" panose="02020400000000000000" charset="-122"/>
+            </a:endParaRPr>
+          </a:p>
+          <a:p>
+            <a:pPr lvl="1">
+              <a:lnSpc>
+                <a:spcPct val="120000"/>
+              </a:lnSpc>
+            </a:pPr>
+            <a:r>
+              <a:rPr lang="en-US" altLang="en-US" sz="1800">
+                <a:latin typeface="Noto Serif CJK JP" panose="02020400000000000000" charset="-122"/>
+                <a:ea typeface="Noto Serif CJK JP" panose="02020400000000000000" charset="-122"/>
+              </a:rPr>
+              <a:t>reversing a string</a:t>
+            </a:r>
+            <a:endParaRPr lang="en-US" altLang="en-US" sz="1800">
+              <a:latin typeface="Noto Serif CJK JP" panose="02020400000000000000" charset="-122"/>
+              <a:ea typeface="Noto Serif CJK JP" panose="02020400000000000000" charset="-122"/>
+            </a:endParaRPr>
+          </a:p>
+          <a:p>
+            <a:pPr lvl="1">
+              <a:lnSpc>
+                <a:spcPct val="120000"/>
+              </a:lnSpc>
+            </a:pPr>
+            <a:r>
+              <a:rPr lang="en-US" altLang="en-US" sz="1800">
+                <a:latin typeface="Noto Serif CJK JP" panose="02020400000000000000" charset="-122"/>
+                <a:ea typeface="Noto Serif CJK JP" panose="02020400000000000000" charset="-122"/>
+              </a:rPr>
+              <a:t>backtracking - Eg :- Maze Game</a:t>
+            </a:r>
+            <a:endParaRPr lang="en-US" altLang="en-US" sz="1800">
+              <a:latin typeface="Noto Serif CJK JP" panose="02020400000000000000" charset="-122"/>
+              <a:ea typeface="Noto Serif CJK JP" panose="02020400000000000000" charset="-122"/>
+            </a:endParaRPr>
+          </a:p>
+          <a:p>
+            <a:pPr marL="0" indent="0">
+              <a:lnSpc>
+                <a:spcPct val="120000"/>
+              </a:lnSpc>
+              <a:buNone/>
+            </a:pPr>
+            <a:endParaRPr lang="en-US" altLang="en-US" sz="1800">
+              <a:latin typeface="Noto Serif CJK JP" panose="02020400000000000000" charset="-122"/>
+              <a:ea typeface="Noto Serif CJK JP" panose="02020400000000000000" charset="-122"/>
+            </a:endParaRPr>
+          </a:p>
+        </p:txBody>
+      </p:sp>
+    </p:spTree>
+  </p:cSld>
+  <p:clrMapOvr>
+    <a:masterClrMapping/>
+  </p:clrMapOvr>
+</p:sld>
+</file>
+
+<file path=ppt/slides/slide24.xml><?xml version="1.0" encoding="utf-8"?>
 <p:sld xmlns:a="http://schemas.openxmlformats.org/drawingml/2006/main" xmlns:r="http://schemas.openxmlformats.org/officeDocument/2006/relationships" xmlns:p="http://schemas.openxmlformats.org/presentationml/2006/main">
   <p:cSld>
     <p:spTree>
@@ -7197,7 +7872,7 @@
 </p:sld>
 </file>
 
-<file path=ppt/slides/slide22.xml><?xml version="1.0" encoding="utf-8"?>
+<file path=ppt/slides/slide25.xml><?xml version="1.0" encoding="utf-8"?>
 <p:sld xmlns:a="http://schemas.openxmlformats.org/drawingml/2006/main" xmlns:r="http://schemas.openxmlformats.org/officeDocument/2006/relationships" xmlns:p="http://schemas.openxmlformats.org/presentationml/2006/main">
   <p:cSld>
     <p:spTree>
@@ -7674,7 +8349,7 @@
 </p:sld>
 </file>
 
-<file path=ppt/slides/slide23.xml><?xml version="1.0" encoding="utf-8"?>
+<file path=ppt/slides/slide26.xml><?xml version="1.0" encoding="utf-8"?>
 <p:sld xmlns:a="http://schemas.openxmlformats.org/drawingml/2006/main" xmlns:r="http://schemas.openxmlformats.org/officeDocument/2006/relationships" xmlns:p="http://schemas.openxmlformats.org/presentationml/2006/main">
   <p:cSld>
     <p:spTree>
@@ -8158,7 +8833,7 @@
 </p:sld>
 </file>
 
-<file path=ppt/slides/slide24.xml><?xml version="1.0" encoding="utf-8"?>
+<file path=ppt/slides/slide27.xml><?xml version="1.0" encoding="utf-8"?>
 <p:sld xmlns:a="http://schemas.openxmlformats.org/drawingml/2006/main" xmlns:r="http://schemas.openxmlformats.org/officeDocument/2006/relationships" xmlns:p="http://schemas.openxmlformats.org/presentationml/2006/main">
   <p:cSld>
     <p:spTree>
@@ -8478,7 +9153,7 @@
 </p:sld>
 </file>
 
-<file path=ppt/slides/slide25.xml><?xml version="1.0" encoding="utf-8"?>
+<file path=ppt/slides/slide28.xml><?xml version="1.0" encoding="utf-8"?>
 <p:sld xmlns:a="http://schemas.openxmlformats.org/drawingml/2006/main" xmlns:r="http://schemas.openxmlformats.org/officeDocument/2006/relationships" xmlns:p="http://schemas.openxmlformats.org/presentationml/2006/main">
   <p:cSld>
     <p:spTree>
@@ -8555,7 +9230,7 @@
 </p:sld>
 </file>
 
-<file path=ppt/slides/slide26.xml><?xml version="1.0" encoding="utf-8"?>
+<file path=ppt/slides/slide29.xml><?xml version="1.0" encoding="utf-8"?>
 <p:sld xmlns:a="http://schemas.openxmlformats.org/drawingml/2006/main" xmlns:r="http://schemas.openxmlformats.org/officeDocument/2006/relationships" xmlns:p="http://schemas.openxmlformats.org/presentationml/2006/main">
   <p:cSld>
     <p:spTree>
@@ -9020,502 +9695,6 @@
             <a:endParaRPr lang="en-US" altLang="en-US">
               <a:latin typeface="Noto Serif CJK JP" panose="02020400000000000000" charset="-122"/>
               <a:ea typeface="Noto Serif CJK JP" panose="02020400000000000000" charset="-122"/>
-            </a:endParaRPr>
-          </a:p>
-        </p:txBody>
-      </p:sp>
-    </p:spTree>
-  </p:cSld>
-  <p:clrMapOvr>
-    <a:masterClrMapping/>
-  </p:clrMapOvr>
-</p:sld>
-</file>
-
-<file path=ppt/slides/slide27.xml><?xml version="1.0" encoding="utf-8"?>
-<p:sld xmlns:a="http://schemas.openxmlformats.org/drawingml/2006/main" xmlns:r="http://schemas.openxmlformats.org/officeDocument/2006/relationships" xmlns:p="http://schemas.openxmlformats.org/presentationml/2006/main">
-  <p:cSld>
-    <p:spTree>
-      <p:nvGrpSpPr>
-        <p:cNvPr id="1" name=""/>
-        <p:cNvGrpSpPr/>
-        <p:nvPr/>
-      </p:nvGrpSpPr>
-      <p:grpSpPr/>
-      <p:sp>
-        <p:nvSpPr>
-          <p:cNvPr id="3" name="Content Placeholder 2"/>
-          <p:cNvSpPr>
-            <a:spLocks noGrp="1"/>
-          </p:cNvSpPr>
-          <p:nvPr>
-            <p:ph idx="1"/>
-          </p:nvPr>
-        </p:nvSpPr>
-        <p:spPr>
-          <a:xfrm>
-            <a:off x="181610" y="533400"/>
-            <a:ext cx="7992110" cy="5791200"/>
-          </a:xfrm>
-        </p:spPr>
-        <p:txBody>
-          <a:bodyPr/>
-          <a:p>
-            <a:pPr marL="0" indent="0">
-              <a:lnSpc>
-                <a:spcPct val="80000"/>
-              </a:lnSpc>
-              <a:buNone/>
-            </a:pPr>
-            <a:r>
-              <a:rPr lang="en-US" sz="1800">
-                <a:latin typeface="FreeMono" panose="020F0409020205020404" charset="0"/>
-                <a:ea typeface="FreeMono" panose="020F0409020205020404" charset="0"/>
-              </a:rPr>
-              <a:t>public long remove() // take item from front of queue</a:t>
-            </a:r>
-            <a:endParaRPr lang="en-US" sz="1800">
-              <a:latin typeface="FreeMono" panose="020F0409020205020404" charset="0"/>
-              <a:ea typeface="FreeMono" panose="020F0409020205020404" charset="0"/>
-            </a:endParaRPr>
-          </a:p>
-          <a:p>
-            <a:pPr marL="0" indent="0">
-              <a:lnSpc>
-                <a:spcPct val="80000"/>
-              </a:lnSpc>
-              <a:buNone/>
-            </a:pPr>
-            <a:r>
-              <a:rPr lang="en-US" sz="1800">
-                <a:latin typeface="FreeMono" panose="020F0409020205020404" charset="0"/>
-                <a:ea typeface="FreeMono" panose="020F0409020205020404" charset="0"/>
-              </a:rPr>
-              <a:t>{</a:t>
-            </a:r>
-            <a:endParaRPr lang="en-US" sz="1800">
-              <a:latin typeface="FreeMono" panose="020F0409020205020404" charset="0"/>
-              <a:ea typeface="FreeMono" panose="020F0409020205020404" charset="0"/>
-            </a:endParaRPr>
-          </a:p>
-          <a:p>
-            <a:pPr marL="457200" lvl="1" indent="0">
-              <a:lnSpc>
-                <a:spcPct val="80000"/>
-              </a:lnSpc>
-              <a:buNone/>
-            </a:pPr>
-            <a:r>
-              <a:rPr lang="en-US" sz="1575">
-                <a:latin typeface="FreeMono" panose="020F0409020205020404" charset="0"/>
-                <a:ea typeface="FreeMono" panose="020F0409020205020404" charset="0"/>
-              </a:rPr>
-              <a:t>long temp = queArray[front++];</a:t>
-            </a:r>
-            <a:endParaRPr lang="en-US" sz="1575">
-              <a:latin typeface="FreeMono" panose="020F0409020205020404" charset="0"/>
-              <a:ea typeface="FreeMono" panose="020F0409020205020404" charset="0"/>
-            </a:endParaRPr>
-          </a:p>
-          <a:p>
-            <a:pPr marL="457200" lvl="1" indent="0">
-              <a:lnSpc>
-                <a:spcPct val="80000"/>
-              </a:lnSpc>
-              <a:buNone/>
-            </a:pPr>
-            <a:r>
-              <a:rPr lang="en-US" sz="1575">
-                <a:latin typeface="FreeMono" panose="020F0409020205020404" charset="0"/>
-                <a:ea typeface="FreeMono" panose="020F0409020205020404" charset="0"/>
-              </a:rPr>
-              <a:t>if(front == maxSize)</a:t>
-            </a:r>
-            <a:endParaRPr lang="en-US" sz="1575">
-              <a:latin typeface="FreeMono" panose="020F0409020205020404" charset="0"/>
-              <a:ea typeface="FreeMono" panose="020F0409020205020404" charset="0"/>
-            </a:endParaRPr>
-          </a:p>
-          <a:p>
-            <a:pPr marL="457200" lvl="1" indent="0">
-              <a:lnSpc>
-                <a:spcPct val="80000"/>
-              </a:lnSpc>
-              <a:buNone/>
-            </a:pPr>
-            <a:r>
-              <a:rPr lang="en-US" sz="1575">
-                <a:latin typeface="FreeMono" panose="020F0409020205020404" charset="0"/>
-                <a:ea typeface="FreeMono" panose="020F0409020205020404" charset="0"/>
-              </a:rPr>
-              <a:t>front = 0;</a:t>
-            </a:r>
-            <a:endParaRPr lang="en-US" sz="1575">
-              <a:latin typeface="FreeMono" panose="020F0409020205020404" charset="0"/>
-              <a:ea typeface="FreeMono" panose="020F0409020205020404" charset="0"/>
-            </a:endParaRPr>
-          </a:p>
-          <a:p>
-            <a:pPr marL="457200" lvl="1" indent="0">
-              <a:lnSpc>
-                <a:spcPct val="80000"/>
-              </a:lnSpc>
-              <a:buNone/>
-            </a:pPr>
-            <a:r>
-              <a:rPr lang="en-US" sz="1575">
-                <a:latin typeface="FreeMono" panose="020F0409020205020404" charset="0"/>
-                <a:ea typeface="FreeMono" panose="020F0409020205020404" charset="0"/>
-              </a:rPr>
-              <a:t>return temp;</a:t>
-            </a:r>
-            <a:endParaRPr lang="en-US" sz="1575">
-              <a:latin typeface="FreeMono" panose="020F0409020205020404" charset="0"/>
-              <a:ea typeface="FreeMono" panose="020F0409020205020404" charset="0"/>
-            </a:endParaRPr>
-          </a:p>
-          <a:p>
-            <a:pPr marL="0" lvl="0" indent="0">
-              <a:lnSpc>
-                <a:spcPct val="80000"/>
-              </a:lnSpc>
-              <a:buNone/>
-            </a:pPr>
-            <a:r>
-              <a:rPr lang="en-US" sz="1800">
-                <a:latin typeface="FreeMono" panose="020F0409020205020404" charset="0"/>
-                <a:ea typeface="FreeMono" panose="020F0409020205020404" charset="0"/>
-              </a:rPr>
-              <a:t>}</a:t>
-            </a:r>
-            <a:endParaRPr lang="en-US" sz="1800">
-              <a:latin typeface="FreeMono" panose="020F0409020205020404" charset="0"/>
-              <a:ea typeface="FreeMono" panose="020F0409020205020404" charset="0"/>
-            </a:endParaRPr>
-          </a:p>
-          <a:p>
-            <a:pPr marL="0" lvl="0" indent="0">
-              <a:lnSpc>
-                <a:spcPct val="80000"/>
-              </a:lnSpc>
-              <a:buNone/>
-            </a:pPr>
-            <a:r>
-              <a:rPr lang="en-US" sz="1800">
-                <a:latin typeface="FreeMono" panose="020F0409020205020404" charset="0"/>
-                <a:ea typeface="FreeMono" panose="020F0409020205020404" charset="0"/>
-              </a:rPr>
-              <a:t>------------------------------------------------------</a:t>
-            </a:r>
-            <a:endParaRPr lang="en-US" sz="1800">
-              <a:latin typeface="FreeMono" panose="020F0409020205020404" charset="0"/>
-              <a:ea typeface="FreeMono" panose="020F0409020205020404" charset="0"/>
-            </a:endParaRPr>
-          </a:p>
-          <a:p>
-            <a:pPr marL="0" lvl="0" indent="0">
-              <a:lnSpc>
-                <a:spcPct val="80000"/>
-              </a:lnSpc>
-              <a:buNone/>
-            </a:pPr>
-            <a:r>
-              <a:rPr lang="en-US" sz="1800">
-                <a:latin typeface="FreeMono" panose="020F0409020205020404" charset="0"/>
-                <a:ea typeface="FreeMono" panose="020F0409020205020404" charset="0"/>
-              </a:rPr>
-              <a:t>public long peek() // peek at front of queue</a:t>
-            </a:r>
-            <a:endParaRPr lang="en-US" sz="1800">
-              <a:latin typeface="FreeMono" panose="020F0409020205020404" charset="0"/>
-              <a:ea typeface="FreeMono" panose="020F0409020205020404" charset="0"/>
-            </a:endParaRPr>
-          </a:p>
-          <a:p>
-            <a:pPr marL="0" lvl="0" indent="0">
-              <a:lnSpc>
-                <a:spcPct val="80000"/>
-              </a:lnSpc>
-              <a:buNone/>
-            </a:pPr>
-            <a:r>
-              <a:rPr lang="en-US" sz="1800">
-                <a:latin typeface="FreeMono" panose="020F0409020205020404" charset="0"/>
-                <a:ea typeface="FreeMono" panose="020F0409020205020404" charset="0"/>
-              </a:rPr>
-              <a:t>{</a:t>
-            </a:r>
-            <a:endParaRPr lang="en-US" sz="1800">
-              <a:latin typeface="FreeMono" panose="020F0409020205020404" charset="0"/>
-              <a:ea typeface="FreeMono" panose="020F0409020205020404" charset="0"/>
-            </a:endParaRPr>
-          </a:p>
-          <a:p>
-            <a:pPr marL="0" lvl="0" indent="0">
-              <a:lnSpc>
-                <a:spcPct val="80000"/>
-              </a:lnSpc>
-              <a:buNone/>
-            </a:pPr>
-            <a:r>
-              <a:rPr lang="en-US" altLang="en-US" sz="1800">
-                <a:latin typeface="FreeMono" panose="020F0409020205020404" charset="0"/>
-                <a:ea typeface="FreeMono" panose="020F0409020205020404" charset="0"/>
-              </a:rPr>
-              <a:t>	</a:t>
-            </a:r>
-            <a:r>
-              <a:rPr lang="en-US" sz="1800">
-                <a:latin typeface="FreeMono" panose="020F0409020205020404" charset="0"/>
-                <a:ea typeface="FreeMono" panose="020F0409020205020404" charset="0"/>
-              </a:rPr>
-              <a:t>return queArray[front];</a:t>
-            </a:r>
-            <a:endParaRPr lang="en-US" sz="1800">
-              <a:latin typeface="FreeMono" panose="020F0409020205020404" charset="0"/>
-              <a:ea typeface="FreeMono" panose="020F0409020205020404" charset="0"/>
-            </a:endParaRPr>
-          </a:p>
-          <a:p>
-            <a:pPr marL="0" lvl="0" indent="0">
-              <a:lnSpc>
-                <a:spcPct val="80000"/>
-              </a:lnSpc>
-              <a:buNone/>
-            </a:pPr>
-            <a:r>
-              <a:rPr lang="en-US" sz="1800">
-                <a:latin typeface="FreeMono" panose="020F0409020205020404" charset="0"/>
-                <a:ea typeface="FreeMono" panose="020F0409020205020404" charset="0"/>
-              </a:rPr>
-              <a:t>}</a:t>
-            </a:r>
-            <a:endParaRPr lang="en-US" sz="1800">
-              <a:latin typeface="FreeMono" panose="020F0409020205020404" charset="0"/>
-              <a:ea typeface="FreeMono" panose="020F0409020205020404" charset="0"/>
-            </a:endParaRPr>
-          </a:p>
-          <a:p>
-            <a:pPr marL="0" lvl="0" indent="0">
-              <a:lnSpc>
-                <a:spcPct val="80000"/>
-              </a:lnSpc>
-              <a:buNone/>
-            </a:pPr>
-            <a:r>
-              <a:rPr lang="en-US" sz="1800">
-                <a:latin typeface="FreeMono" panose="020F0409020205020404" charset="0"/>
-                <a:ea typeface="FreeMono" panose="020F0409020205020404" charset="0"/>
-              </a:rPr>
-              <a:t>------------------------------------------------------</a:t>
-            </a:r>
-            <a:endParaRPr lang="en-US" sz="1800">
-              <a:latin typeface="FreeMono" panose="020F0409020205020404" charset="0"/>
-              <a:ea typeface="FreeMono" panose="020F0409020205020404" charset="0"/>
-            </a:endParaRPr>
-          </a:p>
-          <a:p>
-            <a:pPr marL="0" lvl="0" indent="0">
-              <a:lnSpc>
-                <a:spcPct val="80000"/>
-              </a:lnSpc>
-              <a:buNone/>
-            </a:pPr>
-            <a:r>
-              <a:rPr lang="en-US" sz="1800">
-                <a:latin typeface="FreeMono" panose="020F0409020205020404" charset="0"/>
-                <a:ea typeface="FreeMono" panose="020F0409020205020404" charset="0"/>
-              </a:rPr>
-              <a:t>public boolean isEmpty() // true if queue is empty</a:t>
-            </a:r>
-            <a:endParaRPr lang="en-US" sz="1800">
-              <a:latin typeface="FreeMono" panose="020F0409020205020404" charset="0"/>
-              <a:ea typeface="FreeMono" panose="020F0409020205020404" charset="0"/>
-            </a:endParaRPr>
-          </a:p>
-          <a:p>
-            <a:pPr marL="0" lvl="0" indent="0">
-              <a:lnSpc>
-                <a:spcPct val="80000"/>
-              </a:lnSpc>
-              <a:buNone/>
-            </a:pPr>
-            <a:r>
-              <a:rPr lang="en-US" sz="1800">
-                <a:latin typeface="FreeMono" panose="020F0409020205020404" charset="0"/>
-                <a:ea typeface="FreeMono" panose="020F0409020205020404" charset="0"/>
-              </a:rPr>
-              <a:t>{</a:t>
-            </a:r>
-            <a:endParaRPr lang="en-US" sz="1800">
-              <a:latin typeface="FreeMono" panose="020F0409020205020404" charset="0"/>
-              <a:ea typeface="FreeMono" panose="020F0409020205020404" charset="0"/>
-            </a:endParaRPr>
-          </a:p>
-          <a:p>
-            <a:pPr marL="0" lvl="0" indent="0">
-              <a:lnSpc>
-                <a:spcPct val="80000"/>
-              </a:lnSpc>
-              <a:buNone/>
-            </a:pPr>
-            <a:r>
-              <a:rPr lang="en-US" altLang="en-US" sz="1800">
-                <a:latin typeface="FreeMono" panose="020F0409020205020404" charset="0"/>
-                <a:ea typeface="FreeMono" panose="020F0409020205020404" charset="0"/>
-              </a:rPr>
-              <a:t>	</a:t>
-            </a:r>
-            <a:r>
-              <a:rPr lang="en-US" sz="1800">
-                <a:latin typeface="FreeMono" panose="020F0409020205020404" charset="0"/>
-                <a:ea typeface="FreeMono" panose="020F0409020205020404" charset="0"/>
-              </a:rPr>
-              <a:t>return(rear+1==front || (front+maxSize-1==rear) );</a:t>
-            </a:r>
-            <a:endParaRPr lang="en-US" sz="1800">
-              <a:latin typeface="FreeMono" panose="020F0409020205020404" charset="0"/>
-              <a:ea typeface="FreeMono" panose="020F0409020205020404" charset="0"/>
-            </a:endParaRPr>
-          </a:p>
-          <a:p>
-            <a:pPr marL="0" lvl="0" indent="0">
-              <a:lnSpc>
-                <a:spcPct val="80000"/>
-              </a:lnSpc>
-              <a:buNone/>
-            </a:pPr>
-            <a:r>
-              <a:rPr lang="en-US" sz="1800">
-                <a:latin typeface="FreeMono" panose="020F0409020205020404" charset="0"/>
-                <a:ea typeface="FreeMono" panose="020F0409020205020404" charset="0"/>
-              </a:rPr>
-              <a:t>}</a:t>
-            </a:r>
-            <a:endParaRPr lang="en-US" sz="1800">
-              <a:latin typeface="FreeMono" panose="020F0409020205020404" charset="0"/>
-              <a:ea typeface="FreeMono" panose="020F0409020205020404" charset="0"/>
-            </a:endParaRPr>
-          </a:p>
-          <a:p>
-            <a:pPr marL="0" lvl="0" indent="0">
-              <a:lnSpc>
-                <a:spcPct val="80000"/>
-              </a:lnSpc>
-              <a:buNone/>
-            </a:pPr>
-            <a:r>
-              <a:rPr lang="en-US" sz="1800">
-                <a:latin typeface="FreeMono" panose="020F0409020205020404" charset="0"/>
-                <a:ea typeface="FreeMono" panose="020F0409020205020404" charset="0"/>
-              </a:rPr>
-              <a:t>------------------------------------------------------</a:t>
-            </a:r>
-            <a:endParaRPr lang="en-US" sz="1800">
-              <a:latin typeface="FreeMono" panose="020F0409020205020404" charset="0"/>
-              <a:ea typeface="FreeMono" panose="020F0409020205020404" charset="0"/>
-            </a:endParaRPr>
-          </a:p>
-          <a:p>
-            <a:pPr marL="0" lvl="0" indent="0">
-              <a:lnSpc>
-                <a:spcPct val="80000"/>
-              </a:lnSpc>
-              <a:buNone/>
-            </a:pPr>
-            <a:r>
-              <a:rPr lang="en-US" sz="1800">
-                <a:latin typeface="FreeMono" panose="020F0409020205020404" charset="0"/>
-                <a:ea typeface="FreeMono" panose="020F0409020205020404" charset="0"/>
-              </a:rPr>
-              <a:t>public boolean isFull() // true if queue is full</a:t>
-            </a:r>
-            <a:endParaRPr lang="en-US" sz="1800">
-              <a:latin typeface="FreeMono" panose="020F0409020205020404" charset="0"/>
-              <a:ea typeface="FreeMono" panose="020F0409020205020404" charset="0"/>
-            </a:endParaRPr>
-          </a:p>
-          <a:p>
-            <a:pPr marL="0" lvl="0" indent="0">
-              <a:lnSpc>
-                <a:spcPct val="80000"/>
-              </a:lnSpc>
-              <a:buNone/>
-            </a:pPr>
-            <a:r>
-              <a:rPr lang="en-US" sz="1800">
-                <a:latin typeface="FreeMono" panose="020F0409020205020404" charset="0"/>
-                <a:ea typeface="FreeMono" panose="020F0409020205020404" charset="0"/>
-              </a:rPr>
-              <a:t>{</a:t>
-            </a:r>
-            <a:endParaRPr lang="en-US" sz="1800">
-              <a:latin typeface="FreeMono" panose="020F0409020205020404" charset="0"/>
-              <a:ea typeface="FreeMono" panose="020F0409020205020404" charset="0"/>
-            </a:endParaRPr>
-          </a:p>
-          <a:p>
-            <a:pPr marL="0" lvl="0" indent="0">
-              <a:lnSpc>
-                <a:spcPct val="80000"/>
-              </a:lnSpc>
-              <a:buNone/>
-            </a:pPr>
-            <a:r>
-              <a:rPr lang="en-US" altLang="en-US" sz="1800">
-                <a:latin typeface="FreeMono" panose="020F0409020205020404" charset="0"/>
-                <a:ea typeface="FreeMono" panose="020F0409020205020404" charset="0"/>
-              </a:rPr>
-              <a:t>	</a:t>
-            </a:r>
-            <a:r>
-              <a:rPr lang="en-US" sz="1800">
-                <a:latin typeface="FreeMono" panose="020F0409020205020404" charset="0"/>
-                <a:ea typeface="FreeMono" panose="020F0409020205020404" charset="0"/>
-              </a:rPr>
-              <a:t>return (rear+2==front ||(front+maxSize-2==rear) );</a:t>
-            </a:r>
-            <a:endParaRPr lang="en-US" sz="1800">
-              <a:latin typeface="FreeMono" panose="020F0409020205020404" charset="0"/>
-              <a:ea typeface="FreeMono" panose="020F0409020205020404" charset="0"/>
-            </a:endParaRPr>
-          </a:p>
-          <a:p>
-            <a:pPr marL="0" lvl="0" indent="0">
-              <a:lnSpc>
-                <a:spcPct val="80000"/>
-              </a:lnSpc>
-              <a:buNone/>
-            </a:pPr>
-            <a:r>
-              <a:rPr lang="en-US" sz="1800">
-                <a:latin typeface="FreeMono" panose="020F0409020205020404" charset="0"/>
-                <a:ea typeface="FreeMono" panose="020F0409020205020404" charset="0"/>
-              </a:rPr>
-              <a:t>}</a:t>
-            </a:r>
-            <a:endParaRPr lang="en-US" sz="1800">
-              <a:latin typeface="FreeMono" panose="020F0409020205020404" charset="0"/>
-              <a:ea typeface="FreeMono" panose="020F0409020205020404" charset="0"/>
-            </a:endParaRPr>
-          </a:p>
-          <a:p>
-            <a:pPr marL="0" indent="0">
-              <a:lnSpc>
-                <a:spcPct val="80000"/>
-              </a:lnSpc>
-              <a:buNone/>
-            </a:pPr>
-            <a:r>
-              <a:rPr lang="en-US" sz="1800">
-                <a:latin typeface="FreeMono" panose="020F0409020205020404" charset="0"/>
-                <a:ea typeface="FreeMono" panose="020F0409020205020404" charset="0"/>
-              </a:rPr>
-              <a:t>} // end class Queue</a:t>
-            </a:r>
-            <a:endParaRPr lang="en-US" sz="1800">
-              <a:latin typeface="FreeMono" panose="020F0409020205020404" charset="0"/>
-              <a:ea typeface="FreeMono" panose="020F0409020205020404" charset="0"/>
             </a:endParaRPr>
           </a:p>
         </p:txBody>
@@ -9733,6 +9912,502 @@
       </p:par>
     </p:tnLst>
   </p:timing>
+</p:sld>
+</file>
+
+<file path=ppt/slides/slide30.xml><?xml version="1.0" encoding="utf-8"?>
+<p:sld xmlns:a="http://schemas.openxmlformats.org/drawingml/2006/main" xmlns:r="http://schemas.openxmlformats.org/officeDocument/2006/relationships" xmlns:p="http://schemas.openxmlformats.org/presentationml/2006/main">
+  <p:cSld>
+    <p:spTree>
+      <p:nvGrpSpPr>
+        <p:cNvPr id="1" name=""/>
+        <p:cNvGrpSpPr/>
+        <p:nvPr/>
+      </p:nvGrpSpPr>
+      <p:grpSpPr/>
+      <p:sp>
+        <p:nvSpPr>
+          <p:cNvPr id="3" name="Content Placeholder 2"/>
+          <p:cNvSpPr>
+            <a:spLocks noGrp="1"/>
+          </p:cNvSpPr>
+          <p:nvPr>
+            <p:ph idx="1"/>
+          </p:nvPr>
+        </p:nvSpPr>
+        <p:spPr>
+          <a:xfrm>
+            <a:off x="181610" y="533400"/>
+            <a:ext cx="7992110" cy="5791200"/>
+          </a:xfrm>
+        </p:spPr>
+        <p:txBody>
+          <a:bodyPr/>
+          <a:p>
+            <a:pPr marL="0" indent="0">
+              <a:lnSpc>
+                <a:spcPct val="80000"/>
+              </a:lnSpc>
+              <a:buNone/>
+            </a:pPr>
+            <a:r>
+              <a:rPr lang="en-US" sz="1800">
+                <a:latin typeface="FreeMono" panose="020F0409020205020404" charset="0"/>
+                <a:ea typeface="FreeMono" panose="020F0409020205020404" charset="0"/>
+              </a:rPr>
+              <a:t>public long remove() // take item from front of queue</a:t>
+            </a:r>
+            <a:endParaRPr lang="en-US" sz="1800">
+              <a:latin typeface="FreeMono" panose="020F0409020205020404" charset="0"/>
+              <a:ea typeface="FreeMono" panose="020F0409020205020404" charset="0"/>
+            </a:endParaRPr>
+          </a:p>
+          <a:p>
+            <a:pPr marL="0" indent="0">
+              <a:lnSpc>
+                <a:spcPct val="80000"/>
+              </a:lnSpc>
+              <a:buNone/>
+            </a:pPr>
+            <a:r>
+              <a:rPr lang="en-US" sz="1800">
+                <a:latin typeface="FreeMono" panose="020F0409020205020404" charset="0"/>
+                <a:ea typeface="FreeMono" panose="020F0409020205020404" charset="0"/>
+              </a:rPr>
+              <a:t>{</a:t>
+            </a:r>
+            <a:endParaRPr lang="en-US" sz="1800">
+              <a:latin typeface="FreeMono" panose="020F0409020205020404" charset="0"/>
+              <a:ea typeface="FreeMono" panose="020F0409020205020404" charset="0"/>
+            </a:endParaRPr>
+          </a:p>
+          <a:p>
+            <a:pPr marL="457200" lvl="1" indent="0">
+              <a:lnSpc>
+                <a:spcPct val="80000"/>
+              </a:lnSpc>
+              <a:buNone/>
+            </a:pPr>
+            <a:r>
+              <a:rPr lang="en-US" sz="1575">
+                <a:latin typeface="FreeMono" panose="020F0409020205020404" charset="0"/>
+                <a:ea typeface="FreeMono" panose="020F0409020205020404" charset="0"/>
+              </a:rPr>
+              <a:t>long temp = queArray[front++];</a:t>
+            </a:r>
+            <a:endParaRPr lang="en-US" sz="1575">
+              <a:latin typeface="FreeMono" panose="020F0409020205020404" charset="0"/>
+              <a:ea typeface="FreeMono" panose="020F0409020205020404" charset="0"/>
+            </a:endParaRPr>
+          </a:p>
+          <a:p>
+            <a:pPr marL="457200" lvl="1" indent="0">
+              <a:lnSpc>
+                <a:spcPct val="80000"/>
+              </a:lnSpc>
+              <a:buNone/>
+            </a:pPr>
+            <a:r>
+              <a:rPr lang="en-US" sz="1575">
+                <a:latin typeface="FreeMono" panose="020F0409020205020404" charset="0"/>
+                <a:ea typeface="FreeMono" panose="020F0409020205020404" charset="0"/>
+              </a:rPr>
+              <a:t>if(front == maxSize)</a:t>
+            </a:r>
+            <a:endParaRPr lang="en-US" sz="1575">
+              <a:latin typeface="FreeMono" panose="020F0409020205020404" charset="0"/>
+              <a:ea typeface="FreeMono" panose="020F0409020205020404" charset="0"/>
+            </a:endParaRPr>
+          </a:p>
+          <a:p>
+            <a:pPr marL="457200" lvl="1" indent="0">
+              <a:lnSpc>
+                <a:spcPct val="80000"/>
+              </a:lnSpc>
+              <a:buNone/>
+            </a:pPr>
+            <a:r>
+              <a:rPr lang="en-US" sz="1575">
+                <a:latin typeface="FreeMono" panose="020F0409020205020404" charset="0"/>
+                <a:ea typeface="FreeMono" panose="020F0409020205020404" charset="0"/>
+              </a:rPr>
+              <a:t>front = 0;</a:t>
+            </a:r>
+            <a:endParaRPr lang="en-US" sz="1575">
+              <a:latin typeface="FreeMono" panose="020F0409020205020404" charset="0"/>
+              <a:ea typeface="FreeMono" panose="020F0409020205020404" charset="0"/>
+            </a:endParaRPr>
+          </a:p>
+          <a:p>
+            <a:pPr marL="457200" lvl="1" indent="0">
+              <a:lnSpc>
+                <a:spcPct val="80000"/>
+              </a:lnSpc>
+              <a:buNone/>
+            </a:pPr>
+            <a:r>
+              <a:rPr lang="en-US" sz="1575">
+                <a:latin typeface="FreeMono" panose="020F0409020205020404" charset="0"/>
+                <a:ea typeface="FreeMono" panose="020F0409020205020404" charset="0"/>
+              </a:rPr>
+              <a:t>return temp;</a:t>
+            </a:r>
+            <a:endParaRPr lang="en-US" sz="1575">
+              <a:latin typeface="FreeMono" panose="020F0409020205020404" charset="0"/>
+              <a:ea typeface="FreeMono" panose="020F0409020205020404" charset="0"/>
+            </a:endParaRPr>
+          </a:p>
+          <a:p>
+            <a:pPr marL="0" lvl="0" indent="0">
+              <a:lnSpc>
+                <a:spcPct val="80000"/>
+              </a:lnSpc>
+              <a:buNone/>
+            </a:pPr>
+            <a:r>
+              <a:rPr lang="en-US" sz="1800">
+                <a:latin typeface="FreeMono" panose="020F0409020205020404" charset="0"/>
+                <a:ea typeface="FreeMono" panose="020F0409020205020404" charset="0"/>
+              </a:rPr>
+              <a:t>}</a:t>
+            </a:r>
+            <a:endParaRPr lang="en-US" sz="1800">
+              <a:latin typeface="FreeMono" panose="020F0409020205020404" charset="0"/>
+              <a:ea typeface="FreeMono" panose="020F0409020205020404" charset="0"/>
+            </a:endParaRPr>
+          </a:p>
+          <a:p>
+            <a:pPr marL="0" lvl="0" indent="0">
+              <a:lnSpc>
+                <a:spcPct val="80000"/>
+              </a:lnSpc>
+              <a:buNone/>
+            </a:pPr>
+            <a:r>
+              <a:rPr lang="en-US" sz="1800">
+                <a:latin typeface="FreeMono" panose="020F0409020205020404" charset="0"/>
+                <a:ea typeface="FreeMono" panose="020F0409020205020404" charset="0"/>
+              </a:rPr>
+              <a:t>------------------------------------------------------</a:t>
+            </a:r>
+            <a:endParaRPr lang="en-US" sz="1800">
+              <a:latin typeface="FreeMono" panose="020F0409020205020404" charset="0"/>
+              <a:ea typeface="FreeMono" panose="020F0409020205020404" charset="0"/>
+            </a:endParaRPr>
+          </a:p>
+          <a:p>
+            <a:pPr marL="0" lvl="0" indent="0">
+              <a:lnSpc>
+                <a:spcPct val="80000"/>
+              </a:lnSpc>
+              <a:buNone/>
+            </a:pPr>
+            <a:r>
+              <a:rPr lang="en-US" sz="1800">
+                <a:latin typeface="FreeMono" panose="020F0409020205020404" charset="0"/>
+                <a:ea typeface="FreeMono" panose="020F0409020205020404" charset="0"/>
+              </a:rPr>
+              <a:t>public long peek() // peek at front of queue</a:t>
+            </a:r>
+            <a:endParaRPr lang="en-US" sz="1800">
+              <a:latin typeface="FreeMono" panose="020F0409020205020404" charset="0"/>
+              <a:ea typeface="FreeMono" panose="020F0409020205020404" charset="0"/>
+            </a:endParaRPr>
+          </a:p>
+          <a:p>
+            <a:pPr marL="0" lvl="0" indent="0">
+              <a:lnSpc>
+                <a:spcPct val="80000"/>
+              </a:lnSpc>
+              <a:buNone/>
+            </a:pPr>
+            <a:r>
+              <a:rPr lang="en-US" sz="1800">
+                <a:latin typeface="FreeMono" panose="020F0409020205020404" charset="0"/>
+                <a:ea typeface="FreeMono" panose="020F0409020205020404" charset="0"/>
+              </a:rPr>
+              <a:t>{</a:t>
+            </a:r>
+            <a:endParaRPr lang="en-US" sz="1800">
+              <a:latin typeface="FreeMono" panose="020F0409020205020404" charset="0"/>
+              <a:ea typeface="FreeMono" panose="020F0409020205020404" charset="0"/>
+            </a:endParaRPr>
+          </a:p>
+          <a:p>
+            <a:pPr marL="0" lvl="0" indent="0">
+              <a:lnSpc>
+                <a:spcPct val="80000"/>
+              </a:lnSpc>
+              <a:buNone/>
+            </a:pPr>
+            <a:r>
+              <a:rPr lang="en-US" altLang="en-US" sz="1800">
+                <a:latin typeface="FreeMono" panose="020F0409020205020404" charset="0"/>
+                <a:ea typeface="FreeMono" panose="020F0409020205020404" charset="0"/>
+              </a:rPr>
+              <a:t>	</a:t>
+            </a:r>
+            <a:r>
+              <a:rPr lang="en-US" sz="1800">
+                <a:latin typeface="FreeMono" panose="020F0409020205020404" charset="0"/>
+                <a:ea typeface="FreeMono" panose="020F0409020205020404" charset="0"/>
+              </a:rPr>
+              <a:t>return queArray[front];</a:t>
+            </a:r>
+            <a:endParaRPr lang="en-US" sz="1800">
+              <a:latin typeface="FreeMono" panose="020F0409020205020404" charset="0"/>
+              <a:ea typeface="FreeMono" panose="020F0409020205020404" charset="0"/>
+            </a:endParaRPr>
+          </a:p>
+          <a:p>
+            <a:pPr marL="0" lvl="0" indent="0">
+              <a:lnSpc>
+                <a:spcPct val="80000"/>
+              </a:lnSpc>
+              <a:buNone/>
+            </a:pPr>
+            <a:r>
+              <a:rPr lang="en-US" sz="1800">
+                <a:latin typeface="FreeMono" panose="020F0409020205020404" charset="0"/>
+                <a:ea typeface="FreeMono" panose="020F0409020205020404" charset="0"/>
+              </a:rPr>
+              <a:t>}</a:t>
+            </a:r>
+            <a:endParaRPr lang="en-US" sz="1800">
+              <a:latin typeface="FreeMono" panose="020F0409020205020404" charset="0"/>
+              <a:ea typeface="FreeMono" panose="020F0409020205020404" charset="0"/>
+            </a:endParaRPr>
+          </a:p>
+          <a:p>
+            <a:pPr marL="0" lvl="0" indent="0">
+              <a:lnSpc>
+                <a:spcPct val="80000"/>
+              </a:lnSpc>
+              <a:buNone/>
+            </a:pPr>
+            <a:r>
+              <a:rPr lang="en-US" sz="1800">
+                <a:latin typeface="FreeMono" panose="020F0409020205020404" charset="0"/>
+                <a:ea typeface="FreeMono" panose="020F0409020205020404" charset="0"/>
+              </a:rPr>
+              <a:t>------------------------------------------------------</a:t>
+            </a:r>
+            <a:endParaRPr lang="en-US" sz="1800">
+              <a:latin typeface="FreeMono" panose="020F0409020205020404" charset="0"/>
+              <a:ea typeface="FreeMono" panose="020F0409020205020404" charset="0"/>
+            </a:endParaRPr>
+          </a:p>
+          <a:p>
+            <a:pPr marL="0" lvl="0" indent="0">
+              <a:lnSpc>
+                <a:spcPct val="80000"/>
+              </a:lnSpc>
+              <a:buNone/>
+            </a:pPr>
+            <a:r>
+              <a:rPr lang="en-US" sz="1800">
+                <a:latin typeface="FreeMono" panose="020F0409020205020404" charset="0"/>
+                <a:ea typeface="FreeMono" panose="020F0409020205020404" charset="0"/>
+              </a:rPr>
+              <a:t>public boolean isEmpty() // true if queue is empty</a:t>
+            </a:r>
+            <a:endParaRPr lang="en-US" sz="1800">
+              <a:latin typeface="FreeMono" panose="020F0409020205020404" charset="0"/>
+              <a:ea typeface="FreeMono" panose="020F0409020205020404" charset="0"/>
+            </a:endParaRPr>
+          </a:p>
+          <a:p>
+            <a:pPr marL="0" lvl="0" indent="0">
+              <a:lnSpc>
+                <a:spcPct val="80000"/>
+              </a:lnSpc>
+              <a:buNone/>
+            </a:pPr>
+            <a:r>
+              <a:rPr lang="en-US" sz="1800">
+                <a:latin typeface="FreeMono" panose="020F0409020205020404" charset="0"/>
+                <a:ea typeface="FreeMono" panose="020F0409020205020404" charset="0"/>
+              </a:rPr>
+              <a:t>{</a:t>
+            </a:r>
+            <a:endParaRPr lang="en-US" sz="1800">
+              <a:latin typeface="FreeMono" panose="020F0409020205020404" charset="0"/>
+              <a:ea typeface="FreeMono" panose="020F0409020205020404" charset="0"/>
+            </a:endParaRPr>
+          </a:p>
+          <a:p>
+            <a:pPr marL="0" lvl="0" indent="0">
+              <a:lnSpc>
+                <a:spcPct val="80000"/>
+              </a:lnSpc>
+              <a:buNone/>
+            </a:pPr>
+            <a:r>
+              <a:rPr lang="en-US" altLang="en-US" sz="1800">
+                <a:latin typeface="FreeMono" panose="020F0409020205020404" charset="0"/>
+                <a:ea typeface="FreeMono" panose="020F0409020205020404" charset="0"/>
+              </a:rPr>
+              <a:t>	</a:t>
+            </a:r>
+            <a:r>
+              <a:rPr lang="en-US" sz="1800">
+                <a:latin typeface="FreeMono" panose="020F0409020205020404" charset="0"/>
+                <a:ea typeface="FreeMono" panose="020F0409020205020404" charset="0"/>
+              </a:rPr>
+              <a:t>return(rear+1==front || (front+maxSize-1==rear) );</a:t>
+            </a:r>
+            <a:endParaRPr lang="en-US" sz="1800">
+              <a:latin typeface="FreeMono" panose="020F0409020205020404" charset="0"/>
+              <a:ea typeface="FreeMono" panose="020F0409020205020404" charset="0"/>
+            </a:endParaRPr>
+          </a:p>
+          <a:p>
+            <a:pPr marL="0" lvl="0" indent="0">
+              <a:lnSpc>
+                <a:spcPct val="80000"/>
+              </a:lnSpc>
+              <a:buNone/>
+            </a:pPr>
+            <a:r>
+              <a:rPr lang="en-US" sz="1800">
+                <a:latin typeface="FreeMono" panose="020F0409020205020404" charset="0"/>
+                <a:ea typeface="FreeMono" panose="020F0409020205020404" charset="0"/>
+              </a:rPr>
+              <a:t>}</a:t>
+            </a:r>
+            <a:endParaRPr lang="en-US" sz="1800">
+              <a:latin typeface="FreeMono" panose="020F0409020205020404" charset="0"/>
+              <a:ea typeface="FreeMono" panose="020F0409020205020404" charset="0"/>
+            </a:endParaRPr>
+          </a:p>
+          <a:p>
+            <a:pPr marL="0" lvl="0" indent="0">
+              <a:lnSpc>
+                <a:spcPct val="80000"/>
+              </a:lnSpc>
+              <a:buNone/>
+            </a:pPr>
+            <a:r>
+              <a:rPr lang="en-US" sz="1800">
+                <a:latin typeface="FreeMono" panose="020F0409020205020404" charset="0"/>
+                <a:ea typeface="FreeMono" panose="020F0409020205020404" charset="0"/>
+              </a:rPr>
+              <a:t>------------------------------------------------------</a:t>
+            </a:r>
+            <a:endParaRPr lang="en-US" sz="1800">
+              <a:latin typeface="FreeMono" panose="020F0409020205020404" charset="0"/>
+              <a:ea typeface="FreeMono" panose="020F0409020205020404" charset="0"/>
+            </a:endParaRPr>
+          </a:p>
+          <a:p>
+            <a:pPr marL="0" lvl="0" indent="0">
+              <a:lnSpc>
+                <a:spcPct val="80000"/>
+              </a:lnSpc>
+              <a:buNone/>
+            </a:pPr>
+            <a:r>
+              <a:rPr lang="en-US" sz="1800">
+                <a:latin typeface="FreeMono" panose="020F0409020205020404" charset="0"/>
+                <a:ea typeface="FreeMono" panose="020F0409020205020404" charset="0"/>
+              </a:rPr>
+              <a:t>public boolean isFull() // true if queue is full</a:t>
+            </a:r>
+            <a:endParaRPr lang="en-US" sz="1800">
+              <a:latin typeface="FreeMono" panose="020F0409020205020404" charset="0"/>
+              <a:ea typeface="FreeMono" panose="020F0409020205020404" charset="0"/>
+            </a:endParaRPr>
+          </a:p>
+          <a:p>
+            <a:pPr marL="0" lvl="0" indent="0">
+              <a:lnSpc>
+                <a:spcPct val="80000"/>
+              </a:lnSpc>
+              <a:buNone/>
+            </a:pPr>
+            <a:r>
+              <a:rPr lang="en-US" sz="1800">
+                <a:latin typeface="FreeMono" panose="020F0409020205020404" charset="0"/>
+                <a:ea typeface="FreeMono" panose="020F0409020205020404" charset="0"/>
+              </a:rPr>
+              <a:t>{</a:t>
+            </a:r>
+            <a:endParaRPr lang="en-US" sz="1800">
+              <a:latin typeface="FreeMono" panose="020F0409020205020404" charset="0"/>
+              <a:ea typeface="FreeMono" panose="020F0409020205020404" charset="0"/>
+            </a:endParaRPr>
+          </a:p>
+          <a:p>
+            <a:pPr marL="0" lvl="0" indent="0">
+              <a:lnSpc>
+                <a:spcPct val="80000"/>
+              </a:lnSpc>
+              <a:buNone/>
+            </a:pPr>
+            <a:r>
+              <a:rPr lang="en-US" altLang="en-US" sz="1800">
+                <a:latin typeface="FreeMono" panose="020F0409020205020404" charset="0"/>
+                <a:ea typeface="FreeMono" panose="020F0409020205020404" charset="0"/>
+              </a:rPr>
+              <a:t>	</a:t>
+            </a:r>
+            <a:r>
+              <a:rPr lang="en-US" sz="1800">
+                <a:latin typeface="FreeMono" panose="020F0409020205020404" charset="0"/>
+                <a:ea typeface="FreeMono" panose="020F0409020205020404" charset="0"/>
+              </a:rPr>
+              <a:t>return (rear+2==front ||(front+maxSize-2==rear) );</a:t>
+            </a:r>
+            <a:endParaRPr lang="en-US" sz="1800">
+              <a:latin typeface="FreeMono" panose="020F0409020205020404" charset="0"/>
+              <a:ea typeface="FreeMono" panose="020F0409020205020404" charset="0"/>
+            </a:endParaRPr>
+          </a:p>
+          <a:p>
+            <a:pPr marL="0" lvl="0" indent="0">
+              <a:lnSpc>
+                <a:spcPct val="80000"/>
+              </a:lnSpc>
+              <a:buNone/>
+            </a:pPr>
+            <a:r>
+              <a:rPr lang="en-US" sz="1800">
+                <a:latin typeface="FreeMono" panose="020F0409020205020404" charset="0"/>
+                <a:ea typeface="FreeMono" panose="020F0409020205020404" charset="0"/>
+              </a:rPr>
+              <a:t>}</a:t>
+            </a:r>
+            <a:endParaRPr lang="en-US" sz="1800">
+              <a:latin typeface="FreeMono" panose="020F0409020205020404" charset="0"/>
+              <a:ea typeface="FreeMono" panose="020F0409020205020404" charset="0"/>
+            </a:endParaRPr>
+          </a:p>
+          <a:p>
+            <a:pPr marL="0" indent="0">
+              <a:lnSpc>
+                <a:spcPct val="80000"/>
+              </a:lnSpc>
+              <a:buNone/>
+            </a:pPr>
+            <a:r>
+              <a:rPr lang="en-US" sz="1800">
+                <a:latin typeface="FreeMono" panose="020F0409020205020404" charset="0"/>
+                <a:ea typeface="FreeMono" panose="020F0409020205020404" charset="0"/>
+              </a:rPr>
+              <a:t>} // end class Queue</a:t>
+            </a:r>
+            <a:endParaRPr lang="en-US" sz="1800">
+              <a:latin typeface="FreeMono" panose="020F0409020205020404" charset="0"/>
+              <a:ea typeface="FreeMono" panose="020F0409020205020404" charset="0"/>
+            </a:endParaRPr>
+          </a:p>
+        </p:txBody>
+      </p:sp>
+    </p:spTree>
+  </p:cSld>
+  <p:clrMapOvr>
+    <a:masterClrMapping/>
+  </p:clrMapOvr>
 </p:sld>
 </file>
 
@@ -10818,11 +11493,19 @@
           <a:lstStyle/>
           <a:p>
             <a:r>
+              <a:rPr lang="en-US" altLang="en-US" sz="2800" dirty="0">
+                <a:latin typeface="Noto Serif CJK JP" panose="02020400000000000000" charset="-122"/>
+                <a:ea typeface="Noto Serif CJK JP" panose="02020400000000000000" charset="-122"/>
+                <a:sym typeface="+mn-ea"/>
+              </a:rPr>
+              <a:t>Example : </a:t>
+            </a:r>
+            <a:r>
               <a:rPr lang="en-US" altLang="en-IN" sz="2800" dirty="0">
                 <a:latin typeface="Noto Serif CJK JP" panose="02020400000000000000" charset="-122"/>
                 <a:ea typeface="Noto Serif CJK JP" panose="02020400000000000000" charset="-122"/>
               </a:rPr>
-              <a:t>Omega Notation, Ω</a:t>
+              <a:t>Big Oh Notation, Ο</a:t>
             </a:r>
             <a:endParaRPr lang="en-US" altLang="en-IN" sz="2800" dirty="0">
               <a:latin typeface="Noto Serif CJK JP" panose="02020400000000000000" charset="-122"/>
@@ -10843,8 +11526,8 @@
         </p:nvSpPr>
         <p:spPr>
           <a:xfrm>
-            <a:off x="554355" y="1226185"/>
-            <a:ext cx="7772400" cy="5364480"/>
+            <a:off x="685800" y="1240155"/>
+            <a:ext cx="7772400" cy="3862705"/>
           </a:xfrm>
         </p:spPr>
         <p:txBody>
@@ -10855,118 +11538,152 @@
               <a:lnSpc>
                 <a:spcPct val="150000"/>
               </a:lnSpc>
+              <a:buFont typeface="Wingdings" panose="05000000000000000000" charset="0"/>
+              <a:buChar char=""/>
             </a:pPr>
             <a:r>
               <a:rPr lang="en-IN" sz="1800" dirty="0" smtClean="0">
-                <a:latin typeface="Noto Serif CJK JP" panose="02020400000000000000" charset="-122"/>
-                <a:ea typeface="Noto Serif CJK JP" panose="02020400000000000000" charset="-122"/>
-              </a:rPr>
-              <a:t>The notation Ω(n) is the formal way to express the lower bound of an algorithm's running time. It measures the best case time complexity or the best amount of time an algorithm can possibly take to complete.</a:t>
-            </a:r>
-            <a:endParaRPr lang="en-IN" sz="1800" dirty="0" smtClean="0">
-              <a:latin typeface="Noto Serif CJK JP" panose="02020400000000000000" charset="-122"/>
-              <a:ea typeface="Noto Serif CJK JP" panose="02020400000000000000" charset="-122"/>
-            </a:endParaRPr>
-          </a:p>
-          <a:p>
-            <a:pPr>
-              <a:lnSpc>
-                <a:spcPct val="150000"/>
-              </a:lnSpc>
-            </a:pPr>
-            <a:endParaRPr lang="en-IN" sz="1800" dirty="0" smtClean="0">
-              <a:latin typeface="Noto Serif CJK JP" panose="02020400000000000000" charset="-122"/>
-              <a:ea typeface="Noto Serif CJK JP" panose="02020400000000000000" charset="-122"/>
-            </a:endParaRPr>
-          </a:p>
-          <a:p>
-            <a:pPr>
-              <a:lnSpc>
-                <a:spcPct val="150000"/>
-              </a:lnSpc>
-            </a:pPr>
-            <a:endParaRPr lang="en-IN" sz="1800" dirty="0" smtClean="0">
-              <a:latin typeface="Noto Serif CJK JP" panose="02020400000000000000" charset="-122"/>
-              <a:ea typeface="Noto Serif CJK JP" panose="02020400000000000000" charset="-122"/>
-            </a:endParaRPr>
-          </a:p>
-          <a:p>
-            <a:pPr>
-              <a:lnSpc>
-                <a:spcPct val="150000"/>
-              </a:lnSpc>
-            </a:pPr>
-            <a:endParaRPr lang="en-IN" sz="1800" dirty="0" smtClean="0">
-              <a:latin typeface="Noto Serif CJK JP" panose="02020400000000000000" charset="-122"/>
-              <a:ea typeface="Noto Serif CJK JP" panose="02020400000000000000" charset="-122"/>
-            </a:endParaRPr>
-          </a:p>
-          <a:p>
-            <a:pPr>
-              <a:lnSpc>
-                <a:spcPct val="150000"/>
-              </a:lnSpc>
-            </a:pPr>
-            <a:endParaRPr lang="en-IN" sz="1800" dirty="0" smtClean="0">
-              <a:latin typeface="Noto Serif CJK JP" panose="02020400000000000000" charset="-122"/>
-              <a:ea typeface="Noto Serif CJK JP" panose="02020400000000000000" charset="-122"/>
-            </a:endParaRPr>
-          </a:p>
-          <a:p>
-            <a:pPr>
-              <a:lnSpc>
-                <a:spcPct val="150000"/>
-              </a:lnSpc>
-            </a:pPr>
-            <a:endParaRPr lang="en-IN" sz="1800" dirty="0" smtClean="0">
-              <a:latin typeface="Noto Serif CJK JP" panose="02020400000000000000" charset="-122"/>
-              <a:ea typeface="Noto Serif CJK JP" panose="02020400000000000000" charset="-122"/>
-            </a:endParaRPr>
-          </a:p>
-          <a:p>
-            <a:pPr>
-              <a:lnSpc>
-                <a:spcPct val="150000"/>
-              </a:lnSpc>
-            </a:pPr>
+                <a:latin typeface="FreeMono" panose="020F0409020205020404" charset="0"/>
+                <a:ea typeface="FreeMono" panose="020F0409020205020404" charset="0"/>
+              </a:rPr>
+              <a:t>Let us consider a given function, f(n)=4.n</a:t>
+            </a:r>
+            <a:r>
+              <a:rPr lang="en-IN" sz="1800" baseline="30000" dirty="0" smtClean="0">
+                <a:latin typeface="FreeMono" panose="020F0409020205020404" charset="0"/>
+                <a:ea typeface="FreeMono" panose="020F0409020205020404" charset="0"/>
+              </a:rPr>
+              <a:t>3</a:t>
+            </a:r>
             <a:r>
               <a:rPr lang="en-IN" sz="1800" dirty="0" smtClean="0">
                 <a:latin typeface="FreeMono" panose="020F0409020205020404" charset="0"/>
                 <a:ea typeface="FreeMono" panose="020F0409020205020404" charset="0"/>
               </a:rPr>
-              <a:t>Ω(f(n)) ≥ { g(n) : there exists c &gt; 0 and n0 such that g(n) ≤ c.f(n) for all n &gt; n0. }</a:t>
+              <a:t>+10.n</a:t>
+            </a:r>
+            <a:r>
+              <a:rPr lang="en-IN" sz="1800" baseline="30000" dirty="0" smtClean="0">
+                <a:latin typeface="FreeMono" panose="020F0409020205020404" charset="0"/>
+                <a:ea typeface="FreeMono" panose="020F0409020205020404" charset="0"/>
+              </a:rPr>
+              <a:t>2</a:t>
+            </a:r>
+            <a:r>
+              <a:rPr lang="en-IN" sz="1800" dirty="0" smtClean="0">
+                <a:latin typeface="FreeMono" panose="020F0409020205020404" charset="0"/>
+                <a:ea typeface="FreeMono" panose="020F0409020205020404" charset="0"/>
+              </a:rPr>
+              <a:t>+5.n+1</a:t>
             </a:r>
             <a:endParaRPr lang="en-IN" sz="1800" dirty="0" smtClean="0">
               <a:latin typeface="FreeMono" panose="020F0409020205020404" charset="0"/>
               <a:ea typeface="FreeMono" panose="020F0409020205020404" charset="0"/>
             </a:endParaRPr>
           </a:p>
-        </p:txBody>
-      </p:sp>
-      <p:pic>
-        <p:nvPicPr>
-          <p:cNvPr id="4" name="Picture 3" descr="omega_notation"/>
-          <p:cNvPicPr>
-            <a:picLocks noChangeAspect="1"/>
-          </p:cNvPicPr>
-          <p:nvPr/>
-        </p:nvPicPr>
-        <p:blipFill>
-          <a:blip r:embed="rId1"/>
-          <a:stretch>
-            <a:fillRect/>
-          </a:stretch>
-        </p:blipFill>
-        <p:spPr>
-          <a:xfrm>
-            <a:off x="4195445" y="2582545"/>
-            <a:ext cx="3799205" cy="2760980"/>
-          </a:xfrm>
-          <a:prstGeom prst="rect">
-            <a:avLst/>
-          </a:prstGeom>
-        </p:spPr>
-      </p:pic>
+          <a:p>
+            <a:pPr>
+              <a:lnSpc>
+                <a:spcPct val="150000"/>
+              </a:lnSpc>
+              <a:buFont typeface="Wingdings" panose="05000000000000000000" charset="0"/>
+              <a:buChar char=""/>
+            </a:pPr>
+            <a:r>
+              <a:rPr lang="en-IN" sz="1800" dirty="0" smtClean="0">
+                <a:latin typeface="FreeMono" panose="020F0409020205020404" charset="0"/>
+                <a:ea typeface="FreeMono" panose="020F0409020205020404" charset="0"/>
+              </a:rPr>
+              <a:t>Considering g(n)=n</a:t>
+            </a:r>
+            <a:r>
+              <a:rPr lang="en-IN" sz="1800" baseline="30000" dirty="0" smtClean="0">
+                <a:latin typeface="FreeMono" panose="020F0409020205020404" charset="0"/>
+                <a:ea typeface="FreeMono" panose="020F0409020205020404" charset="0"/>
+              </a:rPr>
+              <a:t>3</a:t>
+            </a:r>
+            <a:r>
+              <a:rPr lang="en-IN" sz="1800" dirty="0" smtClean="0">
+                <a:latin typeface="FreeMono" panose="020F0409020205020404" charset="0"/>
+                <a:ea typeface="FreeMono" panose="020F0409020205020404" charset="0"/>
+              </a:rPr>
+              <a:t>,</a:t>
+            </a:r>
+            <a:endParaRPr lang="en-IN" sz="1800" dirty="0" smtClean="0">
+              <a:latin typeface="FreeMono" panose="020F0409020205020404" charset="0"/>
+              <a:ea typeface="FreeMono" panose="020F0409020205020404" charset="0"/>
+            </a:endParaRPr>
+          </a:p>
+          <a:p>
+            <a:pPr>
+              <a:lnSpc>
+                <a:spcPct val="150000"/>
+              </a:lnSpc>
+              <a:buFont typeface="Wingdings" panose="05000000000000000000" charset="0"/>
+              <a:buChar char=""/>
+            </a:pPr>
+            <a:endParaRPr lang="en-IN" sz="1800" dirty="0" smtClean="0">
+              <a:latin typeface="FreeMono" panose="020F0409020205020404" charset="0"/>
+              <a:ea typeface="FreeMono" panose="020F0409020205020404" charset="0"/>
+            </a:endParaRPr>
+          </a:p>
+          <a:p>
+            <a:pPr>
+              <a:lnSpc>
+                <a:spcPct val="150000"/>
+              </a:lnSpc>
+              <a:buFont typeface="Wingdings" panose="05000000000000000000" charset="0"/>
+              <a:buChar char=""/>
+            </a:pPr>
+            <a:r>
+              <a:rPr lang="en-IN" sz="1800" dirty="0" smtClean="0">
+                <a:latin typeface="FreeMono" panose="020F0409020205020404" charset="0"/>
+                <a:ea typeface="FreeMono" panose="020F0409020205020404" charset="0"/>
+              </a:rPr>
+              <a:t>f(n)⩽5.g(n) for all the values of n&gt;2</a:t>
+            </a:r>
+            <a:endParaRPr lang="en-IN" sz="1800" dirty="0" smtClean="0">
+              <a:latin typeface="FreeMono" panose="020F0409020205020404" charset="0"/>
+              <a:ea typeface="FreeMono" panose="020F0409020205020404" charset="0"/>
+            </a:endParaRPr>
+          </a:p>
+          <a:p>
+            <a:pPr>
+              <a:lnSpc>
+                <a:spcPct val="150000"/>
+              </a:lnSpc>
+              <a:buFont typeface="Wingdings" panose="05000000000000000000" charset="0"/>
+              <a:buChar char=""/>
+            </a:pPr>
+            <a:r>
+              <a:rPr lang="en-IN" sz="1800" dirty="0" smtClean="0">
+                <a:latin typeface="FreeMono" panose="020F0409020205020404" charset="0"/>
+                <a:ea typeface="FreeMono" panose="020F0409020205020404" charset="0"/>
+              </a:rPr>
+              <a:t>Hence, the complexity of f(n) can be represented as O(g(n)), i.e. O(n</a:t>
+            </a:r>
+            <a:r>
+              <a:rPr lang="en-IN" sz="1800" baseline="30000" dirty="0" smtClean="0">
+                <a:latin typeface="FreeMono" panose="020F0409020205020404" charset="0"/>
+                <a:ea typeface="FreeMono" panose="020F0409020205020404" charset="0"/>
+              </a:rPr>
+              <a:t>3</a:t>
+            </a:r>
+            <a:r>
+              <a:rPr lang="en-IN" sz="1800" dirty="0" smtClean="0">
+                <a:latin typeface="FreeMono" panose="020F0409020205020404" charset="0"/>
+                <a:ea typeface="FreeMono" panose="020F0409020205020404" charset="0"/>
+              </a:rPr>
+              <a:t>)</a:t>
+            </a:r>
+            <a:endParaRPr lang="en-IN" sz="1800" dirty="0" smtClean="0">
+              <a:latin typeface="FreeMono" panose="020F0409020205020404" charset="0"/>
+              <a:ea typeface="FreeMono" panose="020F0409020205020404" charset="0"/>
+            </a:endParaRPr>
+          </a:p>
+        </p:txBody>
+      </p:sp>
     </p:spTree>
   </p:cSld>
   <p:clrMapOvr>

</xml_diff>